<commit_message>
Adding an operating model image
</commit_message>
<xml_diff>
--- a/ImplementationGuideImages.pptx
+++ b/ImplementationGuideImages.pptx
@@ -11,6 +11,7 @@
     <p:sldId id="261" r:id="rId5"/>
     <p:sldId id="258" r:id="rId6"/>
     <p:sldId id="262" r:id="rId7"/>
+    <p:sldId id="263" r:id="rId8"/>
   </p:sldIdLst>
   <p:sldSz cx="12192000" cy="6858000"/>
   <p:notesSz cx="6858000" cy="9144000"/>
@@ -266,7 +267,7 @@
           <a:p>
             <a:fld id="{6B5A8AD0-4133-444B-956D-B3352209FA33}" type="datetimeFigureOut">
               <a:rPr lang="en-SE" smtClean="0"/>
-              <a:t>2024-01-29</a:t>
+              <a:t>2024-02-15</a:t>
             </a:fld>
             <a:endParaRPr lang="en-SE"/>
           </a:p>
@@ -466,7 +467,7 @@
           <a:p>
             <a:fld id="{6B5A8AD0-4133-444B-956D-B3352209FA33}" type="datetimeFigureOut">
               <a:rPr lang="en-SE" smtClean="0"/>
-              <a:t>2024-01-29</a:t>
+              <a:t>2024-02-15</a:t>
             </a:fld>
             <a:endParaRPr lang="en-SE"/>
           </a:p>
@@ -676,7 +677,7 @@
           <a:p>
             <a:fld id="{6B5A8AD0-4133-444B-956D-B3352209FA33}" type="datetimeFigureOut">
               <a:rPr lang="en-SE" smtClean="0"/>
-              <a:t>2024-01-29</a:t>
+              <a:t>2024-02-15</a:t>
             </a:fld>
             <a:endParaRPr lang="en-SE"/>
           </a:p>
@@ -876,7 +877,7 @@
           <a:p>
             <a:fld id="{6B5A8AD0-4133-444B-956D-B3352209FA33}" type="datetimeFigureOut">
               <a:rPr lang="en-SE" smtClean="0"/>
-              <a:t>2024-01-29</a:t>
+              <a:t>2024-02-15</a:t>
             </a:fld>
             <a:endParaRPr lang="en-SE"/>
           </a:p>
@@ -1152,7 +1153,7 @@
           <a:p>
             <a:fld id="{6B5A8AD0-4133-444B-956D-B3352209FA33}" type="datetimeFigureOut">
               <a:rPr lang="en-SE" smtClean="0"/>
-              <a:t>2024-01-29</a:t>
+              <a:t>2024-02-15</a:t>
             </a:fld>
             <a:endParaRPr lang="en-SE"/>
           </a:p>
@@ -1420,7 +1421,7 @@
           <a:p>
             <a:fld id="{6B5A8AD0-4133-444B-956D-B3352209FA33}" type="datetimeFigureOut">
               <a:rPr lang="en-SE" smtClean="0"/>
-              <a:t>2024-01-29</a:t>
+              <a:t>2024-02-15</a:t>
             </a:fld>
             <a:endParaRPr lang="en-SE"/>
           </a:p>
@@ -1835,7 +1836,7 @@
           <a:p>
             <a:fld id="{6B5A8AD0-4133-444B-956D-B3352209FA33}" type="datetimeFigureOut">
               <a:rPr lang="en-SE" smtClean="0"/>
-              <a:t>2024-01-29</a:t>
+              <a:t>2024-02-15</a:t>
             </a:fld>
             <a:endParaRPr lang="en-SE"/>
           </a:p>
@@ -1977,7 +1978,7 @@
           <a:p>
             <a:fld id="{6B5A8AD0-4133-444B-956D-B3352209FA33}" type="datetimeFigureOut">
               <a:rPr lang="en-SE" smtClean="0"/>
-              <a:t>2024-01-29</a:t>
+              <a:t>2024-02-15</a:t>
             </a:fld>
             <a:endParaRPr lang="en-SE"/>
           </a:p>
@@ -2090,7 +2091,7 @@
           <a:p>
             <a:fld id="{6B5A8AD0-4133-444B-956D-B3352209FA33}" type="datetimeFigureOut">
               <a:rPr lang="en-SE" smtClean="0"/>
-              <a:t>2024-01-29</a:t>
+              <a:t>2024-02-15</a:t>
             </a:fld>
             <a:endParaRPr lang="en-SE"/>
           </a:p>
@@ -2403,7 +2404,7 @@
           <a:p>
             <a:fld id="{6B5A8AD0-4133-444B-956D-B3352209FA33}" type="datetimeFigureOut">
               <a:rPr lang="en-SE" smtClean="0"/>
-              <a:t>2024-01-29</a:t>
+              <a:t>2024-02-15</a:t>
             </a:fld>
             <a:endParaRPr lang="en-SE"/>
           </a:p>
@@ -2692,7 +2693,7 @@
           <a:p>
             <a:fld id="{6B5A8AD0-4133-444B-956D-B3352209FA33}" type="datetimeFigureOut">
               <a:rPr lang="en-SE" smtClean="0"/>
-              <a:t>2024-01-29</a:t>
+              <a:t>2024-02-15</a:t>
             </a:fld>
             <a:endParaRPr lang="en-SE"/>
           </a:p>
@@ -2935,7 +2936,7 @@
           <a:p>
             <a:fld id="{6B5A8AD0-4133-444B-956D-B3352209FA33}" type="datetimeFigureOut">
               <a:rPr lang="en-SE" smtClean="0"/>
-              <a:t>2024-01-29</a:t>
+              <a:t>2024-02-15</a:t>
             </a:fld>
             <a:endParaRPr lang="en-SE"/>
           </a:p>
@@ -10652,6 +10653,327 @@
 </p:sld>
 </file>
 
+<file path=ppt/slides/slide7.xml><?xml version="1.0" encoding="utf-8"?>
+<p:sld xmlns:a="http://schemas.openxmlformats.org/drawingml/2006/main" xmlns:r="http://schemas.openxmlformats.org/officeDocument/2006/relationships" xmlns:p="http://schemas.openxmlformats.org/presentationml/2006/main">
+  <p:cSld>
+    <p:spTree>
+      <p:nvGrpSpPr>
+        <p:cNvPr id="1" name=""/>
+        <p:cNvGrpSpPr/>
+        <p:nvPr/>
+      </p:nvGrpSpPr>
+      <p:grpSpPr>
+        <a:xfrm>
+          <a:off x="0" y="0"/>
+          <a:ext cx="0" cy="0"/>
+          <a:chOff x="0" y="0"/>
+          <a:chExt cx="0" cy="0"/>
+        </a:xfrm>
+      </p:grpSpPr>
+      <p:pic>
+        <p:nvPicPr>
+          <p:cNvPr id="3" name="Picture 2" descr="Diagram of a process&#10;&#10;Description automatically generated">
+            <a:extLst>
+              <a:ext uri="{FF2B5EF4-FFF2-40B4-BE49-F238E27FC236}">
+                <a16:creationId xmlns:a16="http://schemas.microsoft.com/office/drawing/2014/main" id="{771CE6BD-ABCA-D733-F523-014007534B33}"/>
+              </a:ext>
+            </a:extLst>
+          </p:cNvPr>
+          <p:cNvPicPr>
+            <a:picLocks noChangeAspect="1"/>
+          </p:cNvPicPr>
+          <p:nvPr/>
+        </p:nvPicPr>
+        <p:blipFill>
+          <a:blip r:embed="rId2">
+            <a:extLst>
+              <a:ext uri="{28A0092B-C50C-407E-A947-70E740481C1C}">
+                <a14:useLocalDpi xmlns:a14="http://schemas.microsoft.com/office/drawing/2010/main" val="0"/>
+              </a:ext>
+            </a:extLst>
+          </a:blip>
+          <a:stretch>
+            <a:fillRect/>
+          </a:stretch>
+        </p:blipFill>
+        <p:spPr>
+          <a:xfrm>
+            <a:off x="1550531" y="828675"/>
+            <a:ext cx="8515350" cy="5200650"/>
+          </a:xfrm>
+          <a:prstGeom prst="rect">
+            <a:avLst/>
+          </a:prstGeom>
+        </p:spPr>
+      </p:pic>
+      <p:sp>
+        <p:nvSpPr>
+          <p:cNvPr id="4" name="Oval 3">
+            <a:extLst>
+              <a:ext uri="{FF2B5EF4-FFF2-40B4-BE49-F238E27FC236}">
+                <a16:creationId xmlns:a16="http://schemas.microsoft.com/office/drawing/2014/main" id="{2E139473-21AC-A234-7AF9-AA54796BEA53}"/>
+              </a:ext>
+            </a:extLst>
+          </p:cNvPr>
+          <p:cNvSpPr/>
+          <p:nvPr/>
+        </p:nvSpPr>
+        <p:spPr>
+          <a:xfrm>
+            <a:off x="1429506" y="2262590"/>
+            <a:ext cx="597159" cy="547943"/>
+          </a:xfrm>
+          <a:prstGeom prst="ellipse">
+            <a:avLst/>
+          </a:prstGeom>
+          <a:solidFill>
+            <a:srgbClr val="F9B655"/>
+          </a:solidFill>
+        </p:spPr>
+        <p:style>
+          <a:lnRef idx="2">
+            <a:schemeClr val="dk1"/>
+          </a:lnRef>
+          <a:fillRef idx="1">
+            <a:schemeClr val="lt1"/>
+          </a:fillRef>
+          <a:effectRef idx="0">
+            <a:schemeClr val="dk1"/>
+          </a:effectRef>
+          <a:fontRef idx="minor">
+            <a:schemeClr val="dk1"/>
+          </a:fontRef>
+        </p:style>
+        <p:txBody>
+          <a:bodyPr rtlCol="0" anchor="ctr"/>
+          <a:lstStyle/>
+          <a:p>
+            <a:pPr algn="ctr"/>
+            <a:r>
+              <a:rPr lang="en-US" dirty="0"/>
+              <a:t>1</a:t>
+            </a:r>
+            <a:endParaRPr lang="en-SE" dirty="0"/>
+          </a:p>
+        </p:txBody>
+      </p:sp>
+      <p:sp>
+        <p:nvSpPr>
+          <p:cNvPr id="5" name="Oval 4">
+            <a:extLst>
+              <a:ext uri="{FF2B5EF4-FFF2-40B4-BE49-F238E27FC236}">
+                <a16:creationId xmlns:a16="http://schemas.microsoft.com/office/drawing/2014/main" id="{BDC6C52C-84FF-18B8-521F-982A3ED13CED}"/>
+              </a:ext>
+            </a:extLst>
+          </p:cNvPr>
+          <p:cNvSpPr/>
+          <p:nvPr/>
+        </p:nvSpPr>
+        <p:spPr>
+          <a:xfrm>
+            <a:off x="4306252" y="3843151"/>
+            <a:ext cx="597159" cy="547943"/>
+          </a:xfrm>
+          <a:prstGeom prst="ellipse">
+            <a:avLst/>
+          </a:prstGeom>
+          <a:solidFill>
+            <a:srgbClr val="F9B655"/>
+          </a:solidFill>
+        </p:spPr>
+        <p:style>
+          <a:lnRef idx="2">
+            <a:schemeClr val="dk1"/>
+          </a:lnRef>
+          <a:fillRef idx="1">
+            <a:schemeClr val="lt1"/>
+          </a:fillRef>
+          <a:effectRef idx="0">
+            <a:schemeClr val="dk1"/>
+          </a:effectRef>
+          <a:fontRef idx="minor">
+            <a:schemeClr val="dk1"/>
+          </a:fontRef>
+        </p:style>
+        <p:txBody>
+          <a:bodyPr rtlCol="0" anchor="ctr"/>
+          <a:lstStyle/>
+          <a:p>
+            <a:pPr algn="ctr"/>
+            <a:r>
+              <a:rPr lang="en-US" dirty="0"/>
+              <a:t>2</a:t>
+            </a:r>
+            <a:endParaRPr lang="en-SE" dirty="0"/>
+          </a:p>
+        </p:txBody>
+      </p:sp>
+      <p:sp>
+        <p:nvSpPr>
+          <p:cNvPr id="6" name="Oval 5">
+            <a:extLst>
+              <a:ext uri="{FF2B5EF4-FFF2-40B4-BE49-F238E27FC236}">
+                <a16:creationId xmlns:a16="http://schemas.microsoft.com/office/drawing/2014/main" id="{3B3F1045-88ED-369E-21FA-17254D8F023E}"/>
+              </a:ext>
+            </a:extLst>
+          </p:cNvPr>
+          <p:cNvSpPr/>
+          <p:nvPr/>
+        </p:nvSpPr>
+        <p:spPr>
+          <a:xfrm>
+            <a:off x="5674709" y="3569179"/>
+            <a:ext cx="597159" cy="547943"/>
+          </a:xfrm>
+          <a:prstGeom prst="ellipse">
+            <a:avLst/>
+          </a:prstGeom>
+          <a:solidFill>
+            <a:srgbClr val="F9B655"/>
+          </a:solidFill>
+        </p:spPr>
+        <p:style>
+          <a:lnRef idx="2">
+            <a:schemeClr val="dk1"/>
+          </a:lnRef>
+          <a:fillRef idx="1">
+            <a:schemeClr val="lt1"/>
+          </a:fillRef>
+          <a:effectRef idx="0">
+            <a:schemeClr val="dk1"/>
+          </a:effectRef>
+          <a:fontRef idx="minor">
+            <a:schemeClr val="dk1"/>
+          </a:fontRef>
+        </p:style>
+        <p:txBody>
+          <a:bodyPr rtlCol="0" anchor="ctr"/>
+          <a:lstStyle/>
+          <a:p>
+            <a:pPr algn="ctr"/>
+            <a:r>
+              <a:rPr lang="en-US" dirty="0"/>
+              <a:t>3</a:t>
+            </a:r>
+            <a:endParaRPr lang="en-SE" dirty="0"/>
+          </a:p>
+        </p:txBody>
+      </p:sp>
+      <p:sp>
+        <p:nvSpPr>
+          <p:cNvPr id="7" name="Oval 6">
+            <a:extLst>
+              <a:ext uri="{FF2B5EF4-FFF2-40B4-BE49-F238E27FC236}">
+                <a16:creationId xmlns:a16="http://schemas.microsoft.com/office/drawing/2014/main" id="{BB4E3560-0CA1-8291-282D-56930BB0FF6D}"/>
+              </a:ext>
+            </a:extLst>
+          </p:cNvPr>
+          <p:cNvSpPr/>
+          <p:nvPr/>
+        </p:nvSpPr>
+        <p:spPr>
+          <a:xfrm>
+            <a:off x="8752561" y="1988618"/>
+            <a:ext cx="597159" cy="547943"/>
+          </a:xfrm>
+          <a:prstGeom prst="ellipse">
+            <a:avLst/>
+          </a:prstGeom>
+          <a:solidFill>
+            <a:srgbClr val="F9B655"/>
+          </a:solidFill>
+        </p:spPr>
+        <p:style>
+          <a:lnRef idx="2">
+            <a:schemeClr val="dk1"/>
+          </a:lnRef>
+          <a:fillRef idx="1">
+            <a:schemeClr val="lt1"/>
+          </a:fillRef>
+          <a:effectRef idx="0">
+            <a:schemeClr val="dk1"/>
+          </a:effectRef>
+          <a:fontRef idx="minor">
+            <a:schemeClr val="dk1"/>
+          </a:fontRef>
+        </p:style>
+        <p:txBody>
+          <a:bodyPr rtlCol="0" anchor="ctr"/>
+          <a:lstStyle/>
+          <a:p>
+            <a:pPr algn="ctr"/>
+            <a:r>
+              <a:rPr lang="en-US" dirty="0"/>
+              <a:t>4</a:t>
+            </a:r>
+            <a:endParaRPr lang="en-SE" dirty="0"/>
+          </a:p>
+        </p:txBody>
+      </p:sp>
+      <p:sp>
+        <p:nvSpPr>
+          <p:cNvPr id="8" name="Oval 7">
+            <a:extLst>
+              <a:ext uri="{FF2B5EF4-FFF2-40B4-BE49-F238E27FC236}">
+                <a16:creationId xmlns:a16="http://schemas.microsoft.com/office/drawing/2014/main" id="{B270E350-C90A-E73B-B728-5F893D31E830}"/>
+              </a:ext>
+            </a:extLst>
+          </p:cNvPr>
+          <p:cNvSpPr/>
+          <p:nvPr/>
+        </p:nvSpPr>
+        <p:spPr>
+          <a:xfrm>
+            <a:off x="7099728" y="5331992"/>
+            <a:ext cx="597159" cy="547943"/>
+          </a:xfrm>
+          <a:prstGeom prst="ellipse">
+            <a:avLst/>
+          </a:prstGeom>
+          <a:solidFill>
+            <a:srgbClr val="F9B655"/>
+          </a:solidFill>
+        </p:spPr>
+        <p:style>
+          <a:lnRef idx="2">
+            <a:schemeClr val="dk1"/>
+          </a:lnRef>
+          <a:fillRef idx="1">
+            <a:schemeClr val="lt1"/>
+          </a:fillRef>
+          <a:effectRef idx="0">
+            <a:schemeClr val="dk1"/>
+          </a:effectRef>
+          <a:fontRef idx="minor">
+            <a:schemeClr val="dk1"/>
+          </a:fontRef>
+        </p:style>
+        <p:txBody>
+          <a:bodyPr rtlCol="0" anchor="ctr"/>
+          <a:lstStyle/>
+          <a:p>
+            <a:pPr algn="ctr"/>
+            <a:r>
+              <a:rPr lang="en-US" dirty="0"/>
+              <a:t>5</a:t>
+            </a:r>
+            <a:endParaRPr lang="en-SE" dirty="0"/>
+          </a:p>
+        </p:txBody>
+      </p:sp>
+    </p:spTree>
+    <p:extLst>
+      <p:ext uri="{BB962C8B-B14F-4D97-AF65-F5344CB8AC3E}">
+        <p14:creationId xmlns:p14="http://schemas.microsoft.com/office/powerpoint/2010/main" val="2240367366"/>
+      </p:ext>
+    </p:extLst>
+  </p:cSld>
+  <p:clrMapOvr>
+    <a:masterClrMapping/>
+  </p:clrMapOvr>
+</p:sld>
+</file>
+
 <file path=ppt/theme/theme1.xml><?xml version="1.0" encoding="utf-8"?>
 <a:theme xmlns:a="http://schemas.openxmlformats.org/drawingml/2006/main" name="Office Theme">
   <a:themeElements>

</xml_diff>

<commit_message>
Introducing both an ingredient req and publish profile
</commit_message>
<xml_diff>
--- a/ImplementationGuideImages.pptx
+++ b/ImplementationGuideImages.pptx
@@ -267,7 +267,7 @@
           <a:p>
             <a:fld id="{6B5A8AD0-4133-444B-956D-B3352209FA33}" type="datetimeFigureOut">
               <a:rPr lang="en-SE" smtClean="0"/>
-              <a:t>2024-02-15</a:t>
+              <a:t>2024-02-22</a:t>
             </a:fld>
             <a:endParaRPr lang="en-SE"/>
           </a:p>
@@ -467,7 +467,7 @@
           <a:p>
             <a:fld id="{6B5A8AD0-4133-444B-956D-B3352209FA33}" type="datetimeFigureOut">
               <a:rPr lang="en-SE" smtClean="0"/>
-              <a:t>2024-02-15</a:t>
+              <a:t>2024-02-22</a:t>
             </a:fld>
             <a:endParaRPr lang="en-SE"/>
           </a:p>
@@ -677,7 +677,7 @@
           <a:p>
             <a:fld id="{6B5A8AD0-4133-444B-956D-B3352209FA33}" type="datetimeFigureOut">
               <a:rPr lang="en-SE" smtClean="0"/>
-              <a:t>2024-02-15</a:t>
+              <a:t>2024-02-22</a:t>
             </a:fld>
             <a:endParaRPr lang="en-SE"/>
           </a:p>
@@ -877,7 +877,7 @@
           <a:p>
             <a:fld id="{6B5A8AD0-4133-444B-956D-B3352209FA33}" type="datetimeFigureOut">
               <a:rPr lang="en-SE" smtClean="0"/>
-              <a:t>2024-02-15</a:t>
+              <a:t>2024-02-22</a:t>
             </a:fld>
             <a:endParaRPr lang="en-SE"/>
           </a:p>
@@ -1153,7 +1153,7 @@
           <a:p>
             <a:fld id="{6B5A8AD0-4133-444B-956D-B3352209FA33}" type="datetimeFigureOut">
               <a:rPr lang="en-SE" smtClean="0"/>
-              <a:t>2024-02-15</a:t>
+              <a:t>2024-02-22</a:t>
             </a:fld>
             <a:endParaRPr lang="en-SE"/>
           </a:p>
@@ -1421,7 +1421,7 @@
           <a:p>
             <a:fld id="{6B5A8AD0-4133-444B-956D-B3352209FA33}" type="datetimeFigureOut">
               <a:rPr lang="en-SE" smtClean="0"/>
-              <a:t>2024-02-15</a:t>
+              <a:t>2024-02-22</a:t>
             </a:fld>
             <a:endParaRPr lang="en-SE"/>
           </a:p>
@@ -1836,7 +1836,7 @@
           <a:p>
             <a:fld id="{6B5A8AD0-4133-444B-956D-B3352209FA33}" type="datetimeFigureOut">
               <a:rPr lang="en-SE" smtClean="0"/>
-              <a:t>2024-02-15</a:t>
+              <a:t>2024-02-22</a:t>
             </a:fld>
             <a:endParaRPr lang="en-SE"/>
           </a:p>
@@ -1978,7 +1978,7 @@
           <a:p>
             <a:fld id="{6B5A8AD0-4133-444B-956D-B3352209FA33}" type="datetimeFigureOut">
               <a:rPr lang="en-SE" smtClean="0"/>
-              <a:t>2024-02-15</a:t>
+              <a:t>2024-02-22</a:t>
             </a:fld>
             <a:endParaRPr lang="en-SE"/>
           </a:p>
@@ -2091,7 +2091,7 @@
           <a:p>
             <a:fld id="{6B5A8AD0-4133-444B-956D-B3352209FA33}" type="datetimeFigureOut">
               <a:rPr lang="en-SE" smtClean="0"/>
-              <a:t>2024-02-15</a:t>
+              <a:t>2024-02-22</a:t>
             </a:fld>
             <a:endParaRPr lang="en-SE"/>
           </a:p>
@@ -2404,7 +2404,7 @@
           <a:p>
             <a:fld id="{6B5A8AD0-4133-444B-956D-B3352209FA33}" type="datetimeFigureOut">
               <a:rPr lang="en-SE" smtClean="0"/>
-              <a:t>2024-02-15</a:t>
+              <a:t>2024-02-22</a:t>
             </a:fld>
             <a:endParaRPr lang="en-SE"/>
           </a:p>
@@ -2693,7 +2693,7 @@
           <a:p>
             <a:fld id="{6B5A8AD0-4133-444B-956D-B3352209FA33}" type="datetimeFigureOut">
               <a:rPr lang="en-SE" smtClean="0"/>
-              <a:t>2024-02-15</a:t>
+              <a:t>2024-02-22</a:t>
             </a:fld>
             <a:endParaRPr lang="en-SE"/>
           </a:p>
@@ -2936,7 +2936,7 @@
           <a:p>
             <a:fld id="{6B5A8AD0-4133-444B-956D-B3352209FA33}" type="datetimeFigureOut">
               <a:rPr lang="en-SE" smtClean="0"/>
-              <a:t>2024-02-15</a:t>
+              <a:t>2024-02-22</a:t>
             </a:fld>
             <a:endParaRPr lang="en-SE"/>
           </a:p>
@@ -3854,6 +3854,188 @@
           </a:extLst>
         </p:spPr>
       </p:pic>
+      <p:sp>
+        <p:nvSpPr>
+          <p:cNvPr id="2" name="Rectangle: Rounded Corners 1">
+            <a:extLst>
+              <a:ext uri="{FF2B5EF4-FFF2-40B4-BE49-F238E27FC236}">
+                <a16:creationId xmlns:a16="http://schemas.microsoft.com/office/drawing/2014/main" id="{12AC339F-F09B-60F3-DD10-509D233C3D15}"/>
+              </a:ext>
+            </a:extLst>
+          </p:cNvPr>
+          <p:cNvSpPr/>
+          <p:nvPr/>
+        </p:nvSpPr>
+        <p:spPr>
+          <a:xfrm>
+            <a:off x="9092636" y="1809562"/>
+            <a:ext cx="2237327" cy="622780"/>
+          </a:xfrm>
+          <a:prstGeom prst="roundRect">
+            <a:avLst/>
+          </a:prstGeom>
+          <a:ln/>
+        </p:spPr>
+        <p:style>
+          <a:lnRef idx="1">
+            <a:schemeClr val="accent3"/>
+          </a:lnRef>
+          <a:fillRef idx="2">
+            <a:schemeClr val="accent3"/>
+          </a:fillRef>
+          <a:effectRef idx="1">
+            <a:schemeClr val="accent3"/>
+          </a:effectRef>
+          <a:fontRef idx="minor">
+            <a:schemeClr val="dk1"/>
+          </a:fontRef>
+        </p:style>
+        <p:txBody>
+          <a:bodyPr rtlCol="0" anchor="ctr"/>
+          <a:lstStyle/>
+          <a:p>
+            <a:pPr marL="0" marR="0" lvl="0" indent="0" algn="ctr" defTabSz="914400" eaLnBrk="1" fontAlgn="auto" latinLnBrk="0" hangingPunct="1">
+              <a:lnSpc>
+                <a:spcPct val="100000"/>
+              </a:lnSpc>
+              <a:spcBef>
+                <a:spcPts val="0"/>
+              </a:spcBef>
+              <a:spcAft>
+                <a:spcPts val="0"/>
+              </a:spcAft>
+              <a:buClrTx/>
+              <a:buSzTx/>
+              <a:buFontTx/>
+              <a:buNone/>
+              <a:tabLst/>
+              <a:defRPr/>
+            </a:pPr>
+            <a:r>
+              <a:rPr kumimoji="0" lang="en-US" sz="1800" b="0" i="0" u="none" strike="noStrike" kern="0" cap="none" spc="0" normalizeH="0" baseline="0" noProof="0" dirty="0">
+                <a:ln>
+                  <a:noFill/>
+                </a:ln>
+                <a:solidFill>
+                  <a:srgbClr val="FFFFFF"/>
+                </a:solidFill>
+                <a:effectLst/>
+                <a:uLnTx/>
+                <a:uFillTx/>
+                <a:latin typeface="Calibri" panose="020F0502020204030204"/>
+                <a:ea typeface="+mn-ea"/>
+                <a:cs typeface="+mn-cs"/>
+              </a:rPr>
+              <a:t>Organization</a:t>
+            </a:r>
+            <a:endParaRPr kumimoji="0" lang="en-SE" sz="1800" b="0" i="0" u="none" strike="noStrike" kern="0" cap="none" spc="0" normalizeH="0" baseline="0" noProof="0" dirty="0">
+              <a:ln>
+                <a:noFill/>
+              </a:ln>
+              <a:solidFill>
+                <a:srgbClr val="FFFFFF"/>
+              </a:solidFill>
+              <a:effectLst/>
+              <a:uLnTx/>
+              <a:uFillTx/>
+              <a:latin typeface="Calibri" panose="020F0502020204030204"/>
+              <a:ea typeface="+mn-ea"/>
+              <a:cs typeface="+mn-cs"/>
+            </a:endParaRPr>
+          </a:p>
+        </p:txBody>
+      </p:sp>
+      <p:sp>
+        <p:nvSpPr>
+          <p:cNvPr id="3" name="Rectangle: Rounded Corners 2">
+            <a:extLst>
+              <a:ext uri="{FF2B5EF4-FFF2-40B4-BE49-F238E27FC236}">
+                <a16:creationId xmlns:a16="http://schemas.microsoft.com/office/drawing/2014/main" id="{CC554056-43B4-F6EA-B7CB-029166F36485}"/>
+              </a:ext>
+            </a:extLst>
+          </p:cNvPr>
+          <p:cNvSpPr/>
+          <p:nvPr/>
+        </p:nvSpPr>
+        <p:spPr>
+          <a:xfrm>
+            <a:off x="9092636" y="2711025"/>
+            <a:ext cx="2237327" cy="622780"/>
+          </a:xfrm>
+          <a:prstGeom prst="roundRect">
+            <a:avLst/>
+          </a:prstGeom>
+          <a:ln/>
+        </p:spPr>
+        <p:style>
+          <a:lnRef idx="1">
+            <a:schemeClr val="accent3"/>
+          </a:lnRef>
+          <a:fillRef idx="2">
+            <a:schemeClr val="accent3"/>
+          </a:fillRef>
+          <a:effectRef idx="1">
+            <a:schemeClr val="accent3"/>
+          </a:effectRef>
+          <a:fontRef idx="minor">
+            <a:schemeClr val="dk1"/>
+          </a:fontRef>
+        </p:style>
+        <p:txBody>
+          <a:bodyPr rtlCol="0" anchor="ctr"/>
+          <a:lstStyle/>
+          <a:p>
+            <a:pPr marL="0" marR="0" lvl="0" indent="0" algn="ctr" defTabSz="914400" eaLnBrk="1" fontAlgn="auto" latinLnBrk="0" hangingPunct="1">
+              <a:lnSpc>
+                <a:spcPct val="100000"/>
+              </a:lnSpc>
+              <a:spcBef>
+                <a:spcPts val="0"/>
+              </a:spcBef>
+              <a:spcAft>
+                <a:spcPts val="0"/>
+              </a:spcAft>
+              <a:buClrTx/>
+              <a:buSzTx/>
+              <a:buFontTx/>
+              <a:buNone/>
+              <a:tabLst/>
+              <a:defRPr/>
+            </a:pPr>
+            <a:r>
+              <a:rPr kumimoji="0" lang="en-US" sz="1800" b="0" i="0" u="none" strike="noStrike" kern="0" cap="none" spc="0" normalizeH="0" baseline="0" noProof="0" dirty="0">
+                <a:ln>
+                  <a:noFill/>
+                </a:ln>
+                <a:solidFill>
+                  <a:srgbClr val="FFFFFF"/>
+                </a:solidFill>
+                <a:effectLst/>
+                <a:uLnTx/>
+                <a:uFillTx/>
+                <a:latin typeface="Calibri" panose="020F0502020204030204"/>
+                <a:ea typeface="+mn-ea"/>
+                <a:cs typeface="+mn-cs"/>
+              </a:rPr>
+              <a:t>Task</a:t>
+            </a:r>
+            <a:endParaRPr kumimoji="0" lang="en-SE" sz="1800" b="0" i="0" u="none" strike="noStrike" kern="0" cap="none" spc="0" normalizeH="0" baseline="0" noProof="0" dirty="0">
+              <a:ln>
+                <a:noFill/>
+              </a:ln>
+              <a:solidFill>
+                <a:srgbClr val="FFFFFF"/>
+              </a:solidFill>
+              <a:effectLst/>
+              <a:uLnTx/>
+              <a:uFillTx/>
+              <a:latin typeface="Calibri" panose="020F0502020204030204"/>
+              <a:ea typeface="+mn-ea"/>
+              <a:cs typeface="+mn-cs"/>
+            </a:endParaRPr>
+          </a:p>
+        </p:txBody>
+      </p:sp>
     </p:spTree>
     <p:extLst>
       <p:ext uri="{BB962C8B-B14F-4D97-AF65-F5344CB8AC3E}">
@@ -3864,6 +4046,115 @@
   <p:clrMapOvr>
     <a:masterClrMapping/>
   </p:clrMapOvr>
+  <p:timing>
+    <p:tnLst>
+      <p:par>
+        <p:cTn id="1" dur="indefinite" restart="never" nodeType="tmRoot">
+          <p:childTnLst>
+            <p:seq concurrent="1" nextAc="seek">
+              <p:cTn id="2" dur="indefinite" nodeType="mainSeq">
+                <p:childTnLst>
+                  <p:par>
+                    <p:cTn id="3" fill="hold">
+                      <p:stCondLst>
+                        <p:cond delay="indefinite"/>
+                        <p:cond evt="onBegin" delay="0">
+                          <p:tn val="2"/>
+                        </p:cond>
+                      </p:stCondLst>
+                      <p:childTnLst>
+                        <p:par>
+                          <p:cTn id="4" fill="hold">
+                            <p:stCondLst>
+                              <p:cond delay="0"/>
+                            </p:stCondLst>
+                            <p:childTnLst>
+                              <p:par>
+                                <p:cTn id="5" presetID="1" presetClass="entr" presetSubtype="0" fill="hold" grpId="0" nodeType="withEffect">
+                                  <p:stCondLst>
+                                    <p:cond delay="0"/>
+                                  </p:stCondLst>
+                                  <p:childTnLst>
+                                    <p:set>
+                                      <p:cBhvr>
+                                        <p:cTn id="6" dur="1" fill="hold">
+                                          <p:stCondLst>
+                                            <p:cond delay="0"/>
+                                          </p:stCondLst>
+                                        </p:cTn>
+                                        <p:tgtEl>
+                                          <p:spTgt spid="2"/>
+                                        </p:tgtEl>
+                                        <p:attrNameLst>
+                                          <p:attrName>style.visibility</p:attrName>
+                                        </p:attrNameLst>
+                                      </p:cBhvr>
+                                      <p:to>
+                                        <p:strVal val="visible"/>
+                                      </p:to>
+                                    </p:set>
+                                  </p:childTnLst>
+                                </p:cTn>
+                              </p:par>
+                              <p:par>
+                                <p:cTn id="7" presetID="1" presetClass="entr" presetSubtype="0" fill="hold" grpId="0" nodeType="withEffect">
+                                  <p:stCondLst>
+                                    <p:cond delay="0"/>
+                                  </p:stCondLst>
+                                  <p:childTnLst>
+                                    <p:set>
+                                      <p:cBhvr>
+                                        <p:cTn id="8" dur="1" fill="hold">
+                                          <p:stCondLst>
+                                            <p:cond delay="0"/>
+                                          </p:stCondLst>
+                                        </p:cTn>
+                                        <p:tgtEl>
+                                          <p:spTgt spid="3"/>
+                                        </p:tgtEl>
+                                        <p:attrNameLst>
+                                          <p:attrName>style.visibility</p:attrName>
+                                        </p:attrNameLst>
+                                      </p:cBhvr>
+                                      <p:to>
+                                        <p:strVal val="visible"/>
+                                      </p:to>
+                                    </p:set>
+                                  </p:childTnLst>
+                                </p:cTn>
+                              </p:par>
+                            </p:childTnLst>
+                          </p:cTn>
+                        </p:par>
+                      </p:childTnLst>
+                    </p:cTn>
+                  </p:par>
+                </p:childTnLst>
+              </p:cTn>
+              <p:prevCondLst>
+                <p:cond evt="onPrev" delay="0">
+                  <p:tgtEl>
+                    <p:sldTgt/>
+                  </p:tgtEl>
+                </p:cond>
+              </p:prevCondLst>
+              <p:nextCondLst>
+                <p:cond evt="onNext" delay="0">
+                  <p:tgtEl>
+                    <p:sldTgt/>
+                  </p:tgtEl>
+                </p:cond>
+              </p:nextCondLst>
+            </p:seq>
+          </p:childTnLst>
+        </p:cTn>
+      </p:par>
+    </p:tnLst>
+    <p:bldLst>
+      <p:bldP spid="2" grpId="0" animBg="1"/>
+      <p:bldP spid="3" grpId="0" animBg="1"/>
+    </p:bldLst>
+  </p:timing>
 </p:sld>
 </file>
 
@@ -8638,16 +8929,18 @@
         </p:spPr>
         <p:style>
           <a:lnRef idx="2">
-            <a:schemeClr val="dk1"/>
+            <a:schemeClr val="accent4">
+              <a:shade val="15000"/>
+            </a:schemeClr>
           </a:lnRef>
           <a:fillRef idx="1">
-            <a:schemeClr val="lt1"/>
+            <a:schemeClr val="accent4"/>
           </a:fillRef>
           <a:effectRef idx="0">
-            <a:schemeClr val="dk1"/>
+            <a:schemeClr val="accent4"/>
           </a:effectRef>
           <a:fontRef idx="minor">
-            <a:schemeClr val="dk1"/>
+            <a:schemeClr val="lt1"/>
           </a:fontRef>
         </p:style>
         <p:txBody>
@@ -8656,10 +8949,24 @@
           <a:p>
             <a:pPr algn="ctr"/>
             <a:r>
-              <a:rPr lang="en-US" dirty="0"/>
+              <a:rPr lang="en-US" dirty="0">
+                <a:solidFill>
+                  <a:schemeClr val="tx1">
+                    <a:lumMod val="75000"/>
+                    <a:lumOff val="25000"/>
+                  </a:schemeClr>
+                </a:solidFill>
+              </a:rPr>
               <a:t>1</a:t>
             </a:r>
-            <a:endParaRPr lang="en-SE" dirty="0"/>
+            <a:endParaRPr lang="en-SE" dirty="0">
+              <a:solidFill>
+                <a:schemeClr val="tx1">
+                  <a:lumMod val="75000"/>
+                  <a:lumOff val="25000"/>
+                </a:schemeClr>
+              </a:solidFill>
+            </a:endParaRPr>
           </a:p>
         </p:txBody>
       </p:sp>
@@ -8686,16 +8993,18 @@
         </p:spPr>
         <p:style>
           <a:lnRef idx="2">
-            <a:schemeClr val="dk1"/>
+            <a:schemeClr val="accent4">
+              <a:shade val="15000"/>
+            </a:schemeClr>
           </a:lnRef>
           <a:fillRef idx="1">
-            <a:schemeClr val="lt1"/>
+            <a:schemeClr val="accent4"/>
           </a:fillRef>
           <a:effectRef idx="0">
-            <a:schemeClr val="dk1"/>
+            <a:schemeClr val="accent4"/>
           </a:effectRef>
           <a:fontRef idx="minor">
-            <a:schemeClr val="dk1"/>
+            <a:schemeClr val="lt1"/>
           </a:fontRef>
         </p:style>
         <p:txBody>
@@ -8704,10 +9013,24 @@
           <a:p>
             <a:pPr algn="ctr"/>
             <a:r>
-              <a:rPr lang="en-US" dirty="0"/>
+              <a:rPr lang="en-US" dirty="0">
+                <a:solidFill>
+                  <a:schemeClr val="tx1">
+                    <a:lumMod val="75000"/>
+                    <a:lumOff val="25000"/>
+                  </a:schemeClr>
+                </a:solidFill>
+              </a:rPr>
               <a:t>2</a:t>
             </a:r>
-            <a:endParaRPr lang="en-SE" dirty="0"/>
+            <a:endParaRPr lang="en-SE" dirty="0">
+              <a:solidFill>
+                <a:schemeClr val="tx1">
+                  <a:lumMod val="75000"/>
+                  <a:lumOff val="25000"/>
+                </a:schemeClr>
+              </a:solidFill>
+            </a:endParaRPr>
           </a:p>
         </p:txBody>
       </p:sp>
@@ -8734,16 +9057,18 @@
         </p:spPr>
         <p:style>
           <a:lnRef idx="2">
-            <a:schemeClr val="dk1"/>
+            <a:schemeClr val="accent4">
+              <a:shade val="15000"/>
+            </a:schemeClr>
           </a:lnRef>
           <a:fillRef idx="1">
-            <a:schemeClr val="lt1"/>
+            <a:schemeClr val="accent4"/>
           </a:fillRef>
           <a:effectRef idx="0">
-            <a:schemeClr val="dk1"/>
+            <a:schemeClr val="accent4"/>
           </a:effectRef>
           <a:fontRef idx="minor">
-            <a:schemeClr val="dk1"/>
+            <a:schemeClr val="lt1"/>
           </a:fontRef>
         </p:style>
         <p:txBody>
@@ -8752,10 +9077,24 @@
           <a:p>
             <a:pPr algn="ctr"/>
             <a:r>
-              <a:rPr lang="en-US" dirty="0"/>
+              <a:rPr lang="en-US" dirty="0">
+                <a:solidFill>
+                  <a:schemeClr val="tx1">
+                    <a:lumMod val="75000"/>
+                    <a:lumOff val="25000"/>
+                  </a:schemeClr>
+                </a:solidFill>
+              </a:rPr>
               <a:t>3</a:t>
             </a:r>
-            <a:endParaRPr lang="en-SE" dirty="0"/>
+            <a:endParaRPr lang="en-SE" dirty="0">
+              <a:solidFill>
+                <a:schemeClr val="tx1">
+                  <a:lumMod val="75000"/>
+                  <a:lumOff val="25000"/>
+                </a:schemeClr>
+              </a:solidFill>
+            </a:endParaRPr>
           </a:p>
         </p:txBody>
       </p:sp>
@@ -8782,16 +9121,18 @@
         </p:spPr>
         <p:style>
           <a:lnRef idx="2">
-            <a:schemeClr val="dk1"/>
+            <a:schemeClr val="accent4">
+              <a:shade val="15000"/>
+            </a:schemeClr>
           </a:lnRef>
           <a:fillRef idx="1">
-            <a:schemeClr val="lt1"/>
+            <a:schemeClr val="accent4"/>
           </a:fillRef>
           <a:effectRef idx="0">
-            <a:schemeClr val="dk1"/>
+            <a:schemeClr val="accent4"/>
           </a:effectRef>
           <a:fontRef idx="minor">
-            <a:schemeClr val="dk1"/>
+            <a:schemeClr val="lt1"/>
           </a:fontRef>
         </p:style>
         <p:txBody>
@@ -8800,10 +9141,24 @@
           <a:p>
             <a:pPr algn="ctr"/>
             <a:r>
-              <a:rPr lang="en-US" dirty="0"/>
+              <a:rPr lang="en-US" dirty="0">
+                <a:solidFill>
+                  <a:schemeClr val="tx1">
+                    <a:lumMod val="75000"/>
+                    <a:lumOff val="25000"/>
+                  </a:schemeClr>
+                </a:solidFill>
+              </a:rPr>
               <a:t>4</a:t>
             </a:r>
-            <a:endParaRPr lang="en-SE" dirty="0"/>
+            <a:endParaRPr lang="en-SE" dirty="0">
+              <a:solidFill>
+                <a:schemeClr val="tx1">
+                  <a:lumMod val="75000"/>
+                  <a:lumOff val="25000"/>
+                </a:schemeClr>
+              </a:solidFill>
+            </a:endParaRPr>
           </a:p>
         </p:txBody>
       </p:sp>
@@ -8830,16 +9185,18 @@
         </p:spPr>
         <p:style>
           <a:lnRef idx="2">
-            <a:schemeClr val="dk1"/>
+            <a:schemeClr val="accent4">
+              <a:shade val="15000"/>
+            </a:schemeClr>
           </a:lnRef>
           <a:fillRef idx="1">
-            <a:schemeClr val="lt1"/>
+            <a:schemeClr val="accent4"/>
           </a:fillRef>
           <a:effectRef idx="0">
-            <a:schemeClr val="dk1"/>
+            <a:schemeClr val="accent4"/>
           </a:effectRef>
           <a:fontRef idx="minor">
-            <a:schemeClr val="dk1"/>
+            <a:schemeClr val="lt1"/>
           </a:fontRef>
         </p:style>
         <p:txBody>
@@ -8848,10 +9205,24 @@
           <a:p>
             <a:pPr algn="ctr"/>
             <a:r>
-              <a:rPr lang="en-US" dirty="0"/>
+              <a:rPr lang="en-US" dirty="0">
+                <a:solidFill>
+                  <a:schemeClr val="tx1">
+                    <a:lumMod val="75000"/>
+                    <a:lumOff val="25000"/>
+                  </a:schemeClr>
+                </a:solidFill>
+              </a:rPr>
               <a:t>5</a:t>
             </a:r>
-            <a:endParaRPr lang="en-SE" dirty="0"/>
+            <a:endParaRPr lang="en-SE" dirty="0">
+              <a:solidFill>
+                <a:schemeClr val="tx1">
+                  <a:lumMod val="75000"/>
+                  <a:lumOff val="25000"/>
+                </a:schemeClr>
+              </a:solidFill>
+            </a:endParaRPr>
           </a:p>
         </p:txBody>
       </p:sp>
@@ -8878,16 +9249,18 @@
         </p:spPr>
         <p:style>
           <a:lnRef idx="2">
-            <a:schemeClr val="dk1"/>
+            <a:schemeClr val="accent4">
+              <a:shade val="15000"/>
+            </a:schemeClr>
           </a:lnRef>
           <a:fillRef idx="1">
-            <a:schemeClr val="lt1"/>
+            <a:schemeClr val="accent4"/>
           </a:fillRef>
           <a:effectRef idx="0">
-            <a:schemeClr val="dk1"/>
+            <a:schemeClr val="accent4"/>
           </a:effectRef>
           <a:fontRef idx="minor">
-            <a:schemeClr val="dk1"/>
+            <a:schemeClr val="lt1"/>
           </a:fontRef>
         </p:style>
         <p:txBody>
@@ -8896,10 +9269,24 @@
           <a:p>
             <a:pPr algn="ctr"/>
             <a:r>
-              <a:rPr lang="en-US" dirty="0"/>
+              <a:rPr lang="en-US" dirty="0">
+                <a:solidFill>
+                  <a:schemeClr val="tx1">
+                    <a:lumMod val="75000"/>
+                    <a:lumOff val="25000"/>
+                  </a:schemeClr>
+                </a:solidFill>
+              </a:rPr>
               <a:t>6</a:t>
             </a:r>
-            <a:endParaRPr lang="en-SE" dirty="0"/>
+            <a:endParaRPr lang="en-SE" dirty="0">
+              <a:solidFill>
+                <a:schemeClr val="tx1">
+                  <a:lumMod val="75000"/>
+                  <a:lumOff val="25000"/>
+                </a:schemeClr>
+              </a:solidFill>
+            </a:endParaRPr>
           </a:p>
         </p:txBody>
       </p:sp>

</xml_diff>

<commit_message>
Removing GSID request model
</commit_message>
<xml_diff>
--- a/ImplementationGuideImages.pptx
+++ b/ImplementationGuideImages.pptx
@@ -267,7 +267,7 @@
           <a:p>
             <a:fld id="{6B5A8AD0-4133-444B-956D-B3352209FA33}" type="datetimeFigureOut">
               <a:rPr lang="en-SE" smtClean="0"/>
-              <a:t>2024-02-22</a:t>
+              <a:t>2024-09-12</a:t>
             </a:fld>
             <a:endParaRPr lang="en-SE"/>
           </a:p>
@@ -467,7 +467,7 @@
           <a:p>
             <a:fld id="{6B5A8AD0-4133-444B-956D-B3352209FA33}" type="datetimeFigureOut">
               <a:rPr lang="en-SE" smtClean="0"/>
-              <a:t>2024-02-22</a:t>
+              <a:t>2024-09-12</a:t>
             </a:fld>
             <a:endParaRPr lang="en-SE"/>
           </a:p>
@@ -677,7 +677,7 @@
           <a:p>
             <a:fld id="{6B5A8AD0-4133-444B-956D-B3352209FA33}" type="datetimeFigureOut">
               <a:rPr lang="en-SE" smtClean="0"/>
-              <a:t>2024-02-22</a:t>
+              <a:t>2024-09-12</a:t>
             </a:fld>
             <a:endParaRPr lang="en-SE"/>
           </a:p>
@@ -877,7 +877,7 @@
           <a:p>
             <a:fld id="{6B5A8AD0-4133-444B-956D-B3352209FA33}" type="datetimeFigureOut">
               <a:rPr lang="en-SE" smtClean="0"/>
-              <a:t>2024-02-22</a:t>
+              <a:t>2024-09-12</a:t>
             </a:fld>
             <a:endParaRPr lang="en-SE"/>
           </a:p>
@@ -1153,7 +1153,7 @@
           <a:p>
             <a:fld id="{6B5A8AD0-4133-444B-956D-B3352209FA33}" type="datetimeFigureOut">
               <a:rPr lang="en-SE" smtClean="0"/>
-              <a:t>2024-02-22</a:t>
+              <a:t>2024-09-12</a:t>
             </a:fld>
             <a:endParaRPr lang="en-SE"/>
           </a:p>
@@ -1421,7 +1421,7 @@
           <a:p>
             <a:fld id="{6B5A8AD0-4133-444B-956D-B3352209FA33}" type="datetimeFigureOut">
               <a:rPr lang="en-SE" smtClean="0"/>
-              <a:t>2024-02-22</a:t>
+              <a:t>2024-09-12</a:t>
             </a:fld>
             <a:endParaRPr lang="en-SE"/>
           </a:p>
@@ -1836,7 +1836,7 @@
           <a:p>
             <a:fld id="{6B5A8AD0-4133-444B-956D-B3352209FA33}" type="datetimeFigureOut">
               <a:rPr lang="en-SE" smtClean="0"/>
-              <a:t>2024-02-22</a:t>
+              <a:t>2024-09-12</a:t>
             </a:fld>
             <a:endParaRPr lang="en-SE"/>
           </a:p>
@@ -1978,7 +1978,7 @@
           <a:p>
             <a:fld id="{6B5A8AD0-4133-444B-956D-B3352209FA33}" type="datetimeFigureOut">
               <a:rPr lang="en-SE" smtClean="0"/>
-              <a:t>2024-02-22</a:t>
+              <a:t>2024-09-12</a:t>
             </a:fld>
             <a:endParaRPr lang="en-SE"/>
           </a:p>
@@ -2091,7 +2091,7 @@
           <a:p>
             <a:fld id="{6B5A8AD0-4133-444B-956D-B3352209FA33}" type="datetimeFigureOut">
               <a:rPr lang="en-SE" smtClean="0"/>
-              <a:t>2024-02-22</a:t>
+              <a:t>2024-09-12</a:t>
             </a:fld>
             <a:endParaRPr lang="en-SE"/>
           </a:p>
@@ -2404,7 +2404,7 @@
           <a:p>
             <a:fld id="{6B5A8AD0-4133-444B-956D-B3352209FA33}" type="datetimeFigureOut">
               <a:rPr lang="en-SE" smtClean="0"/>
-              <a:t>2024-02-22</a:t>
+              <a:t>2024-09-12</a:t>
             </a:fld>
             <a:endParaRPr lang="en-SE"/>
           </a:p>
@@ -2693,7 +2693,7 @@
           <a:p>
             <a:fld id="{6B5A8AD0-4133-444B-956D-B3352209FA33}" type="datetimeFigureOut">
               <a:rPr lang="en-SE" smtClean="0"/>
-              <a:t>2024-02-22</a:t>
+              <a:t>2024-09-12</a:t>
             </a:fld>
             <a:endParaRPr lang="en-SE"/>
           </a:p>
@@ -2936,7 +2936,7 @@
           <a:p>
             <a:fld id="{6B5A8AD0-4133-444B-956D-B3352209FA33}" type="datetimeFigureOut">
               <a:rPr lang="en-SE" smtClean="0"/>
-              <a:t>2024-02-22</a:t>
+              <a:t>2024-09-12</a:t>
             </a:fld>
             <a:endParaRPr lang="en-SE"/>
           </a:p>
@@ -4036,6 +4036,176 @@
           </a:p>
         </p:txBody>
       </p:sp>
+      <p:cxnSp>
+        <p:nvCxnSpPr>
+          <p:cNvPr id="13" name="Connector: Elbow 12">
+            <a:extLst>
+              <a:ext uri="{FF2B5EF4-FFF2-40B4-BE49-F238E27FC236}">
+                <a16:creationId xmlns:a16="http://schemas.microsoft.com/office/drawing/2014/main" id="{1CF0F8DA-F104-28A8-1D54-2E13A745DE16}"/>
+              </a:ext>
+            </a:extLst>
+          </p:cNvPr>
+          <p:cNvCxnSpPr>
+            <a:cxnSpLocks/>
+            <a:stCxn id="4" idx="1"/>
+            <a:endCxn id="5" idx="1"/>
+          </p:cNvCxnSpPr>
+          <p:nvPr/>
+        </p:nvCxnSpPr>
+        <p:spPr>
+          <a:xfrm rot="10800000" flipH="1" flipV="1">
+            <a:off x="1069117" y="2120951"/>
+            <a:ext cx="2177592" cy="1235387"/>
+          </a:xfrm>
+          <a:prstGeom prst="bentConnector3">
+            <a:avLst>
+              <a:gd name="adj1" fmla="val -10498"/>
+            </a:avLst>
+          </a:prstGeom>
+          <a:ln w="19050" cap="flat" cmpd="sng" algn="ctr">
+            <a:solidFill>
+              <a:schemeClr val="accent1"/>
+            </a:solidFill>
+            <a:prstDash val="dash"/>
+            <a:round/>
+            <a:headEnd type="none" w="med" len="med"/>
+            <a:tailEnd type="triangle" w="med" len="med"/>
+          </a:ln>
+        </p:spPr>
+        <p:style>
+          <a:lnRef idx="0">
+            <a:scrgbClr r="0" g="0" b="0"/>
+          </a:lnRef>
+          <a:fillRef idx="0">
+            <a:scrgbClr r="0" g="0" b="0"/>
+          </a:fillRef>
+          <a:effectRef idx="0">
+            <a:scrgbClr r="0" g="0" b="0"/>
+          </a:effectRef>
+          <a:fontRef idx="minor">
+            <a:schemeClr val="tx1"/>
+          </a:fontRef>
+        </p:style>
+      </p:cxnSp>
+      <p:sp>
+        <p:nvSpPr>
+          <p:cNvPr id="17" name="TextBox 16">
+            <a:extLst>
+              <a:ext uri="{FF2B5EF4-FFF2-40B4-BE49-F238E27FC236}">
+                <a16:creationId xmlns:a16="http://schemas.microsoft.com/office/drawing/2014/main" id="{9DCA3BC4-6936-4132-4746-8D3B87C8ADD8}"/>
+              </a:ext>
+            </a:extLst>
+          </p:cNvPr>
+          <p:cNvSpPr txBox="1"/>
+          <p:nvPr/>
+        </p:nvSpPr>
+        <p:spPr>
+          <a:xfrm>
+            <a:off x="642486" y="3377948"/>
+            <a:ext cx="2322057" cy="369332"/>
+          </a:xfrm>
+          <a:prstGeom prst="rect">
+            <a:avLst/>
+          </a:prstGeom>
+          <a:noFill/>
+        </p:spPr>
+        <p:txBody>
+          <a:bodyPr wrap="square" rtlCol="0">
+            <a:spAutoFit/>
+          </a:bodyPr>
+          <a:lstStyle/>
+          <a:p>
+            <a:r>
+              <a:rPr lang="en-US" dirty="0"/>
+              <a:t>Product-classification</a:t>
+            </a:r>
+            <a:endParaRPr lang="en-SE" dirty="0"/>
+          </a:p>
+        </p:txBody>
+      </p:sp>
+      <p:sp>
+        <p:nvSpPr>
+          <p:cNvPr id="18" name="Rectangle: Rounded Corners 17">
+            <a:extLst>
+              <a:ext uri="{FF2B5EF4-FFF2-40B4-BE49-F238E27FC236}">
+                <a16:creationId xmlns:a16="http://schemas.microsoft.com/office/drawing/2014/main" id="{1CFCD87C-1971-3238-3D8C-7337ED649873}"/>
+              </a:ext>
+            </a:extLst>
+          </p:cNvPr>
+          <p:cNvSpPr/>
+          <p:nvPr/>
+        </p:nvSpPr>
+        <p:spPr>
+          <a:xfrm>
+            <a:off x="9092635" y="3612488"/>
+            <a:ext cx="2237327" cy="622780"/>
+          </a:xfrm>
+          <a:prstGeom prst="roundRect">
+            <a:avLst/>
+          </a:prstGeom>
+          <a:ln/>
+        </p:spPr>
+        <p:style>
+          <a:lnRef idx="1">
+            <a:schemeClr val="accent3"/>
+          </a:lnRef>
+          <a:fillRef idx="2">
+            <a:schemeClr val="accent3"/>
+          </a:fillRef>
+          <a:effectRef idx="1">
+            <a:schemeClr val="accent3"/>
+          </a:effectRef>
+          <a:fontRef idx="minor">
+            <a:schemeClr val="dk1"/>
+          </a:fontRef>
+        </p:style>
+        <p:txBody>
+          <a:bodyPr rtlCol="0" anchor="ctr"/>
+          <a:lstStyle/>
+          <a:p>
+            <a:pPr marL="0" marR="0" lvl="0" indent="0" algn="ctr" defTabSz="914400" eaLnBrk="1" fontAlgn="auto" latinLnBrk="0" hangingPunct="1">
+              <a:lnSpc>
+                <a:spcPct val="100000"/>
+              </a:lnSpc>
+              <a:spcBef>
+                <a:spcPts val="0"/>
+              </a:spcBef>
+              <a:spcAft>
+                <a:spcPts val="0"/>
+              </a:spcAft>
+              <a:buClrTx/>
+              <a:buSzTx/>
+              <a:buFontTx/>
+              <a:buNone/>
+              <a:tabLst/>
+              <a:defRPr/>
+            </a:pPr>
+            <a:r>
+              <a:rPr lang="en-US" kern="0" dirty="0">
+                <a:solidFill>
+                  <a:srgbClr val="FFFFFF"/>
+                </a:solidFill>
+                <a:latin typeface="Calibri" panose="020F0502020204030204"/>
+              </a:rPr>
+              <a:t>Subscription</a:t>
+            </a:r>
+            <a:endParaRPr kumimoji="0" lang="en-SE" sz="1800" b="0" i="0" u="none" strike="noStrike" kern="0" cap="none" spc="0" normalizeH="0" baseline="0" noProof="0" dirty="0">
+              <a:ln>
+                <a:noFill/>
+              </a:ln>
+              <a:solidFill>
+                <a:srgbClr val="FFFFFF"/>
+              </a:solidFill>
+              <a:effectLst/>
+              <a:uLnTx/>
+              <a:uFillTx/>
+              <a:latin typeface="Calibri" panose="020F0502020204030204"/>
+              <a:ea typeface="+mn-ea"/>
+              <a:cs typeface="+mn-cs"/>
+            </a:endParaRPr>
+          </a:p>
+        </p:txBody>
+      </p:sp>
     </p:spTree>
     <p:extLst>
       <p:ext uri="{BB962C8B-B14F-4D97-AF65-F5344CB8AC3E}">
@@ -4123,6 +4293,33 @@
                                   </p:childTnLst>
                                 </p:cTn>
                               </p:par>
+                              <p:par>
+                                <p:cTn id="9" presetID="1" presetClass="entr" presetSubtype="0" fill="hold" grpId="0" nodeType="withEffect">
+                                  <p:stCondLst>
+                                    <p:cond delay="0"/>
+                                  </p:stCondLst>
+                                  <p:childTnLst>
+                                    <p:set>
+                                      <p:cBhvr>
+                                        <p:cTn id="10" dur="1" fill="hold">
+                                          <p:stCondLst>
+                                            <p:cond delay="0"/>
+                                          </p:stCondLst>
+                                        </p:cTn>
+                                        <p:tgtEl>
+                                          <p:spTgt spid="18"/>
+                                        </p:tgtEl>
+                                        <p:attrNameLst>
+                                          <p:attrName>style.visibility</p:attrName>
+                                        </p:attrNameLst>
+                                      </p:cBhvr>
+                                      <p:to>
+                                        <p:strVal val="visible"/>
+                                      </p:to>
+                                    </p:set>
+                                  </p:childTnLst>
+                                </p:cTn>
+                              </p:par>
                             </p:childTnLst>
                           </p:cTn>
                         </p:par>
@@ -4153,6 +4350,7 @@
     <p:bldLst>
       <p:bldP spid="2" grpId="0" animBg="1"/>
       <p:bldP spid="3" grpId="0" animBg="1"/>
+      <p:bldP spid="18" grpId="0" animBg="1"/>
     </p:bldLst>
   </p:timing>
 </p:sld>
@@ -10170,7 +10368,7 @@
         </p:nvSpPr>
         <p:spPr>
           <a:xfrm>
-            <a:off x="3581656" y="3705892"/>
+            <a:off x="3581656" y="3117775"/>
             <a:ext cx="4054818" cy="622780"/>
           </a:xfrm>
           <a:prstGeom prst="roundRect">
@@ -10248,7 +10446,7 @@
         </p:nvSpPr>
         <p:spPr>
           <a:xfrm>
-            <a:off x="3581656" y="2748388"/>
+            <a:off x="3581656" y="2160271"/>
             <a:ext cx="4054819" cy="622780"/>
           </a:xfrm>
           <a:prstGeom prst="roundRect">
@@ -10314,7 +10512,7 @@
         </p:nvSpPr>
         <p:spPr>
           <a:xfrm>
-            <a:off x="3581656" y="1790884"/>
+            <a:off x="3581656" y="1202767"/>
             <a:ext cx="4054818" cy="622780"/>
           </a:xfrm>
           <a:prstGeom prst="roundRect">
@@ -10373,7 +10571,7 @@
         </p:nvSpPr>
         <p:spPr>
           <a:xfrm>
-            <a:off x="1789928" y="980839"/>
+            <a:off x="1789928" y="392722"/>
             <a:ext cx="1109792" cy="622780"/>
           </a:xfrm>
           <a:prstGeom prst="roundRect">
@@ -10434,7 +10632,7 @@
         </p:nvSpPr>
         <p:spPr>
           <a:xfrm>
-            <a:off x="3581657" y="4663397"/>
+            <a:off x="3581657" y="4075280"/>
             <a:ext cx="4054818" cy="622780"/>
           </a:xfrm>
           <a:prstGeom prst="roundRect">
@@ -10487,7 +10685,7 @@
         </p:nvCxnSpPr>
         <p:spPr>
           <a:xfrm rot="16200000" flipH="1">
-            <a:off x="2713913" y="1234530"/>
+            <a:off x="2713913" y="646413"/>
             <a:ext cx="498655" cy="1236832"/>
           </a:xfrm>
           <a:prstGeom prst="bentConnector2">
@@ -10535,7 +10733,7 @@
         </p:nvCxnSpPr>
         <p:spPr>
           <a:xfrm rot="16200000" flipH="1">
-            <a:off x="2235161" y="1713282"/>
+            <a:off x="2235161" y="1125165"/>
             <a:ext cx="1456159" cy="1236832"/>
           </a:xfrm>
           <a:prstGeom prst="bentConnector2">
@@ -10583,7 +10781,7 @@
         </p:nvCxnSpPr>
         <p:spPr>
           <a:xfrm rot="16200000" flipH="1">
-            <a:off x="1756409" y="2192034"/>
+            <a:off x="1756409" y="1603917"/>
             <a:ext cx="2413663" cy="1236832"/>
           </a:xfrm>
           <a:prstGeom prst="bentConnector2">
@@ -10631,7 +10829,7 @@
         </p:nvCxnSpPr>
         <p:spPr>
           <a:xfrm rot="16200000" flipH="1">
-            <a:off x="1277656" y="2670786"/>
+            <a:off x="1277656" y="2082669"/>
             <a:ext cx="3371168" cy="1236833"/>
           </a:xfrm>
           <a:prstGeom prst="bentConnector2">
@@ -10675,64 +10873,70 @@
         </p:nvSpPr>
         <p:spPr>
           <a:xfrm>
-            <a:off x="3336324" y="3575222"/>
-            <a:ext cx="4497860" cy="1853513"/>
+            <a:off x="3336324" y="2987105"/>
+            <a:ext cx="4497860" cy="2855394"/>
           </a:xfrm>
           <a:custGeom>
             <a:avLst/>
             <a:gdLst>
               <a:gd name="connsiteX0" fmla="*/ 0 w 4497860"/>
-              <a:gd name="connsiteY0" fmla="*/ 0 h 1853513"/>
+              <a:gd name="connsiteY0" fmla="*/ 0 h 2855394"/>
               <a:gd name="connsiteX1" fmla="*/ 607211 w 4497860"/>
-              <a:gd name="connsiteY1" fmla="*/ 0 h 1853513"/>
+              <a:gd name="connsiteY1" fmla="*/ 0 h 2855394"/>
               <a:gd name="connsiteX2" fmla="*/ 1034508 w 4497860"/>
-              <a:gd name="connsiteY2" fmla="*/ 0 h 1853513"/>
+              <a:gd name="connsiteY2" fmla="*/ 0 h 2855394"/>
               <a:gd name="connsiteX3" fmla="*/ 1551762 w 4497860"/>
-              <a:gd name="connsiteY3" fmla="*/ 0 h 1853513"/>
+              <a:gd name="connsiteY3" fmla="*/ 0 h 2855394"/>
               <a:gd name="connsiteX4" fmla="*/ 1979058 w 4497860"/>
-              <a:gd name="connsiteY4" fmla="*/ 0 h 1853513"/>
+              <a:gd name="connsiteY4" fmla="*/ 0 h 2855394"/>
               <a:gd name="connsiteX5" fmla="*/ 2631248 w 4497860"/>
-              <a:gd name="connsiteY5" fmla="*/ 0 h 1853513"/>
+              <a:gd name="connsiteY5" fmla="*/ 0 h 2855394"/>
               <a:gd name="connsiteX6" fmla="*/ 3058545 w 4497860"/>
-              <a:gd name="connsiteY6" fmla="*/ 0 h 1853513"/>
+              <a:gd name="connsiteY6" fmla="*/ 0 h 2855394"/>
               <a:gd name="connsiteX7" fmla="*/ 3530820 w 4497860"/>
-              <a:gd name="connsiteY7" fmla="*/ 0 h 1853513"/>
+              <a:gd name="connsiteY7" fmla="*/ 0 h 2855394"/>
               <a:gd name="connsiteX8" fmla="*/ 4003095 w 4497860"/>
-              <a:gd name="connsiteY8" fmla="*/ 0 h 1853513"/>
+              <a:gd name="connsiteY8" fmla="*/ 0 h 2855394"/>
               <a:gd name="connsiteX9" fmla="*/ 4497860 w 4497860"/>
-              <a:gd name="connsiteY9" fmla="*/ 0 h 1853513"/>
+              <a:gd name="connsiteY9" fmla="*/ 0 h 2855394"/>
               <a:gd name="connsiteX10" fmla="*/ 4497860 w 4497860"/>
-              <a:gd name="connsiteY10" fmla="*/ 463378 h 1853513"/>
+              <a:gd name="connsiteY10" fmla="*/ 571079 h 2855394"/>
               <a:gd name="connsiteX11" fmla="*/ 4497860 w 4497860"/>
-              <a:gd name="connsiteY11" fmla="*/ 908221 h 1853513"/>
+              <a:gd name="connsiteY11" fmla="*/ 1113604 h 2855394"/>
               <a:gd name="connsiteX12" fmla="*/ 4497860 w 4497860"/>
-              <a:gd name="connsiteY12" fmla="*/ 1371600 h 1853513"/>
+              <a:gd name="connsiteY12" fmla="*/ 1684682 h 2855394"/>
               <a:gd name="connsiteX13" fmla="*/ 4497860 w 4497860"/>
-              <a:gd name="connsiteY13" fmla="*/ 1853513 h 1853513"/>
-              <a:gd name="connsiteX14" fmla="*/ 4070563 w 4497860"/>
-              <a:gd name="connsiteY14" fmla="*/ 1853513 h 1853513"/>
-              <a:gd name="connsiteX15" fmla="*/ 3418374 w 4497860"/>
-              <a:gd name="connsiteY15" fmla="*/ 1853513 h 1853513"/>
-              <a:gd name="connsiteX16" fmla="*/ 2946098 w 4497860"/>
-              <a:gd name="connsiteY16" fmla="*/ 1853513 h 1853513"/>
-              <a:gd name="connsiteX17" fmla="*/ 2383866 w 4497860"/>
-              <a:gd name="connsiteY17" fmla="*/ 1853513 h 1853513"/>
-              <a:gd name="connsiteX18" fmla="*/ 1956569 w 4497860"/>
-              <a:gd name="connsiteY18" fmla="*/ 1853513 h 1853513"/>
-              <a:gd name="connsiteX19" fmla="*/ 1394337 w 4497860"/>
-              <a:gd name="connsiteY19" fmla="*/ 1853513 h 1853513"/>
-              <a:gd name="connsiteX20" fmla="*/ 787126 w 4497860"/>
-              <a:gd name="connsiteY20" fmla="*/ 1853513 h 1853513"/>
-              <a:gd name="connsiteX21" fmla="*/ 0 w 4497860"/>
-              <a:gd name="connsiteY21" fmla="*/ 1853513 h 1853513"/>
-              <a:gd name="connsiteX22" fmla="*/ 0 w 4497860"/>
-              <a:gd name="connsiteY22" fmla="*/ 1445740 h 1853513"/>
+              <a:gd name="connsiteY13" fmla="*/ 2198653 h 2855394"/>
+              <a:gd name="connsiteX14" fmla="*/ 4497860 w 4497860"/>
+              <a:gd name="connsiteY14" fmla="*/ 2855394 h 2855394"/>
+              <a:gd name="connsiteX15" fmla="*/ 3980606 w 4497860"/>
+              <a:gd name="connsiteY15" fmla="*/ 2855394 h 2855394"/>
+              <a:gd name="connsiteX16" fmla="*/ 3508331 w 4497860"/>
+              <a:gd name="connsiteY16" fmla="*/ 2855394 h 2855394"/>
+              <a:gd name="connsiteX17" fmla="*/ 2946098 w 4497860"/>
+              <a:gd name="connsiteY17" fmla="*/ 2855394 h 2855394"/>
+              <a:gd name="connsiteX18" fmla="*/ 2518802 w 4497860"/>
+              <a:gd name="connsiteY18" fmla="*/ 2855394 h 2855394"/>
+              <a:gd name="connsiteX19" fmla="*/ 1956569 w 4497860"/>
+              <a:gd name="connsiteY19" fmla="*/ 2855394 h 2855394"/>
+              <a:gd name="connsiteX20" fmla="*/ 1349358 w 4497860"/>
+              <a:gd name="connsiteY20" fmla="*/ 2855394 h 2855394"/>
+              <a:gd name="connsiteX21" fmla="*/ 922061 w 4497860"/>
+              <a:gd name="connsiteY21" fmla="*/ 2855394 h 2855394"/>
+              <a:gd name="connsiteX22" fmla="*/ 494765 w 4497860"/>
+              <a:gd name="connsiteY22" fmla="*/ 2855394 h 2855394"/>
               <a:gd name="connsiteX23" fmla="*/ 0 w 4497860"/>
-              <a:gd name="connsiteY23" fmla="*/ 963827 h 1853513"/>
+              <a:gd name="connsiteY23" fmla="*/ 2855394 h 2855394"/>
               <a:gd name="connsiteX24" fmla="*/ 0 w 4497860"/>
-              <a:gd name="connsiteY24" fmla="*/ 556054 h 1853513"/>
+              <a:gd name="connsiteY24" fmla="*/ 2255761 h 2855394"/>
               <a:gd name="connsiteX25" fmla="*/ 0 w 4497860"/>
-              <a:gd name="connsiteY25" fmla="*/ 0 h 1853513"/>
+              <a:gd name="connsiteY25" fmla="*/ 1741790 h 2855394"/>
+              <a:gd name="connsiteX26" fmla="*/ 0 w 4497860"/>
+              <a:gd name="connsiteY26" fmla="*/ 1199265 h 2855394"/>
+              <a:gd name="connsiteX27" fmla="*/ 0 w 4497860"/>
+              <a:gd name="connsiteY27" fmla="*/ 713848 h 2855394"/>
+              <a:gd name="connsiteX28" fmla="*/ 0 w 4497860"/>
+              <a:gd name="connsiteY28" fmla="*/ 0 h 2855394"/>
             </a:gdLst>
             <a:ahLst/>
             <a:cxnLst>
@@ -10814,10 +11018,19 @@
               <a:cxn ang="0">
                 <a:pos x="connsiteX25" y="connsiteY25"/>
               </a:cxn>
+              <a:cxn ang="0">
+                <a:pos x="connsiteX26" y="connsiteY26"/>
+              </a:cxn>
+              <a:cxn ang="0">
+                <a:pos x="connsiteX27" y="connsiteY27"/>
+              </a:cxn>
+              <a:cxn ang="0">
+                <a:pos x="connsiteX28" y="connsiteY28"/>
+              </a:cxn>
             </a:cxnLst>
             <a:rect l="l" t="t" r="r" b="b"/>
             <a:pathLst>
-              <a:path w="4497860" h="1853513" extrusionOk="0">
+              <a:path w="4497860" h="2855394" extrusionOk="0">
                 <a:moveTo>
                   <a:pt x="0" y="0"/>
                 </a:moveTo>
@@ -10867,83 +11080,98 @@
                   <a:pt x="4497860" y="0"/>
                 </a:cubicBezTo>
                 <a:cubicBezTo>
-                  <a:pt x="4497945" y="97629"/>
-                  <a:pt x="4463612" y="339729"/>
-                  <a:pt x="4497860" y="463378"/>
+                  <a:pt x="4499856" y="182242"/>
+                  <a:pt x="4447844" y="305515"/>
+                  <a:pt x="4497860" y="571079"/>
                 </a:cubicBezTo>
                 <a:cubicBezTo>
-                  <a:pt x="4532108" y="587027"/>
-                  <a:pt x="4468320" y="696559"/>
-                  <a:pt x="4497860" y="908221"/>
+                  <a:pt x="4547876" y="836643"/>
+                  <a:pt x="4497414" y="971049"/>
+                  <a:pt x="4497860" y="1113604"/>
                 </a:cubicBezTo>
                 <a:cubicBezTo>
-                  <a:pt x="4527400" y="1119883"/>
-                  <a:pt x="4490354" y="1154749"/>
-                  <a:pt x="4497860" y="1371600"/>
+                  <a:pt x="4498306" y="1256159"/>
+                  <a:pt x="4470201" y="1406161"/>
+                  <a:pt x="4497860" y="1684682"/>
                 </a:cubicBezTo>
                 <a:cubicBezTo>
-                  <a:pt x="4505366" y="1588451"/>
-                  <a:pt x="4453758" y="1750881"/>
-                  <a:pt x="4497860" y="1853513"/>
+                  <a:pt x="4525519" y="1963203"/>
+                  <a:pt x="4444066" y="2081361"/>
+                  <a:pt x="4497860" y="2198653"/>
                 </a:cubicBezTo>
                 <a:cubicBezTo>
-                  <a:pt x="4341028" y="1888501"/>
-                  <a:pt x="4191527" y="1833877"/>
-                  <a:pt x="4070563" y="1853513"/>
+                  <a:pt x="4551654" y="2315945"/>
+                  <a:pt x="4449115" y="2597964"/>
+                  <a:pt x="4497860" y="2855394"/>
                 </a:cubicBezTo>
                 <a:cubicBezTo>
-                  <a:pt x="3949599" y="1873149"/>
-                  <a:pt x="3689505" y="1780201"/>
-                  <a:pt x="3418374" y="1853513"/>
+                  <a:pt x="4378604" y="2910094"/>
+                  <a:pt x="4228851" y="2806855"/>
+                  <a:pt x="3980606" y="2855394"/>
                 </a:cubicBezTo>
                 <a:cubicBezTo>
-                  <a:pt x="3147243" y="1926825"/>
-                  <a:pt x="3170584" y="1822045"/>
-                  <a:pt x="2946098" y="1853513"/>
+                  <a:pt x="3732361" y="2903933"/>
+                  <a:pt x="3731261" y="2819525"/>
+                  <a:pt x="3508331" y="2855394"/>
                 </a:cubicBezTo>
                 <a:cubicBezTo>
-                  <a:pt x="2721612" y="1884981"/>
-                  <a:pt x="2580483" y="1851284"/>
-                  <a:pt x="2383866" y="1853513"/>
+                  <a:pt x="3285401" y="2891263"/>
+                  <a:pt x="3145454" y="2792410"/>
+                  <a:pt x="2946098" y="2855394"/>
                 </a:cubicBezTo>
                 <a:cubicBezTo>
-                  <a:pt x="2187249" y="1855742"/>
-                  <a:pt x="2055184" y="1831991"/>
-                  <a:pt x="1956569" y="1853513"/>
+                  <a:pt x="2746742" y="2918378"/>
+                  <a:pt x="2616674" y="2830086"/>
+                  <a:pt x="2518802" y="2855394"/>
                 </a:cubicBezTo>
                 <a:cubicBezTo>
-                  <a:pt x="1857954" y="1875035"/>
-                  <a:pt x="1586842" y="1801096"/>
-                  <a:pt x="1394337" y="1853513"/>
+                  <a:pt x="2420930" y="2880702"/>
+                  <a:pt x="2152085" y="2805383"/>
+                  <a:pt x="1956569" y="2855394"/>
                 </a:cubicBezTo>
                 <a:cubicBezTo>
-                  <a:pt x="1201832" y="1905930"/>
-                  <a:pt x="999904" y="1812059"/>
-                  <a:pt x="787126" y="1853513"/>
+                  <a:pt x="1761053" y="2905405"/>
+                  <a:pt x="1562136" y="2813940"/>
+                  <a:pt x="1349358" y="2855394"/>
                 </a:cubicBezTo>
                 <a:cubicBezTo>
-                  <a:pt x="574348" y="1894967"/>
-                  <a:pt x="247171" y="1840682"/>
-                  <a:pt x="0" y="1853513"/>
+                  <a:pt x="1136580" y="2896848"/>
+                  <a:pt x="1026929" y="2850873"/>
+                  <a:pt x="922061" y="2855394"/>
                 </a:cubicBezTo>
                 <a:cubicBezTo>
-                  <a:pt x="-2255" y="1686211"/>
-                  <a:pt x="15398" y="1629522"/>
-                  <a:pt x="0" y="1445740"/>
+                  <a:pt x="817193" y="2859915"/>
+                  <a:pt x="674003" y="2822991"/>
+                  <a:pt x="494765" y="2855394"/>
                 </a:cubicBezTo>
                 <a:cubicBezTo>
-                  <a:pt x="-15398" y="1261958"/>
-                  <a:pt x="24768" y="1133849"/>
-                  <a:pt x="0" y="963827"/>
+                  <a:pt x="315527" y="2887797"/>
+                  <a:pt x="163365" y="2852113"/>
+                  <a:pt x="0" y="2855394"/>
                 </a:cubicBezTo>
                 <a:cubicBezTo>
-                  <a:pt x="-24768" y="793805"/>
-                  <a:pt x="21348" y="649557"/>
-                  <a:pt x="0" y="556054"/>
+                  <a:pt x="-19303" y="2567042"/>
+                  <a:pt x="15941" y="2402054"/>
+                  <a:pt x="0" y="2255761"/>
                 </a:cubicBezTo>
                 <a:cubicBezTo>
-                  <a:pt x="-21348" y="462551"/>
-                  <a:pt x="32736" y="130581"/>
+                  <a:pt x="-15941" y="2109468"/>
+                  <a:pt x="34054" y="1976782"/>
+                  <a:pt x="0" y="1741790"/>
+                </a:cubicBezTo>
+                <a:cubicBezTo>
+                  <a:pt x="-34054" y="1506798"/>
+                  <a:pt x="41841" y="1336691"/>
+                  <a:pt x="0" y="1199265"/>
+                </a:cubicBezTo>
+                <a:cubicBezTo>
+                  <a:pt x="-41841" y="1061840"/>
+                  <a:pt x="9779" y="925541"/>
+                  <a:pt x="0" y="713848"/>
+                </a:cubicBezTo>
+                <a:cubicBezTo>
+                  <a:pt x="-9779" y="502155"/>
+                  <a:pt x="40010" y="238541"/>
                   <a:pt x="0" y="0"/>
                 </a:cubicBezTo>
                 <a:close/>
@@ -11005,7 +11233,7 @@
         </p:nvSpPr>
         <p:spPr>
           <a:xfrm>
-            <a:off x="4431956" y="5448123"/>
+            <a:off x="4355420" y="5856068"/>
             <a:ext cx="2817340" cy="369332"/>
           </a:xfrm>
           <a:prstGeom prst="rect">
@@ -11022,6 +11250,56 @@
             <a:r>
               <a:rPr lang="en-US" dirty="0"/>
               <a:t>Requires authentication</a:t>
+            </a:r>
+            <a:endParaRPr lang="en-SE" dirty="0"/>
+          </a:p>
+        </p:txBody>
+      </p:sp>
+      <p:sp>
+        <p:nvSpPr>
+          <p:cNvPr id="7" name="Rectangle: Rounded Corners 6">
+            <a:extLst>
+              <a:ext uri="{FF2B5EF4-FFF2-40B4-BE49-F238E27FC236}">
+                <a16:creationId xmlns:a16="http://schemas.microsoft.com/office/drawing/2014/main" id="{4A35D49E-D8E1-D8F2-49F7-56A2BC8E3435}"/>
+              </a:ext>
+            </a:extLst>
+          </p:cNvPr>
+          <p:cNvSpPr/>
+          <p:nvPr/>
+        </p:nvSpPr>
+        <p:spPr>
+          <a:xfrm>
+            <a:off x="3557845" y="4965674"/>
+            <a:ext cx="4054818" cy="622780"/>
+          </a:xfrm>
+          <a:prstGeom prst="roundRect">
+            <a:avLst/>
+          </a:prstGeom>
+        </p:spPr>
+        <p:style>
+          <a:lnRef idx="2">
+            <a:schemeClr val="accent6">
+              <a:shade val="15000"/>
+            </a:schemeClr>
+          </a:lnRef>
+          <a:fillRef idx="1">
+            <a:schemeClr val="accent6"/>
+          </a:fillRef>
+          <a:effectRef idx="0">
+            <a:schemeClr val="accent6"/>
+          </a:effectRef>
+          <a:fontRef idx="minor">
+            <a:schemeClr val="lt1"/>
+          </a:fontRef>
+        </p:style>
+        <p:txBody>
+          <a:bodyPr rtlCol="0" anchor="ctr"/>
+          <a:lstStyle/>
+          <a:p>
+            <a:pPr algn="ctr"/>
+            <a:r>
+              <a:rPr lang="en-US" dirty="0"/>
+              <a:t>Subscription (POST, PUT, GET, DELETE)</a:t>
             </a:r>
             <a:endParaRPr lang="en-SE" dirty="0"/>
           </a:p>

</xml_diff>

<commit_message>
Updating phpID request model in documentation
</commit_message>
<xml_diff>
--- a/ImplementationGuideImages.pptx
+++ b/ImplementationGuideImages.pptx
@@ -268,7 +268,7 @@
           <a:p>
             <a:fld id="{6B5A8AD0-4133-444B-956D-B3352209FA33}" type="datetimeFigureOut">
               <a:rPr lang="en-SE" smtClean="0"/>
-              <a:t>2024-10-04</a:t>
+              <a:t>2025-03-11</a:t>
             </a:fld>
             <a:endParaRPr lang="en-SE"/>
           </a:p>
@@ -468,7 +468,7 @@
           <a:p>
             <a:fld id="{6B5A8AD0-4133-444B-956D-B3352209FA33}" type="datetimeFigureOut">
               <a:rPr lang="en-SE" smtClean="0"/>
-              <a:t>2024-10-04</a:t>
+              <a:t>2025-03-11</a:t>
             </a:fld>
             <a:endParaRPr lang="en-SE"/>
           </a:p>
@@ -678,7 +678,7 @@
           <a:p>
             <a:fld id="{6B5A8AD0-4133-444B-956D-B3352209FA33}" type="datetimeFigureOut">
               <a:rPr lang="en-SE" smtClean="0"/>
-              <a:t>2024-10-04</a:t>
+              <a:t>2025-03-11</a:t>
             </a:fld>
             <a:endParaRPr lang="en-SE"/>
           </a:p>
@@ -878,7 +878,7 @@
           <a:p>
             <a:fld id="{6B5A8AD0-4133-444B-956D-B3352209FA33}" type="datetimeFigureOut">
               <a:rPr lang="en-SE" smtClean="0"/>
-              <a:t>2024-10-04</a:t>
+              <a:t>2025-03-11</a:t>
             </a:fld>
             <a:endParaRPr lang="en-SE"/>
           </a:p>
@@ -1154,7 +1154,7 @@
           <a:p>
             <a:fld id="{6B5A8AD0-4133-444B-956D-B3352209FA33}" type="datetimeFigureOut">
               <a:rPr lang="en-SE" smtClean="0"/>
-              <a:t>2024-10-04</a:t>
+              <a:t>2025-03-11</a:t>
             </a:fld>
             <a:endParaRPr lang="en-SE"/>
           </a:p>
@@ -1422,7 +1422,7 @@
           <a:p>
             <a:fld id="{6B5A8AD0-4133-444B-956D-B3352209FA33}" type="datetimeFigureOut">
               <a:rPr lang="en-SE" smtClean="0"/>
-              <a:t>2024-10-04</a:t>
+              <a:t>2025-03-11</a:t>
             </a:fld>
             <a:endParaRPr lang="en-SE"/>
           </a:p>
@@ -1837,7 +1837,7 @@
           <a:p>
             <a:fld id="{6B5A8AD0-4133-444B-956D-B3352209FA33}" type="datetimeFigureOut">
               <a:rPr lang="en-SE" smtClean="0"/>
-              <a:t>2024-10-04</a:t>
+              <a:t>2025-03-11</a:t>
             </a:fld>
             <a:endParaRPr lang="en-SE"/>
           </a:p>
@@ -1979,7 +1979,7 @@
           <a:p>
             <a:fld id="{6B5A8AD0-4133-444B-956D-B3352209FA33}" type="datetimeFigureOut">
               <a:rPr lang="en-SE" smtClean="0"/>
-              <a:t>2024-10-04</a:t>
+              <a:t>2025-03-11</a:t>
             </a:fld>
             <a:endParaRPr lang="en-SE"/>
           </a:p>
@@ -2092,7 +2092,7 @@
           <a:p>
             <a:fld id="{6B5A8AD0-4133-444B-956D-B3352209FA33}" type="datetimeFigureOut">
               <a:rPr lang="en-SE" smtClean="0"/>
-              <a:t>2024-10-04</a:t>
+              <a:t>2025-03-11</a:t>
             </a:fld>
             <a:endParaRPr lang="en-SE"/>
           </a:p>
@@ -2405,7 +2405,7 @@
           <a:p>
             <a:fld id="{6B5A8AD0-4133-444B-956D-B3352209FA33}" type="datetimeFigureOut">
               <a:rPr lang="en-SE" smtClean="0"/>
-              <a:t>2024-10-04</a:t>
+              <a:t>2025-03-11</a:t>
             </a:fld>
             <a:endParaRPr lang="en-SE"/>
           </a:p>
@@ -2694,7 +2694,7 @@
           <a:p>
             <a:fld id="{6B5A8AD0-4133-444B-956D-B3352209FA33}" type="datetimeFigureOut">
               <a:rPr lang="en-SE" smtClean="0"/>
-              <a:t>2024-10-04</a:t>
+              <a:t>2025-03-11</a:t>
             </a:fld>
             <a:endParaRPr lang="en-SE"/>
           </a:p>
@@ -2937,7 +2937,7 @@
           <a:p>
             <a:fld id="{6B5A8AD0-4133-444B-956D-B3352209FA33}" type="datetimeFigureOut">
               <a:rPr lang="en-SE" smtClean="0"/>
-              <a:t>2024-10-04</a:t>
+              <a:t>2025-03-11</a:t>
             </a:fld>
             <a:endParaRPr lang="en-SE"/>
           </a:p>
@@ -3956,7 +3956,7 @@
         </p:nvSpPr>
         <p:spPr>
           <a:xfrm>
-            <a:off x="9092636" y="1809562"/>
+            <a:off x="4711777" y="574174"/>
             <a:ext cx="2237327" cy="622780"/>
           </a:xfrm>
           <a:prstGeom prst="roundRect">
@@ -4049,7 +4049,7 @@
         </p:nvSpPr>
         <p:spPr>
           <a:xfrm>
-            <a:off x="9092636" y="2711025"/>
+            <a:off x="8885556" y="1498171"/>
             <a:ext cx="2237327" cy="622780"/>
           </a:xfrm>
           <a:prstGeom prst="roundRect">
@@ -4140,7 +4140,7 @@
         </p:nvSpPr>
         <p:spPr>
           <a:xfrm>
-            <a:off x="9116473" y="3612488"/>
+            <a:off x="8885556" y="2355691"/>
             <a:ext cx="2237327" cy="622780"/>
           </a:xfrm>
           <a:prstGeom prst="roundRect">
@@ -4206,6 +4206,261 @@
               <a:ea typeface="+mn-ea"/>
               <a:cs typeface="+mn-cs"/>
             </a:endParaRPr>
+          </a:p>
+        </p:txBody>
+      </p:sp>
+      <p:sp>
+        <p:nvSpPr>
+          <p:cNvPr id="2" name="Rectangle: Rounded Corners 1">
+            <a:extLst>
+              <a:ext uri="{FF2B5EF4-FFF2-40B4-BE49-F238E27FC236}">
+                <a16:creationId xmlns:a16="http://schemas.microsoft.com/office/drawing/2014/main" id="{637C87A4-81C0-43FF-7694-F9426BB4F9C2}"/>
+              </a:ext>
+            </a:extLst>
+          </p:cNvPr>
+          <p:cNvSpPr/>
+          <p:nvPr/>
+        </p:nvSpPr>
+        <p:spPr>
+          <a:xfrm>
+            <a:off x="1536388" y="578202"/>
+            <a:ext cx="2237327" cy="622780"/>
+          </a:xfrm>
+          <a:prstGeom prst="roundRect">
+            <a:avLst/>
+          </a:prstGeom>
+          <a:ln/>
+        </p:spPr>
+        <p:style>
+          <a:lnRef idx="2">
+            <a:schemeClr val="accent6">
+              <a:shade val="15000"/>
+            </a:schemeClr>
+          </a:lnRef>
+          <a:fillRef idx="1">
+            <a:schemeClr val="accent6"/>
+          </a:fillRef>
+          <a:effectRef idx="0">
+            <a:schemeClr val="accent6"/>
+          </a:effectRef>
+          <a:fontRef idx="minor">
+            <a:schemeClr val="lt1"/>
+          </a:fontRef>
+        </p:style>
+        <p:txBody>
+          <a:bodyPr rtlCol="0" anchor="ctr"/>
+          <a:lstStyle/>
+          <a:p>
+            <a:pPr marL="0" marR="0" lvl="0" indent="0" algn="ctr" defTabSz="914400" eaLnBrk="1" fontAlgn="auto" latinLnBrk="0" hangingPunct="1">
+              <a:lnSpc>
+                <a:spcPct val="100000"/>
+              </a:lnSpc>
+              <a:spcBef>
+                <a:spcPts val="0"/>
+              </a:spcBef>
+              <a:spcAft>
+                <a:spcPts val="0"/>
+              </a:spcAft>
+              <a:buClrTx/>
+              <a:buSzTx/>
+              <a:buFontTx/>
+              <a:buNone/>
+              <a:tabLst/>
+              <a:defRPr/>
+            </a:pPr>
+            <a:r>
+              <a:rPr kumimoji="0" lang="en-US" sz="1800" b="0" i="0" u="none" strike="noStrike" kern="0" cap="none" spc="0" normalizeH="0" baseline="0" noProof="0" dirty="0">
+                <a:ln>
+                  <a:noFill/>
+                </a:ln>
+                <a:solidFill>
+                  <a:srgbClr val="FFFFFF"/>
+                </a:solidFill>
+                <a:effectLst/>
+                <a:uLnTx/>
+                <a:uFillTx/>
+                <a:latin typeface="Calibri" panose="020F0502020204030204"/>
+                <a:ea typeface="+mn-ea"/>
+                <a:cs typeface="+mn-cs"/>
+              </a:rPr>
+              <a:t>Regulated Authorization</a:t>
+            </a:r>
+            <a:endParaRPr kumimoji="0" lang="en-SE" sz="1800" b="0" i="0" u="none" strike="noStrike" kern="0" cap="none" spc="0" normalizeH="0" baseline="0" noProof="0" dirty="0">
+              <a:ln>
+                <a:noFill/>
+              </a:ln>
+              <a:solidFill>
+                <a:srgbClr val="FFFFFF"/>
+              </a:solidFill>
+              <a:effectLst/>
+              <a:uLnTx/>
+              <a:uFillTx/>
+              <a:latin typeface="Calibri" panose="020F0502020204030204"/>
+              <a:ea typeface="+mn-ea"/>
+              <a:cs typeface="+mn-cs"/>
+            </a:endParaRPr>
+          </a:p>
+        </p:txBody>
+      </p:sp>
+      <p:cxnSp>
+        <p:nvCxnSpPr>
+          <p:cNvPr id="3" name="Connector: Elbow 2">
+            <a:extLst>
+              <a:ext uri="{FF2B5EF4-FFF2-40B4-BE49-F238E27FC236}">
+                <a16:creationId xmlns:a16="http://schemas.microsoft.com/office/drawing/2014/main" id="{3402D6B7-4E68-F41D-5186-3E895AE5C6AF}"/>
+              </a:ext>
+            </a:extLst>
+          </p:cNvPr>
+          <p:cNvCxnSpPr>
+            <a:cxnSpLocks/>
+            <a:stCxn id="2" idx="2"/>
+            <a:endCxn id="4" idx="0"/>
+          </p:cNvCxnSpPr>
+          <p:nvPr/>
+        </p:nvCxnSpPr>
+        <p:spPr>
+          <a:xfrm rot="16200000" flipH="1">
+            <a:off x="2351031" y="1505003"/>
+            <a:ext cx="608580" cy="538"/>
+          </a:xfrm>
+          <a:prstGeom prst="bentConnector3">
+            <a:avLst>
+              <a:gd name="adj1" fmla="val 50000"/>
+            </a:avLst>
+          </a:prstGeom>
+          <a:ln w="25400">
+            <a:tailEnd type="triangle"/>
+          </a:ln>
+        </p:spPr>
+        <p:style>
+          <a:lnRef idx="1">
+            <a:schemeClr val="accent1"/>
+          </a:lnRef>
+          <a:fillRef idx="0">
+            <a:schemeClr val="accent1"/>
+          </a:fillRef>
+          <a:effectRef idx="0">
+            <a:schemeClr val="accent1"/>
+          </a:effectRef>
+          <a:fontRef idx="minor">
+            <a:schemeClr val="tx1"/>
+          </a:fontRef>
+        </p:style>
+      </p:cxnSp>
+      <p:sp>
+        <p:nvSpPr>
+          <p:cNvPr id="21" name="TextBox 20">
+            <a:extLst>
+              <a:ext uri="{FF2B5EF4-FFF2-40B4-BE49-F238E27FC236}">
+                <a16:creationId xmlns:a16="http://schemas.microsoft.com/office/drawing/2014/main" id="{16962290-717D-13A5-FDF7-E02EF4FB6A7A}"/>
+              </a:ext>
+            </a:extLst>
+          </p:cNvPr>
+          <p:cNvSpPr txBox="1"/>
+          <p:nvPr/>
+        </p:nvSpPr>
+        <p:spPr>
+          <a:xfrm>
+            <a:off x="2655051" y="1278816"/>
+            <a:ext cx="945616" cy="369332"/>
+          </a:xfrm>
+          <a:prstGeom prst="rect">
+            <a:avLst/>
+          </a:prstGeom>
+          <a:noFill/>
+        </p:spPr>
+        <p:txBody>
+          <a:bodyPr wrap="square" rtlCol="0">
+            <a:spAutoFit/>
+          </a:bodyPr>
+          <a:lstStyle/>
+          <a:p>
+            <a:r>
+              <a:rPr lang="en-US" dirty="0"/>
+              <a:t>subject</a:t>
+            </a:r>
+            <a:endParaRPr lang="en-SE" dirty="0"/>
+          </a:p>
+        </p:txBody>
+      </p:sp>
+      <p:cxnSp>
+        <p:nvCxnSpPr>
+          <p:cNvPr id="22" name="Connector: Elbow 21">
+            <a:extLst>
+              <a:ext uri="{FF2B5EF4-FFF2-40B4-BE49-F238E27FC236}">
+                <a16:creationId xmlns:a16="http://schemas.microsoft.com/office/drawing/2014/main" id="{A44F89B8-55F2-5271-F34F-D9707A020210}"/>
+              </a:ext>
+            </a:extLst>
+          </p:cNvPr>
+          <p:cNvCxnSpPr>
+            <a:cxnSpLocks/>
+            <a:stCxn id="2" idx="3"/>
+            <a:endCxn id="14" idx="1"/>
+          </p:cNvCxnSpPr>
+          <p:nvPr/>
+        </p:nvCxnSpPr>
+        <p:spPr>
+          <a:xfrm flipV="1">
+            <a:off x="3773715" y="885564"/>
+            <a:ext cx="938062" cy="4028"/>
+          </a:xfrm>
+          <a:prstGeom prst="bentConnector3">
+            <a:avLst>
+              <a:gd name="adj1" fmla="val 50000"/>
+            </a:avLst>
+          </a:prstGeom>
+          <a:ln w="25400">
+            <a:tailEnd type="triangle"/>
+          </a:ln>
+        </p:spPr>
+        <p:style>
+          <a:lnRef idx="1">
+            <a:schemeClr val="accent1"/>
+          </a:lnRef>
+          <a:fillRef idx="0">
+            <a:schemeClr val="accent1"/>
+          </a:fillRef>
+          <a:effectRef idx="0">
+            <a:schemeClr val="accent1"/>
+          </a:effectRef>
+          <a:fontRef idx="minor">
+            <a:schemeClr val="tx1"/>
+          </a:fontRef>
+        </p:style>
+      </p:cxnSp>
+      <p:sp>
+        <p:nvSpPr>
+          <p:cNvPr id="26" name="TextBox 25">
+            <a:extLst>
+              <a:ext uri="{FF2B5EF4-FFF2-40B4-BE49-F238E27FC236}">
+                <a16:creationId xmlns:a16="http://schemas.microsoft.com/office/drawing/2014/main" id="{7341B0C2-51DD-099C-D487-2F984833B29F}"/>
+              </a:ext>
+            </a:extLst>
+          </p:cNvPr>
+          <p:cNvSpPr txBox="1"/>
+          <p:nvPr/>
+        </p:nvSpPr>
+        <p:spPr>
+          <a:xfrm>
+            <a:off x="3861430" y="516233"/>
+            <a:ext cx="945616" cy="369332"/>
+          </a:xfrm>
+          <a:prstGeom prst="rect">
+            <a:avLst/>
+          </a:prstGeom>
+          <a:noFill/>
+        </p:spPr>
+        <p:txBody>
+          <a:bodyPr wrap="square" rtlCol="0">
+            <a:spAutoFit/>
+          </a:bodyPr>
+          <a:lstStyle/>
+          <a:p>
+            <a:r>
+              <a:rPr lang="en-US" dirty="0"/>
+              <a:t>holder</a:t>
+            </a:r>
+            <a:endParaRPr lang="en-SE" dirty="0"/>
           </a:p>
         </p:txBody>
       </p:sp>
@@ -4323,6 +4578,33 @@
                                   </p:childTnLst>
                                 </p:cTn>
                               </p:par>
+                              <p:par>
+                                <p:cTn id="11" presetID="1" presetClass="entr" presetSubtype="0" fill="hold" grpId="0" nodeType="withEffect">
+                                  <p:stCondLst>
+                                    <p:cond delay="0"/>
+                                  </p:stCondLst>
+                                  <p:childTnLst>
+                                    <p:set>
+                                      <p:cBhvr>
+                                        <p:cTn id="12" dur="1" fill="hold">
+                                          <p:stCondLst>
+                                            <p:cond delay="0"/>
+                                          </p:stCondLst>
+                                        </p:cTn>
+                                        <p:tgtEl>
+                                          <p:spTgt spid="2"/>
+                                        </p:tgtEl>
+                                        <p:attrNameLst>
+                                          <p:attrName>style.visibility</p:attrName>
+                                        </p:attrNameLst>
+                                      </p:cBhvr>
+                                      <p:to>
+                                        <p:strVal val="visible"/>
+                                      </p:to>
+                                    </p:set>
+                                  </p:childTnLst>
+                                </p:cTn>
+                              </p:par>
                             </p:childTnLst>
                           </p:cTn>
                         </p:par>
@@ -4354,6 +4636,7 @@
       <p:bldP spid="14" grpId="0" animBg="1"/>
       <p:bldP spid="16" grpId="0" animBg="1"/>
       <p:bldP spid="19" grpId="0" animBg="1"/>
+      <p:bldP spid="2" grpId="0" animBg="1"/>
     </p:bldLst>
   </p:timing>
 </p:sld>
@@ -7860,8 +8143,8 @@
         </p:nvSpPr>
         <p:spPr>
           <a:xfrm>
-            <a:off x="882949" y="2916198"/>
-            <a:ext cx="3626232" cy="3007947"/>
+            <a:off x="882949" y="2279960"/>
+            <a:ext cx="3626232" cy="3644186"/>
           </a:xfrm>
           <a:prstGeom prst="roundRect">
             <a:avLst/>
@@ -7918,6 +8201,31 @@
               </a:rPr>
               <a:t>Task</a:t>
             </a:r>
+          </a:p>
+          <a:p>
+            <a:pPr marL="0" marR="0" lvl="0" indent="0" algn="ctr" defTabSz="914400" eaLnBrk="1" fontAlgn="auto" latinLnBrk="0" hangingPunct="1">
+              <a:lnSpc>
+                <a:spcPct val="100000"/>
+              </a:lnSpc>
+              <a:spcBef>
+                <a:spcPts val="0"/>
+              </a:spcBef>
+              <a:spcAft>
+                <a:spcPts val="0"/>
+              </a:spcAft>
+              <a:buClrTx/>
+              <a:buSzTx/>
+              <a:buFontTx/>
+              <a:buNone/>
+              <a:tabLst/>
+              <a:defRPr/>
+            </a:pPr>
+            <a:endParaRPr lang="en-US" kern="0" dirty="0">
+              <a:solidFill>
+                <a:srgbClr val="FFFFFF"/>
+              </a:solidFill>
+              <a:latin typeface="Calibri" panose="020F0502020204030204"/>
+            </a:endParaRPr>
           </a:p>
           <a:p>
             <a:pPr marL="0" marR="0" lvl="0" indent="0" algn="ctr" defTabSz="914400" eaLnBrk="1" fontAlgn="auto" latinLnBrk="0" hangingPunct="1">
@@ -8135,6 +8443,72 @@
               <a:tabLst/>
               <a:defRPr/>
             </a:pPr>
+            <a:endParaRPr kumimoji="0" lang="en-US" sz="1800" b="0" i="0" u="none" strike="noStrike" kern="0" cap="none" spc="0" normalizeH="0" baseline="0" noProof="0" dirty="0">
+              <a:ln>
+                <a:noFill/>
+              </a:ln>
+              <a:solidFill>
+                <a:srgbClr val="FFFFFF"/>
+              </a:solidFill>
+              <a:effectLst/>
+              <a:uLnTx/>
+              <a:uFillTx/>
+              <a:latin typeface="Calibri" panose="020F0502020204030204"/>
+              <a:ea typeface="+mn-ea"/>
+              <a:cs typeface="+mn-cs"/>
+            </a:endParaRPr>
+          </a:p>
+          <a:p>
+            <a:pPr marL="0" marR="0" lvl="0" indent="0" algn="ctr" defTabSz="914400" eaLnBrk="1" fontAlgn="auto" latinLnBrk="0" hangingPunct="1">
+              <a:lnSpc>
+                <a:spcPct val="100000"/>
+              </a:lnSpc>
+              <a:spcBef>
+                <a:spcPts val="0"/>
+              </a:spcBef>
+              <a:spcAft>
+                <a:spcPts val="0"/>
+              </a:spcAft>
+              <a:buClrTx/>
+              <a:buSzTx/>
+              <a:buFontTx/>
+              <a:buNone/>
+              <a:tabLst/>
+              <a:defRPr/>
+            </a:pPr>
+            <a:endParaRPr kumimoji="0" lang="en-US" sz="1800" b="0" i="0" u="none" strike="noStrike" kern="0" cap="none" spc="0" normalizeH="0" baseline="0" noProof="0" dirty="0">
+              <a:ln>
+                <a:noFill/>
+              </a:ln>
+              <a:solidFill>
+                <a:srgbClr val="FFFFFF"/>
+              </a:solidFill>
+              <a:effectLst/>
+              <a:uLnTx/>
+              <a:uFillTx/>
+              <a:latin typeface="Calibri" panose="020F0502020204030204"/>
+              <a:ea typeface="+mn-ea"/>
+              <a:cs typeface="+mn-cs"/>
+            </a:endParaRPr>
+          </a:p>
+          <a:p>
+            <a:pPr marL="0" marR="0" lvl="0" indent="0" algn="ctr" defTabSz="914400" eaLnBrk="1" fontAlgn="auto" latinLnBrk="0" hangingPunct="1">
+              <a:lnSpc>
+                <a:spcPct val="100000"/>
+              </a:lnSpc>
+              <a:spcBef>
+                <a:spcPts val="0"/>
+              </a:spcBef>
+              <a:spcAft>
+                <a:spcPts val="0"/>
+              </a:spcAft>
+              <a:buClrTx/>
+              <a:buSzTx/>
+              <a:buFontTx/>
+              <a:buNone/>
+              <a:tabLst/>
+              <a:defRPr/>
+            </a:pPr>
             <a:endParaRPr kumimoji="0" lang="en-SE" sz="1800" b="0" i="0" u="none" strike="noStrike" kern="0" cap="none" spc="0" normalizeH="0" baseline="0" noProof="0" dirty="0">
               <a:ln>
                 <a:noFill/>
@@ -8710,7 +9084,7 @@
         </p:nvSpPr>
         <p:spPr>
           <a:xfrm>
-            <a:off x="1131596" y="3645189"/>
+            <a:off x="1104689" y="2893943"/>
             <a:ext cx="3172945" cy="622780"/>
           </a:xfrm>
           <a:prstGeom prst="roundRect">
@@ -8850,7 +9224,7 @@
         </p:nvSpPr>
         <p:spPr>
           <a:xfrm>
-            <a:off x="1614518" y="4379435"/>
+            <a:off x="1517096" y="3601892"/>
             <a:ext cx="2227251" cy="622780"/>
           </a:xfrm>
           <a:prstGeom prst="roundRect">
@@ -9172,7 +9546,7 @@
         </p:nvSpPr>
         <p:spPr>
           <a:xfrm>
-            <a:off x="925172" y="4350627"/>
+            <a:off x="931342" y="4003545"/>
             <a:ext cx="597159" cy="547943"/>
           </a:xfrm>
           <a:prstGeom prst="ellipse">
@@ -9236,7 +9610,7 @@
         </p:nvSpPr>
         <p:spPr>
           <a:xfrm>
-            <a:off x="2893805" y="2549662"/>
+            <a:off x="2881721" y="2010370"/>
             <a:ext cx="597159" cy="547943"/>
           </a:xfrm>
           <a:prstGeom prst="ellipse">
@@ -9705,6 +10079,99 @@
                 <a:cs typeface="+mn-cs"/>
               </a:rPr>
               <a:t> Auth Holder</a:t>
+            </a:r>
+            <a:endParaRPr kumimoji="0" lang="en-SE" sz="1400" b="0" i="0" u="none" strike="noStrike" kern="0" cap="none" spc="0" normalizeH="0" baseline="0" noProof="0" dirty="0">
+              <a:ln>
+                <a:noFill/>
+              </a:ln>
+              <a:solidFill>
+                <a:srgbClr val="FFFFFF"/>
+              </a:solidFill>
+              <a:effectLst/>
+              <a:uLnTx/>
+              <a:uFillTx/>
+              <a:latin typeface="Calibri" panose="020F0502020204030204"/>
+              <a:ea typeface="+mn-ea"/>
+              <a:cs typeface="+mn-cs"/>
+            </a:endParaRPr>
+          </a:p>
+        </p:txBody>
+      </p:sp>
+      <p:sp>
+        <p:nvSpPr>
+          <p:cNvPr id="9" name="Rectangle: Rounded Corners 8">
+            <a:extLst>
+              <a:ext uri="{FF2B5EF4-FFF2-40B4-BE49-F238E27FC236}">
+                <a16:creationId xmlns:a16="http://schemas.microsoft.com/office/drawing/2014/main" id="{0CD28A1C-FF21-ED70-C1AC-39C9C3446FA5}"/>
+              </a:ext>
+            </a:extLst>
+          </p:cNvPr>
+          <p:cNvSpPr/>
+          <p:nvPr/>
+        </p:nvSpPr>
+        <p:spPr>
+          <a:xfrm>
+            <a:off x="1604442" y="4373411"/>
+            <a:ext cx="2237327" cy="622780"/>
+          </a:xfrm>
+          <a:prstGeom prst="roundRect">
+            <a:avLst/>
+          </a:prstGeom>
+          <a:ln/>
+        </p:spPr>
+        <p:style>
+          <a:lnRef idx="2">
+            <a:schemeClr val="accent6">
+              <a:shade val="15000"/>
+            </a:schemeClr>
+          </a:lnRef>
+          <a:fillRef idx="1">
+            <a:schemeClr val="accent6"/>
+          </a:fillRef>
+          <a:effectRef idx="0">
+            <a:schemeClr val="accent6"/>
+          </a:effectRef>
+          <a:fontRef idx="minor">
+            <a:schemeClr val="lt1"/>
+          </a:fontRef>
+        </p:style>
+        <p:txBody>
+          <a:bodyPr rtlCol="0" anchor="ctr"/>
+          <a:lstStyle/>
+          <a:p>
+            <a:pPr marL="0" marR="0" lvl="0" indent="0" algn="ctr" defTabSz="914400" eaLnBrk="1" fontAlgn="auto" latinLnBrk="0" hangingPunct="1">
+              <a:lnSpc>
+                <a:spcPct val="100000"/>
+              </a:lnSpc>
+              <a:spcBef>
+                <a:spcPts val="0"/>
+              </a:spcBef>
+              <a:spcAft>
+                <a:spcPts val="0"/>
+              </a:spcAft>
+              <a:buClrTx/>
+              <a:buSzTx/>
+              <a:buFontTx/>
+              <a:buNone/>
+              <a:tabLst/>
+              <a:defRPr/>
+            </a:pPr>
+            <a:r>
+              <a:rPr kumimoji="0" lang="en-US" sz="1800" b="0" i="0" u="none" strike="noStrike" kern="0" cap="none" spc="0" normalizeH="0" baseline="0" noProof="0" dirty="0">
+                <a:ln>
+                  <a:noFill/>
+                </a:ln>
+                <a:solidFill>
+                  <a:srgbClr val="FFFFFF"/>
+                </a:solidFill>
+                <a:effectLst/>
+                <a:uLnTx/>
+                <a:uFillTx/>
+                <a:latin typeface="Calibri" panose="020F0502020204030204"/>
+                <a:ea typeface="+mn-ea"/>
+                <a:cs typeface="+mn-cs"/>
+              </a:rPr>
+              <a:t>Regulated Authorization</a:t>
             </a:r>
             <a:endParaRPr kumimoji="0" lang="en-SE" sz="1400" b="0" i="0" u="none" strike="noStrike" kern="0" cap="none" spc="0" normalizeH="0" baseline="0" noProof="0" dirty="0">
               <a:ln>
@@ -10257,6 +10724,33 @@
                                   </p:childTnLst>
                                 </p:cTn>
                               </p:par>
+                              <p:par>
+                                <p:cTn id="45" presetID="1" presetClass="entr" presetSubtype="0" fill="hold" grpId="0" nodeType="withEffect">
+                                  <p:stCondLst>
+                                    <p:cond delay="0"/>
+                                  </p:stCondLst>
+                                  <p:childTnLst>
+                                    <p:set>
+                                      <p:cBhvr>
+                                        <p:cTn id="46" dur="1" fill="hold">
+                                          <p:stCondLst>
+                                            <p:cond delay="0"/>
+                                          </p:stCondLst>
+                                        </p:cTn>
+                                        <p:tgtEl>
+                                          <p:spTgt spid="9"/>
+                                        </p:tgtEl>
+                                        <p:attrNameLst>
+                                          <p:attrName>style.visibility</p:attrName>
+                                        </p:attrNameLst>
+                                      </p:cBhvr>
+                                      <p:to>
+                                        <p:strVal val="visible"/>
+                                      </p:to>
+                                    </p:set>
+                                  </p:childTnLst>
+                                </p:cTn>
+                              </p:par>
                             </p:childTnLst>
                           </p:cTn>
                         </p:par>
@@ -10296,6 +10790,7 @@
       <p:bldP spid="34" grpId="0" animBg="1"/>
       <p:bldP spid="35" grpId="0"/>
       <p:bldP spid="10" grpId="0" animBg="1"/>
+      <p:bldP spid="9" grpId="0" animBg="1"/>
     </p:bldLst>
   </p:timing>
 </p:sld>
@@ -12805,7 +13300,7 @@
         </p:nvSpPr>
         <p:spPr>
           <a:xfrm>
-            <a:off x="7439673" y="149702"/>
+            <a:off x="9566559" y="161786"/>
             <a:ext cx="2509485" cy="998349"/>
           </a:xfrm>
           <a:prstGeom prst="roundRect">
@@ -13055,15 +13550,15 @@
           </p:cNvPr>
           <p:cNvCxnSpPr>
             <a:cxnSpLocks/>
-            <a:stCxn id="4" idx="3"/>
+            <a:stCxn id="3" idx="3"/>
             <a:endCxn id="2" idx="1"/>
           </p:cNvCxnSpPr>
           <p:nvPr/>
         </p:nvCxnSpPr>
         <p:spPr>
           <a:xfrm flipV="1">
-            <a:off x="6582870" y="648877"/>
-            <a:ext cx="856803" cy="1382224"/>
+            <a:off x="9220536" y="660961"/>
+            <a:ext cx="346023" cy="39771"/>
           </a:xfrm>
           <a:prstGeom prst="bentConnector3">
             <a:avLst>
@@ -13154,6 +13649,247 @@
           <a:xfrm rot="5400000">
             <a:off x="9597450" y="3203194"/>
             <a:ext cx="216943" cy="1"/>
+          </a:xfrm>
+          <a:prstGeom prst="bentConnector3">
+            <a:avLst>
+              <a:gd name="adj1" fmla="val 50000"/>
+            </a:avLst>
+          </a:prstGeom>
+          <a:ln w="38100">
+            <a:tailEnd type="triangle"/>
+          </a:ln>
+        </p:spPr>
+        <p:style>
+          <a:lnRef idx="1">
+            <a:schemeClr val="accent1"/>
+          </a:lnRef>
+          <a:fillRef idx="0">
+            <a:schemeClr val="accent1"/>
+          </a:fillRef>
+          <a:effectRef idx="0">
+            <a:schemeClr val="accent1"/>
+          </a:effectRef>
+          <a:fontRef idx="minor">
+            <a:schemeClr val="tx1"/>
+          </a:fontRef>
+        </p:style>
+      </p:cxnSp>
+      <p:sp>
+        <p:nvSpPr>
+          <p:cNvPr id="3" name="Rectangle: Rounded Corners 2">
+            <a:extLst>
+              <a:ext uri="{FF2B5EF4-FFF2-40B4-BE49-F238E27FC236}">
+                <a16:creationId xmlns:a16="http://schemas.microsoft.com/office/drawing/2014/main" id="{01FADF76-0927-4C9B-7134-BE6EB0E7E06A}"/>
+              </a:ext>
+            </a:extLst>
+          </p:cNvPr>
+          <p:cNvSpPr/>
+          <p:nvPr/>
+        </p:nvSpPr>
+        <p:spPr>
+          <a:xfrm>
+            <a:off x="7125538" y="201557"/>
+            <a:ext cx="2094998" cy="998349"/>
+          </a:xfrm>
+          <a:prstGeom prst="roundRect">
+            <a:avLst/>
+          </a:prstGeom>
+          <a:ln/>
+        </p:spPr>
+        <p:style>
+          <a:lnRef idx="2">
+            <a:schemeClr val="accent6">
+              <a:shade val="15000"/>
+            </a:schemeClr>
+          </a:lnRef>
+          <a:fillRef idx="1">
+            <a:schemeClr val="accent6"/>
+          </a:fillRef>
+          <a:effectRef idx="0">
+            <a:schemeClr val="accent6"/>
+          </a:effectRef>
+          <a:fontRef idx="minor">
+            <a:schemeClr val="lt1"/>
+          </a:fontRef>
+        </p:style>
+        <p:txBody>
+          <a:bodyPr rtlCol="0" anchor="ctr"/>
+          <a:lstStyle/>
+          <a:p>
+            <a:pPr marL="0" marR="0" lvl="0" indent="0" defTabSz="914400" eaLnBrk="1" fontAlgn="auto" latinLnBrk="0" hangingPunct="1">
+              <a:lnSpc>
+                <a:spcPct val="100000"/>
+              </a:lnSpc>
+              <a:spcBef>
+                <a:spcPts val="0"/>
+              </a:spcBef>
+              <a:spcAft>
+                <a:spcPts val="0"/>
+              </a:spcAft>
+              <a:buClrTx/>
+              <a:buSzTx/>
+              <a:buFontTx/>
+              <a:buNone/>
+              <a:tabLst/>
+              <a:defRPr/>
+            </a:pPr>
+            <a:r>
+              <a:rPr kumimoji="0" lang="en-US" sz="1800" b="1" i="0" u="sng" strike="noStrike" kern="0" cap="none" spc="0" normalizeH="0" baseline="0" noProof="0" dirty="0" err="1">
+                <a:ln>
+                  <a:noFill/>
+                </a:ln>
+                <a:solidFill>
+                  <a:srgbClr val="FFFFFF"/>
+                </a:solidFill>
+                <a:effectLst/>
+                <a:uLnTx/>
+                <a:uFillTx/>
+                <a:latin typeface="Calibri" panose="020F0502020204030204"/>
+                <a:ea typeface="+mn-ea"/>
+                <a:cs typeface="+mn-cs"/>
+              </a:rPr>
+              <a:t>RegulatedAuth</a:t>
+            </a:r>
+            <a:r>
+              <a:rPr kumimoji="0" lang="en-US" sz="1800" b="1" i="0" u="sng" strike="noStrike" kern="0" cap="none" spc="0" normalizeH="0" baseline="0" noProof="0" dirty="0">
+                <a:ln>
+                  <a:noFill/>
+                </a:ln>
+                <a:solidFill>
+                  <a:srgbClr val="FFFFFF"/>
+                </a:solidFill>
+                <a:effectLst/>
+                <a:uLnTx/>
+                <a:uFillTx/>
+                <a:latin typeface="Calibri" panose="020F0502020204030204"/>
+                <a:ea typeface="+mn-ea"/>
+                <a:cs typeface="+mn-cs"/>
+              </a:rPr>
+              <a:t>.</a:t>
+            </a:r>
+          </a:p>
+          <a:p>
+            <a:pPr marL="0" marR="0" lvl="0" indent="0" defTabSz="914400" eaLnBrk="1" fontAlgn="auto" latinLnBrk="0" hangingPunct="1">
+              <a:lnSpc>
+                <a:spcPct val="100000"/>
+              </a:lnSpc>
+              <a:spcBef>
+                <a:spcPts val="0"/>
+              </a:spcBef>
+              <a:spcAft>
+                <a:spcPts val="0"/>
+              </a:spcAft>
+              <a:buClrTx/>
+              <a:buSzTx/>
+              <a:buFontTx/>
+              <a:buNone/>
+              <a:tabLst/>
+              <a:defRPr/>
+            </a:pPr>
+            <a:r>
+              <a:rPr lang="en-US" sz="1400" kern="0" dirty="0">
+                <a:solidFill>
+                  <a:srgbClr val="FFFFFF"/>
+                </a:solidFill>
+                <a:latin typeface="Calibri" panose="020F0502020204030204"/>
+              </a:rPr>
+              <a:t>identifier: </a:t>
+            </a:r>
+          </a:p>
+          <a:p>
+            <a:pPr marL="0" marR="0" lvl="0" indent="0" defTabSz="914400" eaLnBrk="1" fontAlgn="auto" latinLnBrk="0" hangingPunct="1">
+              <a:lnSpc>
+                <a:spcPct val="100000"/>
+              </a:lnSpc>
+              <a:spcBef>
+                <a:spcPts val="0"/>
+              </a:spcBef>
+              <a:spcAft>
+                <a:spcPts val="0"/>
+              </a:spcAft>
+              <a:buClrTx/>
+              <a:buSzTx/>
+              <a:buFontTx/>
+              <a:buNone/>
+              <a:tabLst/>
+              <a:defRPr/>
+            </a:pPr>
+            <a:r>
+              <a:rPr lang="en-US" sz="1400" kern="0" dirty="0">
+                <a:solidFill>
+                  <a:srgbClr val="FFFFFF"/>
+                </a:solidFill>
+                <a:latin typeface="Calibri" panose="020F0502020204030204"/>
+              </a:rPr>
+              <a:t>   system: http://xxx/yy</a:t>
+            </a:r>
+            <a:endParaRPr lang="en-US" sz="1400" kern="0" dirty="0">
+              <a:solidFill>
+                <a:srgbClr val="FFFFFF"/>
+              </a:solidFill>
+            </a:endParaRPr>
+          </a:p>
+          <a:p>
+            <a:pPr marL="0" marR="0" lvl="0" indent="0" defTabSz="914400" eaLnBrk="1" fontAlgn="auto" latinLnBrk="0" hangingPunct="1">
+              <a:lnSpc>
+                <a:spcPct val="100000"/>
+              </a:lnSpc>
+              <a:spcBef>
+                <a:spcPts val="0"/>
+              </a:spcBef>
+              <a:spcAft>
+                <a:spcPts val="0"/>
+              </a:spcAft>
+              <a:buClrTx/>
+              <a:buSzTx/>
+              <a:buFontTx/>
+              <a:buNone/>
+              <a:tabLst/>
+              <a:defRPr/>
+            </a:pPr>
+            <a:r>
+              <a:rPr lang="en-US" sz="1400" kern="0">
+                <a:solidFill>
+                  <a:srgbClr val="FFFFFF"/>
+                </a:solidFill>
+              </a:rPr>
+              <a:t>   value: 123-456</a:t>
+            </a:r>
+            <a:endParaRPr kumimoji="0" lang="en-SE" sz="1400" b="0" i="0" u="none" strike="noStrike" kern="0" cap="none" spc="0" normalizeH="0" baseline="0" noProof="0" dirty="0">
+              <a:ln>
+                <a:noFill/>
+              </a:ln>
+              <a:solidFill>
+                <a:srgbClr val="FFFFFF"/>
+              </a:solidFill>
+              <a:effectLst/>
+              <a:uLnTx/>
+              <a:uFillTx/>
+              <a:latin typeface="Calibri" panose="020F0502020204030204"/>
+            </a:endParaRPr>
+          </a:p>
+        </p:txBody>
+      </p:sp>
+      <p:cxnSp>
+        <p:nvCxnSpPr>
+          <p:cNvPr id="10" name="Straight Arrow Connector 31">
+            <a:extLst>
+              <a:ext uri="{FF2B5EF4-FFF2-40B4-BE49-F238E27FC236}">
+                <a16:creationId xmlns:a16="http://schemas.microsoft.com/office/drawing/2014/main" id="{A36C6E8E-7FF2-36AF-5A6D-50EE46AD2BDF}"/>
+              </a:ext>
+            </a:extLst>
+          </p:cNvPr>
+          <p:cNvCxnSpPr>
+            <a:cxnSpLocks/>
+            <a:stCxn id="3" idx="1"/>
+            <a:endCxn id="4" idx="3"/>
+          </p:cNvCxnSpPr>
+          <p:nvPr/>
+        </p:nvCxnSpPr>
+        <p:spPr>
+          <a:xfrm rot="10800000" flipV="1">
+            <a:off x="6582870" y="700731"/>
+            <a:ext cx="542668" cy="1330369"/>
           </a:xfrm>
           <a:prstGeom prst="bentConnector3">
             <a:avLst>
@@ -13239,6 +13975,33 @@
                                   </p:childTnLst>
                                 </p:cTn>
                               </p:par>
+                              <p:par>
+                                <p:cTn id="7" presetID="1" presetClass="entr" presetSubtype="0" fill="hold" grpId="0" nodeType="withEffect">
+                                  <p:stCondLst>
+                                    <p:cond delay="0"/>
+                                  </p:stCondLst>
+                                  <p:childTnLst>
+                                    <p:set>
+                                      <p:cBhvr>
+                                        <p:cTn id="8" dur="1" fill="hold">
+                                          <p:stCondLst>
+                                            <p:cond delay="0"/>
+                                          </p:stCondLst>
+                                        </p:cTn>
+                                        <p:tgtEl>
+                                          <p:spTgt spid="3"/>
+                                        </p:tgtEl>
+                                        <p:attrNameLst>
+                                          <p:attrName>style.visibility</p:attrName>
+                                        </p:attrNameLst>
+                                      </p:cBhvr>
+                                      <p:to>
+                                        <p:strVal val="visible"/>
+                                      </p:to>
+                                    </p:set>
+                                  </p:childTnLst>
+                                </p:cTn>
+                              </p:par>
                             </p:childTnLst>
                           </p:cTn>
                         </p:par>
@@ -13268,6 +14031,7 @@
     </p:tnLst>
     <p:bldLst>
       <p:bldP spid="2" grpId="0" animBg="1"/>
+      <p:bldP spid="3" grpId="0" animBg="1"/>
     </p:bldLst>
   </p:timing>
 </p:sld>

</xml_diff>

<commit_message>
Updating documentation and restructuring
</commit_message>
<xml_diff>
--- a/ImplementationGuideImages.pptx
+++ b/ImplementationGuideImages.pptx
@@ -13,6 +13,7 @@
     <p:sldId id="262" r:id="rId7"/>
     <p:sldId id="263" r:id="rId8"/>
     <p:sldId id="264" r:id="rId9"/>
+    <p:sldId id="265" r:id="rId10"/>
   </p:sldIdLst>
   <p:sldSz cx="12192000" cy="6858000"/>
   <p:notesSz cx="6858000" cy="9144000"/>
@@ -268,7 +269,7 @@
           <a:p>
             <a:fld id="{6B5A8AD0-4133-444B-956D-B3352209FA33}" type="datetimeFigureOut">
               <a:rPr lang="en-SE" smtClean="0"/>
-              <a:t>2025-03-11</a:t>
+              <a:t>2025-04-24</a:t>
             </a:fld>
             <a:endParaRPr lang="en-SE"/>
           </a:p>
@@ -468,7 +469,7 @@
           <a:p>
             <a:fld id="{6B5A8AD0-4133-444B-956D-B3352209FA33}" type="datetimeFigureOut">
               <a:rPr lang="en-SE" smtClean="0"/>
-              <a:t>2025-03-11</a:t>
+              <a:t>2025-04-24</a:t>
             </a:fld>
             <a:endParaRPr lang="en-SE"/>
           </a:p>
@@ -678,7 +679,7 @@
           <a:p>
             <a:fld id="{6B5A8AD0-4133-444B-956D-B3352209FA33}" type="datetimeFigureOut">
               <a:rPr lang="en-SE" smtClean="0"/>
-              <a:t>2025-03-11</a:t>
+              <a:t>2025-04-24</a:t>
             </a:fld>
             <a:endParaRPr lang="en-SE"/>
           </a:p>
@@ -878,7 +879,7 @@
           <a:p>
             <a:fld id="{6B5A8AD0-4133-444B-956D-B3352209FA33}" type="datetimeFigureOut">
               <a:rPr lang="en-SE" smtClean="0"/>
-              <a:t>2025-03-11</a:t>
+              <a:t>2025-04-24</a:t>
             </a:fld>
             <a:endParaRPr lang="en-SE"/>
           </a:p>
@@ -1154,7 +1155,7 @@
           <a:p>
             <a:fld id="{6B5A8AD0-4133-444B-956D-B3352209FA33}" type="datetimeFigureOut">
               <a:rPr lang="en-SE" smtClean="0"/>
-              <a:t>2025-03-11</a:t>
+              <a:t>2025-04-24</a:t>
             </a:fld>
             <a:endParaRPr lang="en-SE"/>
           </a:p>
@@ -1422,7 +1423,7 @@
           <a:p>
             <a:fld id="{6B5A8AD0-4133-444B-956D-B3352209FA33}" type="datetimeFigureOut">
               <a:rPr lang="en-SE" smtClean="0"/>
-              <a:t>2025-03-11</a:t>
+              <a:t>2025-04-24</a:t>
             </a:fld>
             <a:endParaRPr lang="en-SE"/>
           </a:p>
@@ -1837,7 +1838,7 @@
           <a:p>
             <a:fld id="{6B5A8AD0-4133-444B-956D-B3352209FA33}" type="datetimeFigureOut">
               <a:rPr lang="en-SE" smtClean="0"/>
-              <a:t>2025-03-11</a:t>
+              <a:t>2025-04-24</a:t>
             </a:fld>
             <a:endParaRPr lang="en-SE"/>
           </a:p>
@@ -1979,7 +1980,7 @@
           <a:p>
             <a:fld id="{6B5A8AD0-4133-444B-956D-B3352209FA33}" type="datetimeFigureOut">
               <a:rPr lang="en-SE" smtClean="0"/>
-              <a:t>2025-03-11</a:t>
+              <a:t>2025-04-24</a:t>
             </a:fld>
             <a:endParaRPr lang="en-SE"/>
           </a:p>
@@ -2092,7 +2093,7 @@
           <a:p>
             <a:fld id="{6B5A8AD0-4133-444B-956D-B3352209FA33}" type="datetimeFigureOut">
               <a:rPr lang="en-SE" smtClean="0"/>
-              <a:t>2025-03-11</a:t>
+              <a:t>2025-04-24</a:t>
             </a:fld>
             <a:endParaRPr lang="en-SE"/>
           </a:p>
@@ -2405,7 +2406,7 @@
           <a:p>
             <a:fld id="{6B5A8AD0-4133-444B-956D-B3352209FA33}" type="datetimeFigureOut">
               <a:rPr lang="en-SE" smtClean="0"/>
-              <a:t>2025-03-11</a:t>
+              <a:t>2025-04-24</a:t>
             </a:fld>
             <a:endParaRPr lang="en-SE"/>
           </a:p>
@@ -2694,7 +2695,7 @@
           <a:p>
             <a:fld id="{6B5A8AD0-4133-444B-956D-B3352209FA33}" type="datetimeFigureOut">
               <a:rPr lang="en-SE" smtClean="0"/>
-              <a:t>2025-03-11</a:t>
+              <a:t>2025-04-24</a:t>
             </a:fld>
             <a:endParaRPr lang="en-SE"/>
           </a:p>
@@ -2937,7 +2938,7 @@
           <a:p>
             <a:fld id="{6B5A8AD0-4133-444B-956D-B3352209FA33}" type="datetimeFigureOut">
               <a:rPr lang="en-SE" smtClean="0"/>
-              <a:t>2025-03-11</a:t>
+              <a:t>2025-04-24</a:t>
             </a:fld>
             <a:endParaRPr lang="en-SE"/>
           </a:p>
@@ -14037,6 +14038,2739 @@
 </p:sld>
 </file>
 
+<file path=ppt/slides/slide9.xml><?xml version="1.0" encoding="utf-8"?>
+<p:sld xmlns:a="http://schemas.openxmlformats.org/drawingml/2006/main" xmlns:r="http://schemas.openxmlformats.org/officeDocument/2006/relationships" xmlns:p="http://schemas.openxmlformats.org/presentationml/2006/main">
+  <p:cSld>
+    <p:spTree>
+      <p:nvGrpSpPr>
+        <p:cNvPr id="1" name=""/>
+        <p:cNvGrpSpPr/>
+        <p:nvPr/>
+      </p:nvGrpSpPr>
+      <p:grpSpPr>
+        <a:xfrm>
+          <a:off x="0" y="0"/>
+          <a:ext cx="0" cy="0"/>
+          <a:chOff x="0" y="0"/>
+          <a:chExt cx="0" cy="0"/>
+        </a:xfrm>
+      </p:grpSpPr>
+      <p:sp>
+        <p:nvSpPr>
+          <p:cNvPr id="2" name="Oval 1">
+            <a:extLst>
+              <a:ext uri="{FF2B5EF4-FFF2-40B4-BE49-F238E27FC236}">
+                <a16:creationId xmlns:a16="http://schemas.microsoft.com/office/drawing/2014/main" id="{15F24418-BD8E-8E7D-0770-941AEADA8763}"/>
+              </a:ext>
+            </a:extLst>
+          </p:cNvPr>
+          <p:cNvSpPr/>
+          <p:nvPr/>
+        </p:nvSpPr>
+        <p:spPr>
+          <a:xfrm>
+            <a:off x="1086198" y="4257400"/>
+            <a:ext cx="1866900" cy="990600"/>
+          </a:xfrm>
+          <a:prstGeom prst="ellipse">
+            <a:avLst/>
+          </a:prstGeom>
+        </p:spPr>
+        <p:style>
+          <a:lnRef idx="2">
+            <a:schemeClr val="accent1">
+              <a:shade val="15000"/>
+            </a:schemeClr>
+          </a:lnRef>
+          <a:fillRef idx="1">
+            <a:schemeClr val="accent1"/>
+          </a:fillRef>
+          <a:effectRef idx="0">
+            <a:schemeClr val="accent1"/>
+          </a:effectRef>
+          <a:fontRef idx="minor">
+            <a:schemeClr val="lt1"/>
+          </a:fontRef>
+        </p:style>
+        <p:txBody>
+          <a:bodyPr rtlCol="0" anchor="ctr"/>
+          <a:lstStyle/>
+          <a:p>
+            <a:pPr algn="ctr"/>
+            <a:r>
+              <a:rPr lang="en-US" dirty="0"/>
+              <a:t>MPD</a:t>
+            </a:r>
+          </a:p>
+          <a:p>
+            <a:pPr algn="ctr"/>
+            <a:r>
+              <a:rPr lang="en-US" sz="1000" dirty="0"/>
+              <a:t>id, name, MPID(s), code (</a:t>
+            </a:r>
+            <a:r>
+              <a:rPr lang="en-US" sz="1000" dirty="0" err="1"/>
+              <a:t>DrugCode</a:t>
+            </a:r>
+            <a:r>
+              <a:rPr lang="en-US" sz="1000" dirty="0"/>
+              <a:t>, …)</a:t>
+            </a:r>
+            <a:endParaRPr lang="en-SE" sz="1000" dirty="0"/>
+          </a:p>
+        </p:txBody>
+      </p:sp>
+      <p:sp>
+        <p:nvSpPr>
+          <p:cNvPr id="3" name="Oval 2">
+            <a:extLst>
+              <a:ext uri="{FF2B5EF4-FFF2-40B4-BE49-F238E27FC236}">
+                <a16:creationId xmlns:a16="http://schemas.microsoft.com/office/drawing/2014/main" id="{890F1EEB-C8BD-7D33-6E54-334FCC1A6684}"/>
+              </a:ext>
+            </a:extLst>
+          </p:cNvPr>
+          <p:cNvSpPr/>
+          <p:nvPr/>
+        </p:nvSpPr>
+        <p:spPr>
+          <a:xfrm>
+            <a:off x="4099977" y="4257400"/>
+            <a:ext cx="1866900" cy="990600"/>
+          </a:xfrm>
+          <a:prstGeom prst="ellipse">
+            <a:avLst/>
+          </a:prstGeom>
+        </p:spPr>
+        <p:style>
+          <a:lnRef idx="2">
+            <a:schemeClr val="accent2">
+              <a:shade val="15000"/>
+            </a:schemeClr>
+          </a:lnRef>
+          <a:fillRef idx="1">
+            <a:schemeClr val="accent2"/>
+          </a:fillRef>
+          <a:effectRef idx="0">
+            <a:schemeClr val="accent2"/>
+          </a:effectRef>
+          <a:fontRef idx="minor">
+            <a:schemeClr val="lt1"/>
+          </a:fontRef>
+        </p:style>
+        <p:txBody>
+          <a:bodyPr rtlCol="0" anchor="ctr"/>
+          <a:lstStyle/>
+          <a:p>
+            <a:pPr algn="ctr"/>
+            <a:r>
+              <a:rPr lang="en-US" dirty="0"/>
+              <a:t>APD </a:t>
+            </a:r>
+          </a:p>
+          <a:p>
+            <a:pPr algn="ctr"/>
+            <a:r>
+              <a:rPr lang="en-US" sz="1000" dirty="0"/>
+              <a:t>form parts</a:t>
+            </a:r>
+          </a:p>
+        </p:txBody>
+      </p:sp>
+      <p:sp>
+        <p:nvSpPr>
+          <p:cNvPr id="4" name="Oval 3">
+            <a:extLst>
+              <a:ext uri="{FF2B5EF4-FFF2-40B4-BE49-F238E27FC236}">
+                <a16:creationId xmlns:a16="http://schemas.microsoft.com/office/drawing/2014/main" id="{E6233C40-9549-7876-48D4-E946DEA3E829}"/>
+              </a:ext>
+            </a:extLst>
+          </p:cNvPr>
+          <p:cNvSpPr/>
+          <p:nvPr/>
+        </p:nvSpPr>
+        <p:spPr>
+          <a:xfrm>
+            <a:off x="9212792" y="4257400"/>
+            <a:ext cx="1866900" cy="990600"/>
+          </a:xfrm>
+          <a:prstGeom prst="ellipse">
+            <a:avLst/>
+          </a:prstGeom>
+          <a:solidFill>
+            <a:schemeClr val="accent6">
+              <a:lumMod val="75000"/>
+            </a:schemeClr>
+          </a:solidFill>
+        </p:spPr>
+        <p:style>
+          <a:lnRef idx="2">
+            <a:schemeClr val="accent1">
+              <a:shade val="15000"/>
+            </a:schemeClr>
+          </a:lnRef>
+          <a:fillRef idx="1">
+            <a:schemeClr val="accent1"/>
+          </a:fillRef>
+          <a:effectRef idx="0">
+            <a:schemeClr val="accent1"/>
+          </a:effectRef>
+          <a:fontRef idx="minor">
+            <a:schemeClr val="lt1"/>
+          </a:fontRef>
+        </p:style>
+        <p:txBody>
+          <a:bodyPr rtlCol="0" anchor="ctr"/>
+          <a:lstStyle/>
+          <a:p>
+            <a:pPr algn="ctr"/>
+            <a:r>
+              <a:rPr lang="en-US" dirty="0"/>
+              <a:t>SD </a:t>
+            </a:r>
+          </a:p>
+          <a:p>
+            <a:pPr algn="ctr"/>
+            <a:r>
+              <a:rPr lang="en-US" sz="1000" dirty="0"/>
+              <a:t>id (GSID), name(s), </a:t>
+            </a:r>
+          </a:p>
+          <a:p>
+            <a:pPr algn="ctr"/>
+            <a:r>
+              <a:rPr lang="en-US" sz="1000" dirty="0"/>
+              <a:t>code (UNII, </a:t>
+            </a:r>
+            <a:r>
+              <a:rPr lang="en-US" sz="1000" dirty="0" err="1"/>
+              <a:t>SMSid</a:t>
+            </a:r>
+            <a:r>
+              <a:rPr lang="en-US" sz="1000" dirty="0"/>
+              <a:t>…)</a:t>
+            </a:r>
+            <a:endParaRPr lang="en-SE" sz="1000" dirty="0"/>
+          </a:p>
+        </p:txBody>
+      </p:sp>
+      <p:sp>
+        <p:nvSpPr>
+          <p:cNvPr id="5" name="Oval 4">
+            <a:extLst>
+              <a:ext uri="{FF2B5EF4-FFF2-40B4-BE49-F238E27FC236}">
+                <a16:creationId xmlns:a16="http://schemas.microsoft.com/office/drawing/2014/main" id="{F44A7DFE-C493-048A-1B95-E65EF4EEFBDD}"/>
+              </a:ext>
+            </a:extLst>
+          </p:cNvPr>
+          <p:cNvSpPr/>
+          <p:nvPr/>
+        </p:nvSpPr>
+        <p:spPr>
+          <a:xfrm>
+            <a:off x="6745568" y="4257400"/>
+            <a:ext cx="1866900" cy="990600"/>
+          </a:xfrm>
+          <a:prstGeom prst="ellipse">
+            <a:avLst/>
+          </a:prstGeom>
+          <a:solidFill>
+            <a:srgbClr val="FFC000"/>
+          </a:solidFill>
+          <a:ln>
+            <a:prstDash val="sysDot"/>
+          </a:ln>
+        </p:spPr>
+        <p:style>
+          <a:lnRef idx="2">
+            <a:schemeClr val="accent1">
+              <a:shade val="15000"/>
+            </a:schemeClr>
+          </a:lnRef>
+          <a:fillRef idx="1">
+            <a:schemeClr val="accent1"/>
+          </a:fillRef>
+          <a:effectRef idx="0">
+            <a:schemeClr val="accent1"/>
+          </a:effectRef>
+          <a:fontRef idx="minor">
+            <a:schemeClr val="lt1"/>
+          </a:fontRef>
+        </p:style>
+        <p:txBody>
+          <a:bodyPr rtlCol="0" anchor="ctr"/>
+          <a:lstStyle/>
+          <a:p>
+            <a:pPr algn="ctr"/>
+            <a:r>
+              <a:rPr lang="en-US" dirty="0"/>
+              <a:t>Ingredient</a:t>
+            </a:r>
+            <a:endParaRPr lang="en-US" sz="1000" dirty="0"/>
+          </a:p>
+          <a:p>
+            <a:pPr algn="ctr"/>
+            <a:r>
+              <a:rPr lang="en-US" sz="1000" dirty="0"/>
+              <a:t>strength</a:t>
+            </a:r>
+            <a:endParaRPr lang="en-US" dirty="0"/>
+          </a:p>
+        </p:txBody>
+      </p:sp>
+      <p:cxnSp>
+        <p:nvCxnSpPr>
+          <p:cNvPr id="6" name="Straight Arrow Connector 10">
+            <a:extLst>
+              <a:ext uri="{FF2B5EF4-FFF2-40B4-BE49-F238E27FC236}">
+                <a16:creationId xmlns:a16="http://schemas.microsoft.com/office/drawing/2014/main" id="{C133BB6B-5051-48C0-BFD3-F998C75FCAEF}"/>
+              </a:ext>
+            </a:extLst>
+          </p:cNvPr>
+          <p:cNvCxnSpPr>
+            <a:cxnSpLocks/>
+            <a:stCxn id="2" idx="5"/>
+            <a:endCxn id="3" idx="3"/>
+          </p:cNvCxnSpPr>
+          <p:nvPr/>
+        </p:nvCxnSpPr>
+        <p:spPr>
+          <a:xfrm rot="16200000" flipH="1">
+            <a:off x="3526537" y="4256089"/>
+            <a:ext cx="12700" cy="1693681"/>
+          </a:xfrm>
+          <a:prstGeom prst="curvedConnector3">
+            <a:avLst>
+              <a:gd name="adj1" fmla="val 2942283"/>
+            </a:avLst>
+          </a:prstGeom>
+          <a:ln>
+            <a:prstDash val="dash"/>
+            <a:tailEnd type="triangle"/>
+          </a:ln>
+        </p:spPr>
+        <p:style>
+          <a:lnRef idx="2">
+            <a:schemeClr val="accent1"/>
+          </a:lnRef>
+          <a:fillRef idx="0">
+            <a:schemeClr val="accent1"/>
+          </a:fillRef>
+          <a:effectRef idx="1">
+            <a:schemeClr val="accent1"/>
+          </a:effectRef>
+          <a:fontRef idx="minor">
+            <a:schemeClr val="tx1"/>
+          </a:fontRef>
+        </p:style>
+      </p:cxnSp>
+      <p:cxnSp>
+        <p:nvCxnSpPr>
+          <p:cNvPr id="7" name="Straight Arrow Connector 20">
+            <a:extLst>
+              <a:ext uri="{FF2B5EF4-FFF2-40B4-BE49-F238E27FC236}">
+                <a16:creationId xmlns:a16="http://schemas.microsoft.com/office/drawing/2014/main" id="{84112788-D712-5900-99B5-1201F9DAD387}"/>
+              </a:ext>
+            </a:extLst>
+          </p:cNvPr>
+          <p:cNvCxnSpPr>
+            <a:cxnSpLocks/>
+            <a:stCxn id="5" idx="1"/>
+            <a:endCxn id="3" idx="7"/>
+          </p:cNvCxnSpPr>
+          <p:nvPr/>
+        </p:nvCxnSpPr>
+        <p:spPr>
+          <a:xfrm rot="16200000" flipV="1">
+            <a:off x="6356223" y="3739723"/>
+            <a:ext cx="12700" cy="1325493"/>
+          </a:xfrm>
+          <a:prstGeom prst="curvedConnector3">
+            <a:avLst>
+              <a:gd name="adj1" fmla="val 2942283"/>
+            </a:avLst>
+          </a:prstGeom>
+          <a:ln>
+            <a:tailEnd type="triangle"/>
+          </a:ln>
+        </p:spPr>
+        <p:style>
+          <a:lnRef idx="2">
+            <a:schemeClr val="accent1"/>
+          </a:lnRef>
+          <a:fillRef idx="0">
+            <a:schemeClr val="accent1"/>
+          </a:fillRef>
+          <a:effectRef idx="1">
+            <a:schemeClr val="accent1"/>
+          </a:effectRef>
+          <a:fontRef idx="minor">
+            <a:schemeClr val="tx1"/>
+          </a:fontRef>
+        </p:style>
+      </p:cxnSp>
+      <p:cxnSp>
+        <p:nvCxnSpPr>
+          <p:cNvPr id="8" name="Straight Arrow Connector 23">
+            <a:extLst>
+              <a:ext uri="{FF2B5EF4-FFF2-40B4-BE49-F238E27FC236}">
+                <a16:creationId xmlns:a16="http://schemas.microsoft.com/office/drawing/2014/main" id="{D5567871-1E60-E43B-AB16-404D13D85ECD}"/>
+              </a:ext>
+            </a:extLst>
+          </p:cNvPr>
+          <p:cNvCxnSpPr>
+            <a:cxnSpLocks/>
+            <a:stCxn id="5" idx="7"/>
+            <a:endCxn id="4" idx="1"/>
+          </p:cNvCxnSpPr>
+          <p:nvPr/>
+        </p:nvCxnSpPr>
+        <p:spPr>
+          <a:xfrm rot="5400000" flipH="1" flipV="1">
+            <a:off x="8912630" y="3828907"/>
+            <a:ext cx="12700" cy="1147126"/>
+          </a:xfrm>
+          <a:prstGeom prst="curvedConnector3">
+            <a:avLst>
+              <a:gd name="adj1" fmla="val 2942283"/>
+            </a:avLst>
+          </a:prstGeom>
+          <a:ln>
+            <a:tailEnd type="triangle"/>
+          </a:ln>
+        </p:spPr>
+        <p:style>
+          <a:lnRef idx="2">
+            <a:schemeClr val="accent1"/>
+          </a:lnRef>
+          <a:fillRef idx="0">
+            <a:schemeClr val="accent1"/>
+          </a:fillRef>
+          <a:effectRef idx="1">
+            <a:schemeClr val="accent1"/>
+          </a:effectRef>
+          <a:fontRef idx="minor">
+            <a:schemeClr val="tx1"/>
+          </a:fontRef>
+        </p:style>
+      </p:cxnSp>
+      <p:cxnSp>
+        <p:nvCxnSpPr>
+          <p:cNvPr id="9" name="Straight Arrow Connector 26">
+            <a:extLst>
+              <a:ext uri="{FF2B5EF4-FFF2-40B4-BE49-F238E27FC236}">
+                <a16:creationId xmlns:a16="http://schemas.microsoft.com/office/drawing/2014/main" id="{79806ABA-C6A4-B499-7259-F9FBF3A5D030}"/>
+              </a:ext>
+            </a:extLst>
+          </p:cNvPr>
+          <p:cNvCxnSpPr>
+            <a:cxnSpLocks/>
+            <a:stCxn id="4" idx="4"/>
+            <a:endCxn id="4" idx="5"/>
+          </p:cNvCxnSpPr>
+          <p:nvPr/>
+        </p:nvCxnSpPr>
+        <p:spPr>
+          <a:xfrm rot="5400000" flipH="1" flipV="1">
+            <a:off x="10403731" y="4845440"/>
+            <a:ext cx="145070" cy="660049"/>
+          </a:xfrm>
+          <a:prstGeom prst="curvedConnector3">
+            <a:avLst>
+              <a:gd name="adj1" fmla="val -262633"/>
+            </a:avLst>
+          </a:prstGeom>
+          <a:ln>
+            <a:tailEnd type="triangle"/>
+          </a:ln>
+        </p:spPr>
+        <p:style>
+          <a:lnRef idx="2">
+            <a:schemeClr val="accent1"/>
+          </a:lnRef>
+          <a:fillRef idx="0">
+            <a:schemeClr val="accent1"/>
+          </a:fillRef>
+          <a:effectRef idx="1">
+            <a:schemeClr val="accent1"/>
+          </a:effectRef>
+          <a:fontRef idx="minor">
+            <a:schemeClr val="tx1"/>
+          </a:fontRef>
+        </p:style>
+      </p:cxnSp>
+      <p:sp>
+        <p:nvSpPr>
+          <p:cNvPr id="10" name="TextBox 9">
+            <a:extLst>
+              <a:ext uri="{FF2B5EF4-FFF2-40B4-BE49-F238E27FC236}">
+                <a16:creationId xmlns:a16="http://schemas.microsoft.com/office/drawing/2014/main" id="{7D3B3664-81A0-79FA-5A5C-4C0F1E0212D5}"/>
+              </a:ext>
+            </a:extLst>
+          </p:cNvPr>
+          <p:cNvSpPr txBox="1"/>
+          <p:nvPr/>
+        </p:nvSpPr>
+        <p:spPr>
+          <a:xfrm>
+            <a:off x="2756510" y="5439487"/>
+            <a:ext cx="1563057" cy="369332"/>
+          </a:xfrm>
+          <a:prstGeom prst="rect">
+            <a:avLst/>
+          </a:prstGeom>
+          <a:noFill/>
+        </p:spPr>
+        <p:txBody>
+          <a:bodyPr wrap="none" rtlCol="0">
+            <a:spAutoFit/>
+          </a:bodyPr>
+          <a:lstStyle/>
+          <a:p>
+            <a:pPr algn="ctr"/>
+            <a:r>
+              <a:rPr lang="en-US" dirty="0"/>
+              <a:t>classification </a:t>
+            </a:r>
+          </a:p>
+        </p:txBody>
+      </p:sp>
+      <p:cxnSp>
+        <p:nvCxnSpPr>
+          <p:cNvPr id="11" name="Straight Arrow Connector 33">
+            <a:extLst>
+              <a:ext uri="{FF2B5EF4-FFF2-40B4-BE49-F238E27FC236}">
+                <a16:creationId xmlns:a16="http://schemas.microsoft.com/office/drawing/2014/main" id="{233B5EB1-4EC3-CBEA-AD4F-7B2930127A97}"/>
+              </a:ext>
+            </a:extLst>
+          </p:cNvPr>
+          <p:cNvCxnSpPr>
+            <a:cxnSpLocks/>
+            <a:stCxn id="3" idx="5"/>
+            <a:endCxn id="3" idx="4"/>
+          </p:cNvCxnSpPr>
+          <p:nvPr/>
+        </p:nvCxnSpPr>
+        <p:spPr>
+          <a:xfrm rot="5400000">
+            <a:off x="5290917" y="4845441"/>
+            <a:ext cx="145070" cy="660049"/>
+          </a:xfrm>
+          <a:prstGeom prst="curvedConnector3">
+            <a:avLst>
+              <a:gd name="adj1" fmla="val 257579"/>
+            </a:avLst>
+          </a:prstGeom>
+          <a:ln>
+            <a:prstDash val="dash"/>
+            <a:tailEnd type="triangle"/>
+          </a:ln>
+        </p:spPr>
+        <p:style>
+          <a:lnRef idx="2">
+            <a:schemeClr val="accent1"/>
+          </a:lnRef>
+          <a:fillRef idx="0">
+            <a:schemeClr val="accent1"/>
+          </a:fillRef>
+          <a:effectRef idx="1">
+            <a:schemeClr val="accent1"/>
+          </a:effectRef>
+          <a:fontRef idx="minor">
+            <a:schemeClr val="tx1"/>
+          </a:fontRef>
+        </p:style>
+      </p:cxnSp>
+      <p:sp>
+        <p:nvSpPr>
+          <p:cNvPr id="12" name="TextBox 11">
+            <a:extLst>
+              <a:ext uri="{FF2B5EF4-FFF2-40B4-BE49-F238E27FC236}">
+                <a16:creationId xmlns:a16="http://schemas.microsoft.com/office/drawing/2014/main" id="{A3EA8D11-C9B5-937F-A815-CA9649A866C8}"/>
+              </a:ext>
+            </a:extLst>
+          </p:cNvPr>
+          <p:cNvSpPr txBox="1"/>
+          <p:nvPr/>
+        </p:nvSpPr>
+        <p:spPr>
+          <a:xfrm>
+            <a:off x="4623598" y="5663830"/>
+            <a:ext cx="1394997" cy="646331"/>
+          </a:xfrm>
+          <a:prstGeom prst="rect">
+            <a:avLst/>
+          </a:prstGeom>
+          <a:noFill/>
+        </p:spPr>
+        <p:txBody>
+          <a:bodyPr wrap="none" rtlCol="0">
+            <a:spAutoFit/>
+          </a:bodyPr>
+          <a:lstStyle/>
+          <a:p>
+            <a:r>
+              <a:rPr lang="en-US" dirty="0"/>
+              <a:t>parent (0..3)</a:t>
+            </a:r>
+          </a:p>
+          <a:p>
+            <a:r>
+              <a:rPr lang="en-US" i="1" dirty="0"/>
+              <a:t>extension</a:t>
+            </a:r>
+            <a:endParaRPr lang="en-SE" i="1" dirty="0"/>
+          </a:p>
+        </p:txBody>
+      </p:sp>
+      <p:cxnSp>
+        <p:nvCxnSpPr>
+          <p:cNvPr id="13" name="Straight Arrow Connector 9">
+            <a:extLst>
+              <a:ext uri="{FF2B5EF4-FFF2-40B4-BE49-F238E27FC236}">
+                <a16:creationId xmlns:a16="http://schemas.microsoft.com/office/drawing/2014/main" id="{37131B0C-8C6C-DEB6-2575-CA7550E1678F}"/>
+              </a:ext>
+            </a:extLst>
+          </p:cNvPr>
+          <p:cNvCxnSpPr>
+            <a:cxnSpLocks/>
+            <a:stCxn id="3" idx="1"/>
+            <a:endCxn id="2" idx="7"/>
+          </p:cNvCxnSpPr>
+          <p:nvPr/>
+        </p:nvCxnSpPr>
+        <p:spPr>
+          <a:xfrm rot="16200000" flipV="1">
+            <a:off x="3526538" y="3555629"/>
+            <a:ext cx="12700" cy="1693681"/>
+          </a:xfrm>
+          <a:prstGeom prst="curvedConnector3">
+            <a:avLst>
+              <a:gd name="adj1" fmla="val 2942283"/>
+            </a:avLst>
+          </a:prstGeom>
+          <a:ln>
+            <a:prstDash val="solid"/>
+            <a:tailEnd type="triangle"/>
+          </a:ln>
+        </p:spPr>
+        <p:style>
+          <a:lnRef idx="2">
+            <a:schemeClr val="accent1"/>
+          </a:lnRef>
+          <a:fillRef idx="0">
+            <a:schemeClr val="accent1"/>
+          </a:fillRef>
+          <a:effectRef idx="1">
+            <a:schemeClr val="accent1"/>
+          </a:effectRef>
+          <a:fontRef idx="minor">
+            <a:schemeClr val="tx1"/>
+          </a:fontRef>
+        </p:style>
+      </p:cxnSp>
+      <p:sp>
+        <p:nvSpPr>
+          <p:cNvPr id="14" name="TextBox 13">
+            <a:extLst>
+              <a:ext uri="{FF2B5EF4-FFF2-40B4-BE49-F238E27FC236}">
+                <a16:creationId xmlns:a16="http://schemas.microsoft.com/office/drawing/2014/main" id="{446FD3AB-57E9-8329-2A2F-AF479B23099A}"/>
+              </a:ext>
+            </a:extLst>
+          </p:cNvPr>
+          <p:cNvSpPr txBox="1"/>
+          <p:nvPr/>
+        </p:nvSpPr>
+        <p:spPr>
+          <a:xfrm>
+            <a:off x="3016603" y="3708360"/>
+            <a:ext cx="1404808" cy="369332"/>
+          </a:xfrm>
+          <a:prstGeom prst="rect">
+            <a:avLst/>
+          </a:prstGeom>
+          <a:noFill/>
+        </p:spPr>
+        <p:txBody>
+          <a:bodyPr wrap="none" rtlCol="0">
+            <a:spAutoFit/>
+          </a:bodyPr>
+          <a:lstStyle/>
+          <a:p>
+            <a:r>
+              <a:rPr lang="en-US" dirty="0" err="1"/>
+              <a:t>formOf</a:t>
+            </a:r>
+            <a:r>
+              <a:rPr lang="en-US" dirty="0"/>
+              <a:t>(n..1)</a:t>
+            </a:r>
+            <a:endParaRPr lang="en-SE" dirty="0"/>
+          </a:p>
+        </p:txBody>
+      </p:sp>
+      <p:sp>
+        <p:nvSpPr>
+          <p:cNvPr id="15" name="TextBox 14">
+            <a:extLst>
+              <a:ext uri="{FF2B5EF4-FFF2-40B4-BE49-F238E27FC236}">
+                <a16:creationId xmlns:a16="http://schemas.microsoft.com/office/drawing/2014/main" id="{FC85A4C2-3DF8-A26E-8242-9F93EF7CCA7E}"/>
+              </a:ext>
+            </a:extLst>
+          </p:cNvPr>
+          <p:cNvSpPr txBox="1"/>
+          <p:nvPr/>
+        </p:nvSpPr>
+        <p:spPr>
+          <a:xfrm>
+            <a:off x="5738636" y="3656904"/>
+            <a:ext cx="1016881" cy="369332"/>
+          </a:xfrm>
+          <a:prstGeom prst="rect">
+            <a:avLst/>
+          </a:prstGeom>
+          <a:noFill/>
+        </p:spPr>
+        <p:txBody>
+          <a:bodyPr wrap="none" rtlCol="0">
+            <a:spAutoFit/>
+          </a:bodyPr>
+          <a:lstStyle/>
+          <a:p>
+            <a:r>
+              <a:rPr lang="en-US" dirty="0"/>
+              <a:t>for (n..1)</a:t>
+            </a:r>
+            <a:endParaRPr lang="en-SE" dirty="0"/>
+          </a:p>
+        </p:txBody>
+      </p:sp>
+      <p:sp>
+        <p:nvSpPr>
+          <p:cNvPr id="16" name="TextBox 15">
+            <a:extLst>
+              <a:ext uri="{FF2B5EF4-FFF2-40B4-BE49-F238E27FC236}">
+                <a16:creationId xmlns:a16="http://schemas.microsoft.com/office/drawing/2014/main" id="{AD3BEA6F-ADD2-4447-FE2C-1C5FC99CDA9E}"/>
+              </a:ext>
+            </a:extLst>
+          </p:cNvPr>
+          <p:cNvSpPr txBox="1"/>
+          <p:nvPr/>
+        </p:nvSpPr>
+        <p:spPr>
+          <a:xfrm>
+            <a:off x="8410539" y="3673941"/>
+            <a:ext cx="1244251" cy="369332"/>
+          </a:xfrm>
+          <a:prstGeom prst="rect">
+            <a:avLst/>
+          </a:prstGeom>
+          <a:noFill/>
+        </p:spPr>
+        <p:txBody>
+          <a:bodyPr wrap="none" rtlCol="0">
+            <a:spAutoFit/>
+          </a:bodyPr>
+          <a:lstStyle/>
+          <a:p>
+            <a:r>
+              <a:rPr lang="en-US" dirty="0"/>
+              <a:t>code (1..1)</a:t>
+            </a:r>
+            <a:endParaRPr lang="en-SE" dirty="0"/>
+          </a:p>
+        </p:txBody>
+      </p:sp>
+      <p:cxnSp>
+        <p:nvCxnSpPr>
+          <p:cNvPr id="17" name="Straight Arrow Connector 33">
+            <a:extLst>
+              <a:ext uri="{FF2B5EF4-FFF2-40B4-BE49-F238E27FC236}">
+                <a16:creationId xmlns:a16="http://schemas.microsoft.com/office/drawing/2014/main" id="{255D7375-7AE2-2485-F805-328874514151}"/>
+              </a:ext>
+            </a:extLst>
+          </p:cNvPr>
+          <p:cNvCxnSpPr>
+            <a:cxnSpLocks/>
+            <a:stCxn id="3" idx="5"/>
+            <a:endCxn id="5" idx="3"/>
+          </p:cNvCxnSpPr>
+          <p:nvPr/>
+        </p:nvCxnSpPr>
+        <p:spPr>
+          <a:xfrm rot="16200000" flipH="1">
+            <a:off x="6356222" y="4440183"/>
+            <a:ext cx="12700" cy="1325493"/>
+          </a:xfrm>
+          <a:prstGeom prst="curvedConnector3">
+            <a:avLst>
+              <a:gd name="adj1" fmla="val 2942283"/>
+            </a:avLst>
+          </a:prstGeom>
+          <a:ln>
+            <a:prstDash val="dash"/>
+            <a:tailEnd type="triangle"/>
+          </a:ln>
+        </p:spPr>
+        <p:style>
+          <a:lnRef idx="2">
+            <a:schemeClr val="accent1"/>
+          </a:lnRef>
+          <a:fillRef idx="0">
+            <a:schemeClr val="accent1"/>
+          </a:fillRef>
+          <a:effectRef idx="1">
+            <a:schemeClr val="accent1"/>
+          </a:effectRef>
+          <a:fontRef idx="minor">
+            <a:schemeClr val="tx1"/>
+          </a:fontRef>
+        </p:style>
+      </p:cxnSp>
+      <p:sp>
+        <p:nvSpPr>
+          <p:cNvPr id="18" name="TextBox 17">
+            <a:extLst>
+              <a:ext uri="{FF2B5EF4-FFF2-40B4-BE49-F238E27FC236}">
+                <a16:creationId xmlns:a16="http://schemas.microsoft.com/office/drawing/2014/main" id="{683D4A61-4EFB-DAF0-E119-7B4B0048AD98}"/>
+              </a:ext>
+            </a:extLst>
+          </p:cNvPr>
+          <p:cNvSpPr txBox="1"/>
+          <p:nvPr/>
+        </p:nvSpPr>
+        <p:spPr>
+          <a:xfrm>
+            <a:off x="6225641" y="5439487"/>
+            <a:ext cx="1190454" cy="369332"/>
+          </a:xfrm>
+          <a:prstGeom prst="rect">
+            <a:avLst/>
+          </a:prstGeom>
+          <a:noFill/>
+        </p:spPr>
+        <p:txBody>
+          <a:bodyPr wrap="none" rtlCol="0">
+            <a:spAutoFit/>
+          </a:bodyPr>
+          <a:lstStyle/>
+          <a:p>
+            <a:r>
+              <a:rPr lang="en-US" dirty="0"/>
+              <a:t>contained</a:t>
+            </a:r>
+            <a:endParaRPr lang="en-SE" dirty="0"/>
+          </a:p>
+        </p:txBody>
+      </p:sp>
+      <p:sp>
+        <p:nvSpPr>
+          <p:cNvPr id="19" name="TextBox 18">
+            <a:extLst>
+              <a:ext uri="{FF2B5EF4-FFF2-40B4-BE49-F238E27FC236}">
+                <a16:creationId xmlns:a16="http://schemas.microsoft.com/office/drawing/2014/main" id="{C616D766-AE78-00E2-33AF-C56DA6ACA842}"/>
+              </a:ext>
+            </a:extLst>
+          </p:cNvPr>
+          <p:cNvSpPr txBox="1"/>
+          <p:nvPr/>
+        </p:nvSpPr>
+        <p:spPr>
+          <a:xfrm>
+            <a:off x="4635721" y="2487326"/>
+            <a:ext cx="795411" cy="369332"/>
+          </a:xfrm>
+          <a:prstGeom prst="rect">
+            <a:avLst/>
+          </a:prstGeom>
+          <a:noFill/>
+          <a:ln w="12700">
+            <a:solidFill>
+              <a:schemeClr val="accent2">
+                <a:lumMod val="75000"/>
+              </a:schemeClr>
+            </a:solidFill>
+            <a:prstDash val="sysDot"/>
+          </a:ln>
+        </p:spPr>
+        <p:txBody>
+          <a:bodyPr wrap="none" rtlCol="0">
+            <a:spAutoFit/>
+          </a:bodyPr>
+          <a:lstStyle/>
+          <a:p>
+            <a:pPr algn="ctr"/>
+            <a:r>
+              <a:rPr lang="en-US" dirty="0"/>
+              <a:t>PhPID</a:t>
+            </a:r>
+            <a:endParaRPr lang="en-SE" dirty="0"/>
+          </a:p>
+        </p:txBody>
+      </p:sp>
+      <p:cxnSp>
+        <p:nvCxnSpPr>
+          <p:cNvPr id="20" name="Straight Connector 19">
+            <a:extLst>
+              <a:ext uri="{FF2B5EF4-FFF2-40B4-BE49-F238E27FC236}">
+                <a16:creationId xmlns:a16="http://schemas.microsoft.com/office/drawing/2014/main" id="{23B9223B-1BED-F79B-A990-4B47D8E6696F}"/>
+              </a:ext>
+            </a:extLst>
+          </p:cNvPr>
+          <p:cNvCxnSpPr>
+            <a:stCxn id="19" idx="2"/>
+            <a:endCxn id="3" idx="0"/>
+          </p:cNvCxnSpPr>
+          <p:nvPr/>
+        </p:nvCxnSpPr>
+        <p:spPr>
+          <a:xfrm>
+            <a:off x="5033427" y="2856658"/>
+            <a:ext cx="0" cy="1400742"/>
+          </a:xfrm>
+          <a:prstGeom prst="line">
+            <a:avLst/>
+          </a:prstGeom>
+          <a:noFill/>
+          <a:ln w="12700">
+            <a:solidFill>
+              <a:schemeClr val="accent2">
+                <a:lumMod val="75000"/>
+              </a:schemeClr>
+            </a:solidFill>
+            <a:prstDash val="sysDot"/>
+          </a:ln>
+        </p:spPr>
+      </p:cxnSp>
+      <p:sp>
+        <p:nvSpPr>
+          <p:cNvPr id="21" name="TextBox 20">
+            <a:extLst>
+              <a:ext uri="{FF2B5EF4-FFF2-40B4-BE49-F238E27FC236}">
+                <a16:creationId xmlns:a16="http://schemas.microsoft.com/office/drawing/2014/main" id="{8274AF96-9474-3547-CE73-0EAF7DB4418B}"/>
+              </a:ext>
+            </a:extLst>
+          </p:cNvPr>
+          <p:cNvSpPr txBox="1"/>
+          <p:nvPr/>
+        </p:nvSpPr>
+        <p:spPr>
+          <a:xfrm>
+            <a:off x="9780242" y="2480505"/>
+            <a:ext cx="696024" cy="369332"/>
+          </a:xfrm>
+          <a:prstGeom prst="rect">
+            <a:avLst/>
+          </a:prstGeom>
+          <a:noFill/>
+          <a:ln w="12700">
+            <a:solidFill>
+              <a:schemeClr val="accent6">
+                <a:lumMod val="75000"/>
+              </a:schemeClr>
+            </a:solidFill>
+            <a:prstDash val="sysDot"/>
+          </a:ln>
+        </p:spPr>
+        <p:txBody>
+          <a:bodyPr wrap="none" rtlCol="0">
+            <a:spAutoFit/>
+          </a:bodyPr>
+          <a:lstStyle/>
+          <a:p>
+            <a:pPr algn="ctr"/>
+            <a:r>
+              <a:rPr lang="en-US" dirty="0"/>
+              <a:t>GSID</a:t>
+            </a:r>
+            <a:endParaRPr lang="en-SE" dirty="0"/>
+          </a:p>
+        </p:txBody>
+      </p:sp>
+      <p:cxnSp>
+        <p:nvCxnSpPr>
+          <p:cNvPr id="22" name="Straight Connector 21">
+            <a:extLst>
+              <a:ext uri="{FF2B5EF4-FFF2-40B4-BE49-F238E27FC236}">
+                <a16:creationId xmlns:a16="http://schemas.microsoft.com/office/drawing/2014/main" id="{14291B42-F8AF-132B-759E-85B521343158}"/>
+              </a:ext>
+            </a:extLst>
+          </p:cNvPr>
+          <p:cNvCxnSpPr>
+            <a:cxnSpLocks/>
+            <a:stCxn id="21" idx="2"/>
+            <a:endCxn id="4" idx="0"/>
+          </p:cNvCxnSpPr>
+          <p:nvPr/>
+        </p:nvCxnSpPr>
+        <p:spPr>
+          <a:xfrm>
+            <a:off x="10128254" y="2849837"/>
+            <a:ext cx="17988" cy="1407563"/>
+          </a:xfrm>
+          <a:prstGeom prst="line">
+            <a:avLst/>
+          </a:prstGeom>
+          <a:noFill/>
+          <a:ln w="12700">
+            <a:solidFill>
+              <a:schemeClr val="accent6">
+                <a:lumMod val="75000"/>
+              </a:schemeClr>
+            </a:solidFill>
+            <a:prstDash val="sysDot"/>
+          </a:ln>
+        </p:spPr>
+      </p:cxnSp>
+      <p:sp>
+        <p:nvSpPr>
+          <p:cNvPr id="23" name="Oval 22">
+            <a:extLst>
+              <a:ext uri="{FF2B5EF4-FFF2-40B4-BE49-F238E27FC236}">
+                <a16:creationId xmlns:a16="http://schemas.microsoft.com/office/drawing/2014/main" id="{2696E577-EA0E-8D2B-D359-BB7933550231}"/>
+              </a:ext>
+            </a:extLst>
+          </p:cNvPr>
+          <p:cNvSpPr/>
+          <p:nvPr/>
+        </p:nvSpPr>
+        <p:spPr>
+          <a:xfrm>
+            <a:off x="7764455" y="971144"/>
+            <a:ext cx="520705" cy="264870"/>
+          </a:xfrm>
+          <a:prstGeom prst="ellipse">
+            <a:avLst/>
+          </a:prstGeom>
+          <a:noFill/>
+        </p:spPr>
+        <p:style>
+          <a:lnRef idx="2">
+            <a:schemeClr val="accent1">
+              <a:shade val="15000"/>
+            </a:schemeClr>
+          </a:lnRef>
+          <a:fillRef idx="1">
+            <a:schemeClr val="accent1"/>
+          </a:fillRef>
+          <a:effectRef idx="0">
+            <a:schemeClr val="accent1"/>
+          </a:effectRef>
+          <a:fontRef idx="minor">
+            <a:schemeClr val="lt1"/>
+          </a:fontRef>
+        </p:style>
+        <p:txBody>
+          <a:bodyPr rtlCol="0" anchor="ctr"/>
+          <a:lstStyle/>
+          <a:p>
+            <a:pPr algn="ctr"/>
+            <a:endParaRPr lang="en-SE" sz="1000" dirty="0"/>
+          </a:p>
+        </p:txBody>
+      </p:sp>
+      <p:sp>
+        <p:nvSpPr>
+          <p:cNvPr id="24" name="Oval 23">
+            <a:extLst>
+              <a:ext uri="{FF2B5EF4-FFF2-40B4-BE49-F238E27FC236}">
+                <a16:creationId xmlns:a16="http://schemas.microsoft.com/office/drawing/2014/main" id="{EA488D83-CC91-0806-769E-ACB3E2F48A22}"/>
+              </a:ext>
+            </a:extLst>
+          </p:cNvPr>
+          <p:cNvSpPr/>
+          <p:nvPr/>
+        </p:nvSpPr>
+        <p:spPr>
+          <a:xfrm>
+            <a:off x="7764454" y="1289246"/>
+            <a:ext cx="520705" cy="264870"/>
+          </a:xfrm>
+          <a:prstGeom prst="ellipse">
+            <a:avLst/>
+          </a:prstGeom>
+          <a:noFill/>
+          <a:ln>
+            <a:prstDash val="sysDot"/>
+          </a:ln>
+        </p:spPr>
+        <p:style>
+          <a:lnRef idx="2">
+            <a:schemeClr val="accent1">
+              <a:shade val="15000"/>
+            </a:schemeClr>
+          </a:lnRef>
+          <a:fillRef idx="1">
+            <a:schemeClr val="accent1"/>
+          </a:fillRef>
+          <a:effectRef idx="0">
+            <a:schemeClr val="accent1"/>
+          </a:effectRef>
+          <a:fontRef idx="minor">
+            <a:schemeClr val="lt1"/>
+          </a:fontRef>
+        </p:style>
+        <p:txBody>
+          <a:bodyPr rtlCol="0" anchor="ctr"/>
+          <a:lstStyle/>
+          <a:p>
+            <a:pPr algn="ctr"/>
+            <a:endParaRPr lang="en-SE" sz="1000" dirty="0"/>
+          </a:p>
+        </p:txBody>
+      </p:sp>
+      <p:sp>
+        <p:nvSpPr>
+          <p:cNvPr id="25" name="TextBox 24">
+            <a:extLst>
+              <a:ext uri="{FF2B5EF4-FFF2-40B4-BE49-F238E27FC236}">
+                <a16:creationId xmlns:a16="http://schemas.microsoft.com/office/drawing/2014/main" id="{92AD23A7-99EC-1F85-1901-DA4AF705D958}"/>
+              </a:ext>
+            </a:extLst>
+          </p:cNvPr>
+          <p:cNvSpPr txBox="1"/>
+          <p:nvPr/>
+        </p:nvSpPr>
+        <p:spPr>
+          <a:xfrm>
+            <a:off x="8304525" y="893298"/>
+            <a:ext cx="2376035" cy="369332"/>
+          </a:xfrm>
+          <a:prstGeom prst="rect">
+            <a:avLst/>
+          </a:prstGeom>
+          <a:noFill/>
+        </p:spPr>
+        <p:txBody>
+          <a:bodyPr wrap="none" rtlCol="0">
+            <a:spAutoFit/>
+          </a:bodyPr>
+          <a:lstStyle/>
+          <a:p>
+            <a:pPr algn="ctr"/>
+            <a:r>
+              <a:rPr lang="en-US" dirty="0"/>
+              <a:t>resources in FHIR API</a:t>
+            </a:r>
+          </a:p>
+        </p:txBody>
+      </p:sp>
+      <p:sp>
+        <p:nvSpPr>
+          <p:cNvPr id="26" name="TextBox 25">
+            <a:extLst>
+              <a:ext uri="{FF2B5EF4-FFF2-40B4-BE49-F238E27FC236}">
+                <a16:creationId xmlns:a16="http://schemas.microsoft.com/office/drawing/2014/main" id="{225DB3B2-128E-9C7E-A9FB-AC03DE1BC690}"/>
+              </a:ext>
+            </a:extLst>
+          </p:cNvPr>
+          <p:cNvSpPr txBox="1"/>
+          <p:nvPr/>
+        </p:nvSpPr>
+        <p:spPr>
+          <a:xfrm>
+            <a:off x="8281598" y="1240668"/>
+            <a:ext cx="2120838" cy="369332"/>
+          </a:xfrm>
+          <a:prstGeom prst="rect">
+            <a:avLst/>
+          </a:prstGeom>
+          <a:noFill/>
+        </p:spPr>
+        <p:txBody>
+          <a:bodyPr wrap="none" rtlCol="0">
+            <a:spAutoFit/>
+          </a:bodyPr>
+          <a:lstStyle/>
+          <a:p>
+            <a:pPr algn="ctr"/>
+            <a:r>
+              <a:rPr lang="en-US" dirty="0"/>
+              <a:t>“virtual” resources</a:t>
+            </a:r>
+          </a:p>
+        </p:txBody>
+      </p:sp>
+      <p:sp>
+        <p:nvSpPr>
+          <p:cNvPr id="28" name="Oval 27">
+            <a:extLst>
+              <a:ext uri="{FF2B5EF4-FFF2-40B4-BE49-F238E27FC236}">
+                <a16:creationId xmlns:a16="http://schemas.microsoft.com/office/drawing/2014/main" id="{BBE5A372-B7CF-A8DE-0D78-2CEF6820E669}"/>
+              </a:ext>
+            </a:extLst>
+          </p:cNvPr>
+          <p:cNvSpPr/>
+          <p:nvPr/>
+        </p:nvSpPr>
+        <p:spPr>
+          <a:xfrm>
+            <a:off x="1307349" y="490793"/>
+            <a:ext cx="1866900" cy="990600"/>
+          </a:xfrm>
+          <a:prstGeom prst="ellipse">
+            <a:avLst/>
+          </a:prstGeom>
+          <a:solidFill>
+            <a:schemeClr val="accent5">
+              <a:lumMod val="75000"/>
+            </a:schemeClr>
+          </a:solidFill>
+          <a:ln>
+            <a:prstDash val="sysDot"/>
+          </a:ln>
+        </p:spPr>
+        <p:style>
+          <a:lnRef idx="2">
+            <a:schemeClr val="dk1">
+              <a:shade val="15000"/>
+            </a:schemeClr>
+          </a:lnRef>
+          <a:fillRef idx="1">
+            <a:schemeClr val="dk1"/>
+          </a:fillRef>
+          <a:effectRef idx="0">
+            <a:schemeClr val="dk1"/>
+          </a:effectRef>
+          <a:fontRef idx="minor">
+            <a:schemeClr val="lt1"/>
+          </a:fontRef>
+        </p:style>
+        <p:txBody>
+          <a:bodyPr rtlCol="0" anchor="ctr"/>
+          <a:lstStyle/>
+          <a:p>
+            <a:pPr algn="ctr"/>
+            <a:r>
+              <a:rPr lang="en-US" sz="1600" dirty="0"/>
+              <a:t>Organization</a:t>
+            </a:r>
+          </a:p>
+          <a:p>
+            <a:pPr algn="ctr"/>
+            <a:r>
+              <a:rPr lang="en-US" sz="1000" dirty="0"/>
+              <a:t>name </a:t>
+            </a:r>
+          </a:p>
+          <a:p>
+            <a:pPr algn="ctr"/>
+            <a:r>
+              <a:rPr lang="en-US" sz="1000" dirty="0"/>
+              <a:t>type = MAH</a:t>
+            </a:r>
+            <a:endParaRPr lang="en-SE" sz="1000" dirty="0"/>
+          </a:p>
+        </p:txBody>
+      </p:sp>
+      <p:cxnSp>
+        <p:nvCxnSpPr>
+          <p:cNvPr id="29" name="Straight Arrow Connector 17">
+            <a:extLst>
+              <a:ext uri="{FF2B5EF4-FFF2-40B4-BE49-F238E27FC236}">
+                <a16:creationId xmlns:a16="http://schemas.microsoft.com/office/drawing/2014/main" id="{7223C95A-9ED2-AA29-AD95-11DC1CEFE963}"/>
+              </a:ext>
+            </a:extLst>
+          </p:cNvPr>
+          <p:cNvCxnSpPr>
+            <a:cxnSpLocks/>
+            <a:stCxn id="30" idx="4"/>
+            <a:endCxn id="2" idx="0"/>
+          </p:cNvCxnSpPr>
+          <p:nvPr/>
+        </p:nvCxnSpPr>
+        <p:spPr>
+          <a:xfrm rot="5400000">
+            <a:off x="1737125" y="3452155"/>
+            <a:ext cx="1087769" cy="522721"/>
+          </a:xfrm>
+          <a:prstGeom prst="curvedConnector3">
+            <a:avLst>
+              <a:gd name="adj1" fmla="val 50000"/>
+            </a:avLst>
+          </a:prstGeom>
+          <a:ln>
+            <a:tailEnd type="triangle"/>
+          </a:ln>
+        </p:spPr>
+        <p:style>
+          <a:lnRef idx="2">
+            <a:schemeClr val="accent1"/>
+          </a:lnRef>
+          <a:fillRef idx="0">
+            <a:schemeClr val="accent1"/>
+          </a:fillRef>
+          <a:effectRef idx="1">
+            <a:schemeClr val="accent1"/>
+          </a:effectRef>
+          <a:fontRef idx="minor">
+            <a:schemeClr val="tx1"/>
+          </a:fontRef>
+        </p:style>
+      </p:cxnSp>
+      <p:sp>
+        <p:nvSpPr>
+          <p:cNvPr id="30" name="Oval 29">
+            <a:extLst>
+              <a:ext uri="{FF2B5EF4-FFF2-40B4-BE49-F238E27FC236}">
+                <a16:creationId xmlns:a16="http://schemas.microsoft.com/office/drawing/2014/main" id="{9EC0AB09-5F99-3B01-A829-5F8F22FEF5A3}"/>
+              </a:ext>
+            </a:extLst>
+          </p:cNvPr>
+          <p:cNvSpPr/>
+          <p:nvPr/>
+        </p:nvSpPr>
+        <p:spPr>
+          <a:xfrm>
+            <a:off x="1608919" y="2179031"/>
+            <a:ext cx="1866900" cy="990600"/>
+          </a:xfrm>
+          <a:prstGeom prst="ellipse">
+            <a:avLst/>
+          </a:prstGeom>
+          <a:ln>
+            <a:prstDash val="sysDot"/>
+          </a:ln>
+        </p:spPr>
+        <p:style>
+          <a:lnRef idx="2">
+            <a:schemeClr val="accent4">
+              <a:shade val="15000"/>
+            </a:schemeClr>
+          </a:lnRef>
+          <a:fillRef idx="1">
+            <a:schemeClr val="accent4"/>
+          </a:fillRef>
+          <a:effectRef idx="0">
+            <a:schemeClr val="accent4"/>
+          </a:effectRef>
+          <a:fontRef idx="minor">
+            <a:schemeClr val="lt1"/>
+          </a:fontRef>
+        </p:style>
+        <p:txBody>
+          <a:bodyPr rtlCol="0" anchor="ctr"/>
+          <a:lstStyle/>
+          <a:p>
+            <a:pPr algn="ctr"/>
+            <a:r>
+              <a:rPr lang="en-US" sz="1400" dirty="0"/>
+              <a:t>Regulated</a:t>
+            </a:r>
+          </a:p>
+          <a:p>
+            <a:pPr algn="ctr"/>
+            <a:r>
+              <a:rPr lang="en-US" sz="1400" dirty="0"/>
+              <a:t>Authorization</a:t>
+            </a:r>
+          </a:p>
+          <a:p>
+            <a:pPr algn="ctr"/>
+            <a:r>
+              <a:rPr lang="en-US" sz="1000" dirty="0"/>
+              <a:t>identifier</a:t>
+            </a:r>
+            <a:endParaRPr lang="en-SE" sz="1000" dirty="0"/>
+          </a:p>
+        </p:txBody>
+      </p:sp>
+      <p:cxnSp>
+        <p:nvCxnSpPr>
+          <p:cNvPr id="31" name="Straight Arrow Connector 33">
+            <a:extLst>
+              <a:ext uri="{FF2B5EF4-FFF2-40B4-BE49-F238E27FC236}">
+                <a16:creationId xmlns:a16="http://schemas.microsoft.com/office/drawing/2014/main" id="{901D4B3A-BA28-8880-8A1F-2F1F984C5DA1}"/>
+              </a:ext>
+            </a:extLst>
+          </p:cNvPr>
+          <p:cNvCxnSpPr>
+            <a:cxnSpLocks/>
+            <a:stCxn id="2" idx="1"/>
+            <a:endCxn id="30" idx="2"/>
+          </p:cNvCxnSpPr>
+          <p:nvPr/>
+        </p:nvCxnSpPr>
+        <p:spPr>
+          <a:xfrm rot="5400000" flipH="1" flipV="1">
+            <a:off x="620190" y="3413741"/>
+            <a:ext cx="1728139" cy="249320"/>
+          </a:xfrm>
+          <a:prstGeom prst="curvedConnector2">
+            <a:avLst/>
+          </a:prstGeom>
+          <a:ln>
+            <a:prstDash val="dash"/>
+            <a:tailEnd type="triangle"/>
+          </a:ln>
+        </p:spPr>
+        <p:style>
+          <a:lnRef idx="2">
+            <a:schemeClr val="accent1"/>
+          </a:lnRef>
+          <a:fillRef idx="0">
+            <a:schemeClr val="accent1"/>
+          </a:fillRef>
+          <a:effectRef idx="1">
+            <a:schemeClr val="accent1"/>
+          </a:effectRef>
+          <a:fontRef idx="minor">
+            <a:schemeClr val="tx1"/>
+          </a:fontRef>
+        </p:style>
+      </p:cxnSp>
+      <p:sp>
+        <p:nvSpPr>
+          <p:cNvPr id="32" name="TextBox 31">
+            <a:extLst>
+              <a:ext uri="{FF2B5EF4-FFF2-40B4-BE49-F238E27FC236}">
+                <a16:creationId xmlns:a16="http://schemas.microsoft.com/office/drawing/2014/main" id="{C8420EF3-D789-82AE-4226-9918B6D10858}"/>
+              </a:ext>
+            </a:extLst>
+          </p:cNvPr>
+          <p:cNvSpPr txBox="1"/>
+          <p:nvPr/>
+        </p:nvSpPr>
+        <p:spPr>
+          <a:xfrm>
+            <a:off x="317403" y="3244334"/>
+            <a:ext cx="1190454" cy="369332"/>
+          </a:xfrm>
+          <a:prstGeom prst="rect">
+            <a:avLst/>
+          </a:prstGeom>
+          <a:noFill/>
+        </p:spPr>
+        <p:txBody>
+          <a:bodyPr wrap="none" rtlCol="0">
+            <a:spAutoFit/>
+          </a:bodyPr>
+          <a:lstStyle/>
+          <a:p>
+            <a:r>
+              <a:rPr lang="en-US" dirty="0"/>
+              <a:t>contained</a:t>
+            </a:r>
+            <a:endParaRPr lang="en-SE" dirty="0"/>
+          </a:p>
+        </p:txBody>
+      </p:sp>
+      <p:cxnSp>
+        <p:nvCxnSpPr>
+          <p:cNvPr id="33" name="Straight Arrow Connector 33">
+            <a:extLst>
+              <a:ext uri="{FF2B5EF4-FFF2-40B4-BE49-F238E27FC236}">
+                <a16:creationId xmlns:a16="http://schemas.microsoft.com/office/drawing/2014/main" id="{91176DC8-6DFD-228E-EDF8-7E9478441FD6}"/>
+              </a:ext>
+            </a:extLst>
+          </p:cNvPr>
+          <p:cNvCxnSpPr>
+            <a:cxnSpLocks/>
+            <a:stCxn id="2" idx="2"/>
+            <a:endCxn id="28" idx="2"/>
+          </p:cNvCxnSpPr>
+          <p:nvPr/>
+        </p:nvCxnSpPr>
+        <p:spPr>
+          <a:xfrm rot="10800000" flipH="1">
+            <a:off x="1086197" y="986094"/>
+            <a:ext cx="221151" cy="3766607"/>
+          </a:xfrm>
+          <a:prstGeom prst="curvedConnector3">
+            <a:avLst>
+              <a:gd name="adj1" fmla="val -103368"/>
+            </a:avLst>
+          </a:prstGeom>
+          <a:ln>
+            <a:prstDash val="dash"/>
+            <a:tailEnd type="triangle"/>
+          </a:ln>
+        </p:spPr>
+        <p:style>
+          <a:lnRef idx="2">
+            <a:schemeClr val="accent1"/>
+          </a:lnRef>
+          <a:fillRef idx="0">
+            <a:schemeClr val="accent1"/>
+          </a:fillRef>
+          <a:effectRef idx="1">
+            <a:schemeClr val="accent1"/>
+          </a:effectRef>
+          <a:fontRef idx="minor">
+            <a:schemeClr val="tx1"/>
+          </a:fontRef>
+        </p:style>
+      </p:cxnSp>
+      <p:sp>
+        <p:nvSpPr>
+          <p:cNvPr id="34" name="TextBox 33">
+            <a:extLst>
+              <a:ext uri="{FF2B5EF4-FFF2-40B4-BE49-F238E27FC236}">
+                <a16:creationId xmlns:a16="http://schemas.microsoft.com/office/drawing/2014/main" id="{5B8FFD25-F4F5-EA35-462E-8737B4EE0E8A}"/>
+              </a:ext>
+            </a:extLst>
+          </p:cNvPr>
+          <p:cNvSpPr txBox="1"/>
+          <p:nvPr/>
+        </p:nvSpPr>
+        <p:spPr>
+          <a:xfrm>
+            <a:off x="24245" y="1112060"/>
+            <a:ext cx="1190454" cy="369332"/>
+          </a:xfrm>
+          <a:prstGeom prst="rect">
+            <a:avLst/>
+          </a:prstGeom>
+          <a:noFill/>
+        </p:spPr>
+        <p:txBody>
+          <a:bodyPr wrap="none" rtlCol="0">
+            <a:spAutoFit/>
+          </a:bodyPr>
+          <a:lstStyle/>
+          <a:p>
+            <a:r>
+              <a:rPr lang="en-US" dirty="0"/>
+              <a:t>contained</a:t>
+            </a:r>
+            <a:endParaRPr lang="en-SE" dirty="0"/>
+          </a:p>
+        </p:txBody>
+      </p:sp>
+      <p:sp>
+        <p:nvSpPr>
+          <p:cNvPr id="35" name="TextBox 34">
+            <a:extLst>
+              <a:ext uri="{FF2B5EF4-FFF2-40B4-BE49-F238E27FC236}">
+                <a16:creationId xmlns:a16="http://schemas.microsoft.com/office/drawing/2014/main" id="{94E7F48B-0DB6-288D-3394-58FC9A8B9AA0}"/>
+              </a:ext>
+            </a:extLst>
+          </p:cNvPr>
+          <p:cNvSpPr txBox="1"/>
+          <p:nvPr/>
+        </p:nvSpPr>
+        <p:spPr>
+          <a:xfrm>
+            <a:off x="2542369" y="3219889"/>
+            <a:ext cx="1406154" cy="369332"/>
+          </a:xfrm>
+          <a:prstGeom prst="rect">
+            <a:avLst/>
+          </a:prstGeom>
+          <a:noFill/>
+        </p:spPr>
+        <p:txBody>
+          <a:bodyPr wrap="none" rtlCol="0">
+            <a:spAutoFit/>
+          </a:bodyPr>
+          <a:lstStyle/>
+          <a:p>
+            <a:r>
+              <a:rPr lang="en-US" dirty="0"/>
+              <a:t>subject (1..1)</a:t>
+            </a:r>
+            <a:endParaRPr lang="en-SE" dirty="0"/>
+          </a:p>
+        </p:txBody>
+      </p:sp>
+      <p:cxnSp>
+        <p:nvCxnSpPr>
+          <p:cNvPr id="36" name="Straight Arrow Connector 17">
+            <a:extLst>
+              <a:ext uri="{FF2B5EF4-FFF2-40B4-BE49-F238E27FC236}">
+                <a16:creationId xmlns:a16="http://schemas.microsoft.com/office/drawing/2014/main" id="{858D1E0F-325C-39FA-AC34-AB85C5AFD4A9}"/>
+              </a:ext>
+            </a:extLst>
+          </p:cNvPr>
+          <p:cNvCxnSpPr>
+            <a:cxnSpLocks/>
+            <a:stCxn id="30" idx="0"/>
+            <a:endCxn id="28" idx="4"/>
+          </p:cNvCxnSpPr>
+          <p:nvPr/>
+        </p:nvCxnSpPr>
+        <p:spPr>
+          <a:xfrm rot="16200000" flipV="1">
+            <a:off x="2042765" y="1679427"/>
+            <a:ext cx="697638" cy="301570"/>
+          </a:xfrm>
+          <a:prstGeom prst="curvedConnector3">
+            <a:avLst>
+              <a:gd name="adj1" fmla="val 50000"/>
+            </a:avLst>
+          </a:prstGeom>
+          <a:ln>
+            <a:tailEnd type="triangle"/>
+          </a:ln>
+        </p:spPr>
+        <p:style>
+          <a:lnRef idx="2">
+            <a:schemeClr val="accent1"/>
+          </a:lnRef>
+          <a:fillRef idx="0">
+            <a:schemeClr val="accent1"/>
+          </a:fillRef>
+          <a:effectRef idx="1">
+            <a:schemeClr val="accent1"/>
+          </a:effectRef>
+          <a:fontRef idx="minor">
+            <a:schemeClr val="tx1"/>
+          </a:fontRef>
+        </p:style>
+      </p:cxnSp>
+      <p:sp>
+        <p:nvSpPr>
+          <p:cNvPr id="37" name="TextBox 36">
+            <a:extLst>
+              <a:ext uri="{FF2B5EF4-FFF2-40B4-BE49-F238E27FC236}">
+                <a16:creationId xmlns:a16="http://schemas.microsoft.com/office/drawing/2014/main" id="{1D5F8B28-3288-D0DB-079E-2864E255F3D8}"/>
+              </a:ext>
+            </a:extLst>
+          </p:cNvPr>
+          <p:cNvSpPr txBox="1"/>
+          <p:nvPr/>
+        </p:nvSpPr>
+        <p:spPr>
+          <a:xfrm>
+            <a:off x="2717036" y="1735102"/>
+            <a:ext cx="1364476" cy="369332"/>
+          </a:xfrm>
+          <a:prstGeom prst="rect">
+            <a:avLst/>
+          </a:prstGeom>
+          <a:noFill/>
+        </p:spPr>
+        <p:txBody>
+          <a:bodyPr wrap="none" rtlCol="0">
+            <a:spAutoFit/>
+          </a:bodyPr>
+          <a:lstStyle/>
+          <a:p>
+            <a:r>
+              <a:rPr lang="en-US" dirty="0"/>
+              <a:t>holder (0..1)</a:t>
+            </a:r>
+            <a:endParaRPr lang="en-SE" dirty="0"/>
+          </a:p>
+        </p:txBody>
+      </p:sp>
+    </p:spTree>
+    <p:extLst>
+      <p:ext uri="{BB962C8B-B14F-4D97-AF65-F5344CB8AC3E}">
+        <p14:creationId xmlns:p14="http://schemas.microsoft.com/office/powerpoint/2010/main" val="3938456585"/>
+      </p:ext>
+    </p:extLst>
+  </p:cSld>
+  <p:clrMapOvr>
+    <a:masterClrMapping/>
+  </p:clrMapOvr>
+  <p:timing>
+    <p:tnLst>
+      <p:par>
+        <p:cTn id="1" dur="indefinite" restart="never" nodeType="tmRoot">
+          <p:childTnLst>
+            <p:seq concurrent="1" nextAc="seek">
+              <p:cTn id="2" dur="indefinite" nodeType="mainSeq">
+                <p:childTnLst>
+                  <p:par>
+                    <p:cTn id="3" fill="hold">
+                      <p:stCondLst>
+                        <p:cond delay="indefinite"/>
+                      </p:stCondLst>
+                      <p:childTnLst>
+                        <p:par>
+                          <p:cTn id="4" fill="hold">
+                            <p:stCondLst>
+                              <p:cond delay="0"/>
+                            </p:stCondLst>
+                            <p:childTnLst>
+                              <p:par>
+                                <p:cTn id="5" presetID="1" presetClass="entr" presetSubtype="0" fill="hold" grpId="0" nodeType="clickEffect">
+                                  <p:stCondLst>
+                                    <p:cond delay="0"/>
+                                  </p:stCondLst>
+                                  <p:childTnLst>
+                                    <p:set>
+                                      <p:cBhvr>
+                                        <p:cTn id="6" dur="1" fill="hold">
+                                          <p:stCondLst>
+                                            <p:cond delay="0"/>
+                                          </p:stCondLst>
+                                        </p:cTn>
+                                        <p:tgtEl>
+                                          <p:spTgt spid="3"/>
+                                        </p:tgtEl>
+                                        <p:attrNameLst>
+                                          <p:attrName>style.visibility</p:attrName>
+                                        </p:attrNameLst>
+                                      </p:cBhvr>
+                                      <p:to>
+                                        <p:strVal val="visible"/>
+                                      </p:to>
+                                    </p:set>
+                                  </p:childTnLst>
+                                </p:cTn>
+                              </p:par>
+                            </p:childTnLst>
+                          </p:cTn>
+                        </p:par>
+                      </p:childTnLst>
+                    </p:cTn>
+                  </p:par>
+                  <p:par>
+                    <p:cTn id="7" fill="hold">
+                      <p:stCondLst>
+                        <p:cond delay="indefinite"/>
+                      </p:stCondLst>
+                      <p:childTnLst>
+                        <p:par>
+                          <p:cTn id="8" fill="hold">
+                            <p:stCondLst>
+                              <p:cond delay="0"/>
+                            </p:stCondLst>
+                            <p:childTnLst>
+                              <p:par>
+                                <p:cTn id="9" presetID="1" presetClass="entr" presetSubtype="0" fill="hold" nodeType="clickEffect">
+                                  <p:stCondLst>
+                                    <p:cond delay="0"/>
+                                  </p:stCondLst>
+                                  <p:childTnLst>
+                                    <p:set>
+                                      <p:cBhvr>
+                                        <p:cTn id="10" dur="1" fill="hold">
+                                          <p:stCondLst>
+                                            <p:cond delay="0"/>
+                                          </p:stCondLst>
+                                        </p:cTn>
+                                        <p:tgtEl>
+                                          <p:spTgt spid="20"/>
+                                        </p:tgtEl>
+                                        <p:attrNameLst>
+                                          <p:attrName>style.visibility</p:attrName>
+                                        </p:attrNameLst>
+                                      </p:cBhvr>
+                                      <p:to>
+                                        <p:strVal val="visible"/>
+                                      </p:to>
+                                    </p:set>
+                                  </p:childTnLst>
+                                </p:cTn>
+                              </p:par>
+                              <p:par>
+                                <p:cTn id="11" presetID="1" presetClass="entr" presetSubtype="0" fill="hold" grpId="0" nodeType="withEffect">
+                                  <p:stCondLst>
+                                    <p:cond delay="0"/>
+                                  </p:stCondLst>
+                                  <p:childTnLst>
+                                    <p:set>
+                                      <p:cBhvr>
+                                        <p:cTn id="12" dur="1" fill="hold">
+                                          <p:stCondLst>
+                                            <p:cond delay="0"/>
+                                          </p:stCondLst>
+                                        </p:cTn>
+                                        <p:tgtEl>
+                                          <p:spTgt spid="19"/>
+                                        </p:tgtEl>
+                                        <p:attrNameLst>
+                                          <p:attrName>style.visibility</p:attrName>
+                                        </p:attrNameLst>
+                                      </p:cBhvr>
+                                      <p:to>
+                                        <p:strVal val="visible"/>
+                                      </p:to>
+                                    </p:set>
+                                  </p:childTnLst>
+                                </p:cTn>
+                              </p:par>
+                            </p:childTnLst>
+                          </p:cTn>
+                        </p:par>
+                      </p:childTnLst>
+                    </p:cTn>
+                  </p:par>
+                  <p:par>
+                    <p:cTn id="13" fill="hold">
+                      <p:stCondLst>
+                        <p:cond delay="indefinite"/>
+                      </p:stCondLst>
+                      <p:childTnLst>
+                        <p:par>
+                          <p:cTn id="14" fill="hold">
+                            <p:stCondLst>
+                              <p:cond delay="0"/>
+                            </p:stCondLst>
+                            <p:childTnLst>
+                              <p:par>
+                                <p:cTn id="15" presetID="1" presetClass="entr" presetSubtype="0" fill="hold" grpId="0" nodeType="clickEffect">
+                                  <p:stCondLst>
+                                    <p:cond delay="0"/>
+                                  </p:stCondLst>
+                                  <p:childTnLst>
+                                    <p:set>
+                                      <p:cBhvr>
+                                        <p:cTn id="16" dur="1" fill="hold">
+                                          <p:stCondLst>
+                                            <p:cond delay="0"/>
+                                          </p:stCondLst>
+                                        </p:cTn>
+                                        <p:tgtEl>
+                                          <p:spTgt spid="12"/>
+                                        </p:tgtEl>
+                                        <p:attrNameLst>
+                                          <p:attrName>style.visibility</p:attrName>
+                                        </p:attrNameLst>
+                                      </p:cBhvr>
+                                      <p:to>
+                                        <p:strVal val="visible"/>
+                                      </p:to>
+                                    </p:set>
+                                  </p:childTnLst>
+                                </p:cTn>
+                              </p:par>
+                              <p:par>
+                                <p:cTn id="17" presetID="1" presetClass="entr" presetSubtype="0" fill="hold" nodeType="withEffect">
+                                  <p:stCondLst>
+                                    <p:cond delay="0"/>
+                                  </p:stCondLst>
+                                  <p:childTnLst>
+                                    <p:set>
+                                      <p:cBhvr>
+                                        <p:cTn id="18" dur="1" fill="hold">
+                                          <p:stCondLst>
+                                            <p:cond delay="0"/>
+                                          </p:stCondLst>
+                                        </p:cTn>
+                                        <p:tgtEl>
+                                          <p:spTgt spid="11"/>
+                                        </p:tgtEl>
+                                        <p:attrNameLst>
+                                          <p:attrName>style.visibility</p:attrName>
+                                        </p:attrNameLst>
+                                      </p:cBhvr>
+                                      <p:to>
+                                        <p:strVal val="visible"/>
+                                      </p:to>
+                                    </p:set>
+                                  </p:childTnLst>
+                                </p:cTn>
+                              </p:par>
+                            </p:childTnLst>
+                          </p:cTn>
+                        </p:par>
+                      </p:childTnLst>
+                    </p:cTn>
+                  </p:par>
+                  <p:par>
+                    <p:cTn id="19" fill="hold">
+                      <p:stCondLst>
+                        <p:cond delay="indefinite"/>
+                      </p:stCondLst>
+                      <p:childTnLst>
+                        <p:par>
+                          <p:cTn id="20" fill="hold">
+                            <p:stCondLst>
+                              <p:cond delay="0"/>
+                            </p:stCondLst>
+                            <p:childTnLst>
+                              <p:par>
+                                <p:cTn id="21" presetID="1" presetClass="entr" presetSubtype="0" fill="hold" grpId="0" nodeType="clickEffect">
+                                  <p:stCondLst>
+                                    <p:cond delay="0"/>
+                                  </p:stCondLst>
+                                  <p:childTnLst>
+                                    <p:set>
+                                      <p:cBhvr>
+                                        <p:cTn id="22" dur="1" fill="hold">
+                                          <p:stCondLst>
+                                            <p:cond delay="0"/>
+                                          </p:stCondLst>
+                                        </p:cTn>
+                                        <p:tgtEl>
+                                          <p:spTgt spid="5"/>
+                                        </p:tgtEl>
+                                        <p:attrNameLst>
+                                          <p:attrName>style.visibility</p:attrName>
+                                        </p:attrNameLst>
+                                      </p:cBhvr>
+                                      <p:to>
+                                        <p:strVal val="visible"/>
+                                      </p:to>
+                                    </p:set>
+                                  </p:childTnLst>
+                                </p:cTn>
+                              </p:par>
+                              <p:par>
+                                <p:cTn id="23" presetID="1" presetClass="entr" presetSubtype="0" fill="hold" nodeType="withEffect">
+                                  <p:stCondLst>
+                                    <p:cond delay="0"/>
+                                  </p:stCondLst>
+                                  <p:childTnLst>
+                                    <p:set>
+                                      <p:cBhvr>
+                                        <p:cTn id="24" dur="1" fill="hold">
+                                          <p:stCondLst>
+                                            <p:cond delay="0"/>
+                                          </p:stCondLst>
+                                        </p:cTn>
+                                        <p:tgtEl>
+                                          <p:spTgt spid="7"/>
+                                        </p:tgtEl>
+                                        <p:attrNameLst>
+                                          <p:attrName>style.visibility</p:attrName>
+                                        </p:attrNameLst>
+                                      </p:cBhvr>
+                                      <p:to>
+                                        <p:strVal val="visible"/>
+                                      </p:to>
+                                    </p:set>
+                                  </p:childTnLst>
+                                </p:cTn>
+                              </p:par>
+                              <p:par>
+                                <p:cTn id="25" presetID="1" presetClass="entr" presetSubtype="0" fill="hold" grpId="0" nodeType="withEffect">
+                                  <p:stCondLst>
+                                    <p:cond delay="0"/>
+                                  </p:stCondLst>
+                                  <p:childTnLst>
+                                    <p:set>
+                                      <p:cBhvr>
+                                        <p:cTn id="26" dur="1" fill="hold">
+                                          <p:stCondLst>
+                                            <p:cond delay="0"/>
+                                          </p:stCondLst>
+                                        </p:cTn>
+                                        <p:tgtEl>
+                                          <p:spTgt spid="15"/>
+                                        </p:tgtEl>
+                                        <p:attrNameLst>
+                                          <p:attrName>style.visibility</p:attrName>
+                                        </p:attrNameLst>
+                                      </p:cBhvr>
+                                      <p:to>
+                                        <p:strVal val="visible"/>
+                                      </p:to>
+                                    </p:set>
+                                  </p:childTnLst>
+                                </p:cTn>
+                              </p:par>
+                            </p:childTnLst>
+                          </p:cTn>
+                        </p:par>
+                      </p:childTnLst>
+                    </p:cTn>
+                  </p:par>
+                  <p:par>
+                    <p:cTn id="27" fill="hold">
+                      <p:stCondLst>
+                        <p:cond delay="indefinite"/>
+                      </p:stCondLst>
+                      <p:childTnLst>
+                        <p:par>
+                          <p:cTn id="28" fill="hold">
+                            <p:stCondLst>
+                              <p:cond delay="0"/>
+                            </p:stCondLst>
+                            <p:childTnLst>
+                              <p:par>
+                                <p:cTn id="29" presetID="1" presetClass="entr" presetSubtype="0" fill="hold" nodeType="clickEffect">
+                                  <p:stCondLst>
+                                    <p:cond delay="0"/>
+                                  </p:stCondLst>
+                                  <p:childTnLst>
+                                    <p:set>
+                                      <p:cBhvr>
+                                        <p:cTn id="30" dur="1" fill="hold">
+                                          <p:stCondLst>
+                                            <p:cond delay="0"/>
+                                          </p:stCondLst>
+                                        </p:cTn>
+                                        <p:tgtEl>
+                                          <p:spTgt spid="17"/>
+                                        </p:tgtEl>
+                                        <p:attrNameLst>
+                                          <p:attrName>style.visibility</p:attrName>
+                                        </p:attrNameLst>
+                                      </p:cBhvr>
+                                      <p:to>
+                                        <p:strVal val="visible"/>
+                                      </p:to>
+                                    </p:set>
+                                  </p:childTnLst>
+                                </p:cTn>
+                              </p:par>
+                              <p:par>
+                                <p:cTn id="31" presetID="1" presetClass="entr" presetSubtype="0" fill="hold" grpId="0" nodeType="withEffect">
+                                  <p:stCondLst>
+                                    <p:cond delay="0"/>
+                                  </p:stCondLst>
+                                  <p:childTnLst>
+                                    <p:set>
+                                      <p:cBhvr>
+                                        <p:cTn id="32" dur="1" fill="hold">
+                                          <p:stCondLst>
+                                            <p:cond delay="0"/>
+                                          </p:stCondLst>
+                                        </p:cTn>
+                                        <p:tgtEl>
+                                          <p:spTgt spid="18"/>
+                                        </p:tgtEl>
+                                        <p:attrNameLst>
+                                          <p:attrName>style.visibility</p:attrName>
+                                        </p:attrNameLst>
+                                      </p:cBhvr>
+                                      <p:to>
+                                        <p:strVal val="visible"/>
+                                      </p:to>
+                                    </p:set>
+                                  </p:childTnLst>
+                                </p:cTn>
+                              </p:par>
+                            </p:childTnLst>
+                          </p:cTn>
+                        </p:par>
+                      </p:childTnLst>
+                    </p:cTn>
+                  </p:par>
+                  <p:par>
+                    <p:cTn id="33" fill="hold">
+                      <p:stCondLst>
+                        <p:cond delay="indefinite"/>
+                      </p:stCondLst>
+                      <p:childTnLst>
+                        <p:par>
+                          <p:cTn id="34" fill="hold">
+                            <p:stCondLst>
+                              <p:cond delay="0"/>
+                            </p:stCondLst>
+                            <p:childTnLst>
+                              <p:par>
+                                <p:cTn id="35" presetID="1" presetClass="entr" presetSubtype="0" fill="hold" nodeType="clickEffect">
+                                  <p:stCondLst>
+                                    <p:cond delay="0"/>
+                                  </p:stCondLst>
+                                  <p:childTnLst>
+                                    <p:set>
+                                      <p:cBhvr>
+                                        <p:cTn id="36" dur="1" fill="hold">
+                                          <p:stCondLst>
+                                            <p:cond delay="0"/>
+                                          </p:stCondLst>
+                                        </p:cTn>
+                                        <p:tgtEl>
+                                          <p:spTgt spid="8"/>
+                                        </p:tgtEl>
+                                        <p:attrNameLst>
+                                          <p:attrName>style.visibility</p:attrName>
+                                        </p:attrNameLst>
+                                      </p:cBhvr>
+                                      <p:to>
+                                        <p:strVal val="visible"/>
+                                      </p:to>
+                                    </p:set>
+                                  </p:childTnLst>
+                                </p:cTn>
+                              </p:par>
+                              <p:par>
+                                <p:cTn id="37" presetID="1" presetClass="entr" presetSubtype="0" fill="hold" grpId="0" nodeType="withEffect">
+                                  <p:stCondLst>
+                                    <p:cond delay="0"/>
+                                  </p:stCondLst>
+                                  <p:childTnLst>
+                                    <p:set>
+                                      <p:cBhvr>
+                                        <p:cTn id="38" dur="1" fill="hold">
+                                          <p:stCondLst>
+                                            <p:cond delay="0"/>
+                                          </p:stCondLst>
+                                        </p:cTn>
+                                        <p:tgtEl>
+                                          <p:spTgt spid="16"/>
+                                        </p:tgtEl>
+                                        <p:attrNameLst>
+                                          <p:attrName>style.visibility</p:attrName>
+                                        </p:attrNameLst>
+                                      </p:cBhvr>
+                                      <p:to>
+                                        <p:strVal val="visible"/>
+                                      </p:to>
+                                    </p:set>
+                                  </p:childTnLst>
+                                </p:cTn>
+                              </p:par>
+                              <p:par>
+                                <p:cTn id="39" presetID="1" presetClass="entr" presetSubtype="0" fill="hold" grpId="0" nodeType="withEffect">
+                                  <p:stCondLst>
+                                    <p:cond delay="0"/>
+                                  </p:stCondLst>
+                                  <p:childTnLst>
+                                    <p:set>
+                                      <p:cBhvr>
+                                        <p:cTn id="40" dur="1" fill="hold">
+                                          <p:stCondLst>
+                                            <p:cond delay="0"/>
+                                          </p:stCondLst>
+                                        </p:cTn>
+                                        <p:tgtEl>
+                                          <p:spTgt spid="4"/>
+                                        </p:tgtEl>
+                                        <p:attrNameLst>
+                                          <p:attrName>style.visibility</p:attrName>
+                                        </p:attrNameLst>
+                                      </p:cBhvr>
+                                      <p:to>
+                                        <p:strVal val="visible"/>
+                                      </p:to>
+                                    </p:set>
+                                  </p:childTnLst>
+                                </p:cTn>
+                              </p:par>
+                            </p:childTnLst>
+                          </p:cTn>
+                        </p:par>
+                      </p:childTnLst>
+                    </p:cTn>
+                  </p:par>
+                  <p:par>
+                    <p:cTn id="41" fill="hold">
+                      <p:stCondLst>
+                        <p:cond delay="indefinite"/>
+                      </p:stCondLst>
+                      <p:childTnLst>
+                        <p:par>
+                          <p:cTn id="42" fill="hold">
+                            <p:stCondLst>
+                              <p:cond delay="0"/>
+                            </p:stCondLst>
+                            <p:childTnLst>
+                              <p:par>
+                                <p:cTn id="43" presetID="1" presetClass="entr" presetSubtype="0" fill="hold" nodeType="clickEffect">
+                                  <p:stCondLst>
+                                    <p:cond delay="0"/>
+                                  </p:stCondLst>
+                                  <p:childTnLst>
+                                    <p:set>
+                                      <p:cBhvr>
+                                        <p:cTn id="44" dur="1" fill="hold">
+                                          <p:stCondLst>
+                                            <p:cond delay="0"/>
+                                          </p:stCondLst>
+                                        </p:cTn>
+                                        <p:tgtEl>
+                                          <p:spTgt spid="22"/>
+                                        </p:tgtEl>
+                                        <p:attrNameLst>
+                                          <p:attrName>style.visibility</p:attrName>
+                                        </p:attrNameLst>
+                                      </p:cBhvr>
+                                      <p:to>
+                                        <p:strVal val="visible"/>
+                                      </p:to>
+                                    </p:set>
+                                  </p:childTnLst>
+                                </p:cTn>
+                              </p:par>
+                              <p:par>
+                                <p:cTn id="45" presetID="1" presetClass="entr" presetSubtype="0" fill="hold" grpId="0" nodeType="withEffect">
+                                  <p:stCondLst>
+                                    <p:cond delay="0"/>
+                                  </p:stCondLst>
+                                  <p:childTnLst>
+                                    <p:set>
+                                      <p:cBhvr>
+                                        <p:cTn id="46" dur="1" fill="hold">
+                                          <p:stCondLst>
+                                            <p:cond delay="0"/>
+                                          </p:stCondLst>
+                                        </p:cTn>
+                                        <p:tgtEl>
+                                          <p:spTgt spid="21"/>
+                                        </p:tgtEl>
+                                        <p:attrNameLst>
+                                          <p:attrName>style.visibility</p:attrName>
+                                        </p:attrNameLst>
+                                      </p:cBhvr>
+                                      <p:to>
+                                        <p:strVal val="visible"/>
+                                      </p:to>
+                                    </p:set>
+                                  </p:childTnLst>
+                                </p:cTn>
+                              </p:par>
+                            </p:childTnLst>
+                          </p:cTn>
+                        </p:par>
+                      </p:childTnLst>
+                    </p:cTn>
+                  </p:par>
+                  <p:par>
+                    <p:cTn id="47" fill="hold">
+                      <p:stCondLst>
+                        <p:cond delay="indefinite"/>
+                      </p:stCondLst>
+                      <p:childTnLst>
+                        <p:par>
+                          <p:cTn id="48" fill="hold">
+                            <p:stCondLst>
+                              <p:cond delay="0"/>
+                            </p:stCondLst>
+                            <p:childTnLst>
+                              <p:par>
+                                <p:cTn id="49" presetID="1" presetClass="entr" presetSubtype="0" fill="hold" nodeType="clickEffect">
+                                  <p:stCondLst>
+                                    <p:cond delay="0"/>
+                                  </p:stCondLst>
+                                  <p:childTnLst>
+                                    <p:set>
+                                      <p:cBhvr>
+                                        <p:cTn id="50" dur="1" fill="hold">
+                                          <p:stCondLst>
+                                            <p:cond delay="0"/>
+                                          </p:stCondLst>
+                                        </p:cTn>
+                                        <p:tgtEl>
+                                          <p:spTgt spid="9"/>
+                                        </p:tgtEl>
+                                        <p:attrNameLst>
+                                          <p:attrName>style.visibility</p:attrName>
+                                        </p:attrNameLst>
+                                      </p:cBhvr>
+                                      <p:to>
+                                        <p:strVal val="visible"/>
+                                      </p:to>
+                                    </p:set>
+                                  </p:childTnLst>
+                                </p:cTn>
+                              </p:par>
+                            </p:childTnLst>
+                          </p:cTn>
+                        </p:par>
+                      </p:childTnLst>
+                    </p:cTn>
+                  </p:par>
+                  <p:par>
+                    <p:cTn id="51" fill="hold">
+                      <p:stCondLst>
+                        <p:cond delay="indefinite"/>
+                      </p:stCondLst>
+                      <p:childTnLst>
+                        <p:par>
+                          <p:cTn id="52" fill="hold">
+                            <p:stCondLst>
+                              <p:cond delay="0"/>
+                            </p:stCondLst>
+                            <p:childTnLst>
+                              <p:par>
+                                <p:cTn id="53" presetID="1" presetClass="entr" presetSubtype="0" fill="hold" grpId="0" nodeType="clickEffect">
+                                  <p:stCondLst>
+                                    <p:cond delay="0"/>
+                                  </p:stCondLst>
+                                  <p:childTnLst>
+                                    <p:set>
+                                      <p:cBhvr>
+                                        <p:cTn id="54" dur="1" fill="hold">
+                                          <p:stCondLst>
+                                            <p:cond delay="0"/>
+                                          </p:stCondLst>
+                                        </p:cTn>
+                                        <p:tgtEl>
+                                          <p:spTgt spid="2"/>
+                                        </p:tgtEl>
+                                        <p:attrNameLst>
+                                          <p:attrName>style.visibility</p:attrName>
+                                        </p:attrNameLst>
+                                      </p:cBhvr>
+                                      <p:to>
+                                        <p:strVal val="visible"/>
+                                      </p:to>
+                                    </p:set>
+                                  </p:childTnLst>
+                                </p:cTn>
+                              </p:par>
+                              <p:par>
+                                <p:cTn id="55" presetID="1" presetClass="entr" presetSubtype="0" fill="hold" grpId="0" nodeType="withEffect">
+                                  <p:stCondLst>
+                                    <p:cond delay="0"/>
+                                  </p:stCondLst>
+                                  <p:childTnLst>
+                                    <p:set>
+                                      <p:cBhvr>
+                                        <p:cTn id="56" dur="1" fill="hold">
+                                          <p:stCondLst>
+                                            <p:cond delay="0"/>
+                                          </p:stCondLst>
+                                        </p:cTn>
+                                        <p:tgtEl>
+                                          <p:spTgt spid="14"/>
+                                        </p:tgtEl>
+                                        <p:attrNameLst>
+                                          <p:attrName>style.visibility</p:attrName>
+                                        </p:attrNameLst>
+                                      </p:cBhvr>
+                                      <p:to>
+                                        <p:strVal val="visible"/>
+                                      </p:to>
+                                    </p:set>
+                                  </p:childTnLst>
+                                </p:cTn>
+                              </p:par>
+                              <p:par>
+                                <p:cTn id="57" presetID="1" presetClass="entr" presetSubtype="0" fill="hold" nodeType="withEffect">
+                                  <p:stCondLst>
+                                    <p:cond delay="0"/>
+                                  </p:stCondLst>
+                                  <p:childTnLst>
+                                    <p:set>
+                                      <p:cBhvr>
+                                        <p:cTn id="58" dur="1" fill="hold">
+                                          <p:stCondLst>
+                                            <p:cond delay="0"/>
+                                          </p:stCondLst>
+                                        </p:cTn>
+                                        <p:tgtEl>
+                                          <p:spTgt spid="13"/>
+                                        </p:tgtEl>
+                                        <p:attrNameLst>
+                                          <p:attrName>style.visibility</p:attrName>
+                                        </p:attrNameLst>
+                                      </p:cBhvr>
+                                      <p:to>
+                                        <p:strVal val="visible"/>
+                                      </p:to>
+                                    </p:set>
+                                  </p:childTnLst>
+                                </p:cTn>
+                              </p:par>
+                            </p:childTnLst>
+                          </p:cTn>
+                        </p:par>
+                      </p:childTnLst>
+                    </p:cTn>
+                  </p:par>
+                  <p:par>
+                    <p:cTn id="59" fill="hold">
+                      <p:stCondLst>
+                        <p:cond delay="indefinite"/>
+                      </p:stCondLst>
+                      <p:childTnLst>
+                        <p:par>
+                          <p:cTn id="60" fill="hold">
+                            <p:stCondLst>
+                              <p:cond delay="0"/>
+                            </p:stCondLst>
+                            <p:childTnLst>
+                              <p:par>
+                                <p:cTn id="61" presetID="1" presetClass="entr" presetSubtype="0" fill="hold" grpId="0" nodeType="clickEffect">
+                                  <p:stCondLst>
+                                    <p:cond delay="0"/>
+                                  </p:stCondLst>
+                                  <p:childTnLst>
+                                    <p:set>
+                                      <p:cBhvr>
+                                        <p:cTn id="62" dur="1" fill="hold">
+                                          <p:stCondLst>
+                                            <p:cond delay="0"/>
+                                          </p:stCondLst>
+                                        </p:cTn>
+                                        <p:tgtEl>
+                                          <p:spTgt spid="10"/>
+                                        </p:tgtEl>
+                                        <p:attrNameLst>
+                                          <p:attrName>style.visibility</p:attrName>
+                                        </p:attrNameLst>
+                                      </p:cBhvr>
+                                      <p:to>
+                                        <p:strVal val="visible"/>
+                                      </p:to>
+                                    </p:set>
+                                  </p:childTnLst>
+                                </p:cTn>
+                              </p:par>
+                              <p:par>
+                                <p:cTn id="63" presetID="1" presetClass="entr" presetSubtype="0" fill="hold" nodeType="withEffect">
+                                  <p:stCondLst>
+                                    <p:cond delay="0"/>
+                                  </p:stCondLst>
+                                  <p:childTnLst>
+                                    <p:set>
+                                      <p:cBhvr>
+                                        <p:cTn id="64" dur="1" fill="hold">
+                                          <p:stCondLst>
+                                            <p:cond delay="0"/>
+                                          </p:stCondLst>
+                                        </p:cTn>
+                                        <p:tgtEl>
+                                          <p:spTgt spid="6"/>
+                                        </p:tgtEl>
+                                        <p:attrNameLst>
+                                          <p:attrName>style.visibility</p:attrName>
+                                        </p:attrNameLst>
+                                      </p:cBhvr>
+                                      <p:to>
+                                        <p:strVal val="visible"/>
+                                      </p:to>
+                                    </p:set>
+                                  </p:childTnLst>
+                                </p:cTn>
+                              </p:par>
+                            </p:childTnLst>
+                          </p:cTn>
+                        </p:par>
+                      </p:childTnLst>
+                    </p:cTn>
+                  </p:par>
+                  <p:par>
+                    <p:cTn id="65" fill="hold">
+                      <p:stCondLst>
+                        <p:cond delay="indefinite"/>
+                      </p:stCondLst>
+                      <p:childTnLst>
+                        <p:par>
+                          <p:cTn id="66" fill="hold">
+                            <p:stCondLst>
+                              <p:cond delay="0"/>
+                            </p:stCondLst>
+                            <p:childTnLst>
+                              <p:par>
+                                <p:cTn id="67" presetID="2" presetClass="entr" presetSubtype="4" fill="hold" grpId="0" nodeType="clickEffect">
+                                  <p:stCondLst>
+                                    <p:cond delay="0"/>
+                                  </p:stCondLst>
+                                  <p:childTnLst>
+                                    <p:set>
+                                      <p:cBhvr>
+                                        <p:cTn id="68" dur="1" fill="hold">
+                                          <p:stCondLst>
+                                            <p:cond delay="0"/>
+                                          </p:stCondLst>
+                                        </p:cTn>
+                                        <p:tgtEl>
+                                          <p:spTgt spid="23"/>
+                                        </p:tgtEl>
+                                        <p:attrNameLst>
+                                          <p:attrName>style.visibility</p:attrName>
+                                        </p:attrNameLst>
+                                      </p:cBhvr>
+                                      <p:to>
+                                        <p:strVal val="visible"/>
+                                      </p:to>
+                                    </p:set>
+                                    <p:anim calcmode="lin" valueType="num">
+                                      <p:cBhvr additive="base">
+                                        <p:cTn id="69" dur="500" fill="hold"/>
+                                        <p:tgtEl>
+                                          <p:spTgt spid="23"/>
+                                        </p:tgtEl>
+                                        <p:attrNameLst>
+                                          <p:attrName>ppt_x</p:attrName>
+                                        </p:attrNameLst>
+                                      </p:cBhvr>
+                                      <p:tavLst>
+                                        <p:tav tm="0">
+                                          <p:val>
+                                            <p:strVal val="#ppt_x"/>
+                                          </p:val>
+                                        </p:tav>
+                                        <p:tav tm="100000">
+                                          <p:val>
+                                            <p:strVal val="#ppt_x"/>
+                                          </p:val>
+                                        </p:tav>
+                                      </p:tavLst>
+                                    </p:anim>
+                                    <p:anim calcmode="lin" valueType="num">
+                                      <p:cBhvr additive="base">
+                                        <p:cTn id="70" dur="500" fill="hold"/>
+                                        <p:tgtEl>
+                                          <p:spTgt spid="23"/>
+                                        </p:tgtEl>
+                                        <p:attrNameLst>
+                                          <p:attrName>ppt_y</p:attrName>
+                                        </p:attrNameLst>
+                                      </p:cBhvr>
+                                      <p:tavLst>
+                                        <p:tav tm="0">
+                                          <p:val>
+                                            <p:strVal val="1+#ppt_h/2"/>
+                                          </p:val>
+                                        </p:tav>
+                                        <p:tav tm="100000">
+                                          <p:val>
+                                            <p:strVal val="#ppt_y"/>
+                                          </p:val>
+                                        </p:tav>
+                                      </p:tavLst>
+                                    </p:anim>
+                                  </p:childTnLst>
+                                </p:cTn>
+                              </p:par>
+                              <p:par>
+                                <p:cTn id="71" presetID="2" presetClass="entr" presetSubtype="4" fill="hold" grpId="0" nodeType="withEffect">
+                                  <p:stCondLst>
+                                    <p:cond delay="0"/>
+                                  </p:stCondLst>
+                                  <p:childTnLst>
+                                    <p:set>
+                                      <p:cBhvr>
+                                        <p:cTn id="72" dur="1" fill="hold">
+                                          <p:stCondLst>
+                                            <p:cond delay="0"/>
+                                          </p:stCondLst>
+                                        </p:cTn>
+                                        <p:tgtEl>
+                                          <p:spTgt spid="24"/>
+                                        </p:tgtEl>
+                                        <p:attrNameLst>
+                                          <p:attrName>style.visibility</p:attrName>
+                                        </p:attrNameLst>
+                                      </p:cBhvr>
+                                      <p:to>
+                                        <p:strVal val="visible"/>
+                                      </p:to>
+                                    </p:set>
+                                    <p:anim calcmode="lin" valueType="num">
+                                      <p:cBhvr additive="base">
+                                        <p:cTn id="73" dur="500" fill="hold"/>
+                                        <p:tgtEl>
+                                          <p:spTgt spid="24"/>
+                                        </p:tgtEl>
+                                        <p:attrNameLst>
+                                          <p:attrName>ppt_x</p:attrName>
+                                        </p:attrNameLst>
+                                      </p:cBhvr>
+                                      <p:tavLst>
+                                        <p:tav tm="0">
+                                          <p:val>
+                                            <p:strVal val="#ppt_x"/>
+                                          </p:val>
+                                        </p:tav>
+                                        <p:tav tm="100000">
+                                          <p:val>
+                                            <p:strVal val="#ppt_x"/>
+                                          </p:val>
+                                        </p:tav>
+                                      </p:tavLst>
+                                    </p:anim>
+                                    <p:anim calcmode="lin" valueType="num">
+                                      <p:cBhvr additive="base">
+                                        <p:cTn id="74" dur="500" fill="hold"/>
+                                        <p:tgtEl>
+                                          <p:spTgt spid="24"/>
+                                        </p:tgtEl>
+                                        <p:attrNameLst>
+                                          <p:attrName>ppt_y</p:attrName>
+                                        </p:attrNameLst>
+                                      </p:cBhvr>
+                                      <p:tavLst>
+                                        <p:tav tm="0">
+                                          <p:val>
+                                            <p:strVal val="1+#ppt_h/2"/>
+                                          </p:val>
+                                        </p:tav>
+                                        <p:tav tm="100000">
+                                          <p:val>
+                                            <p:strVal val="#ppt_y"/>
+                                          </p:val>
+                                        </p:tav>
+                                      </p:tavLst>
+                                    </p:anim>
+                                  </p:childTnLst>
+                                </p:cTn>
+                              </p:par>
+                              <p:par>
+                                <p:cTn id="75" presetID="2" presetClass="entr" presetSubtype="4" fill="hold" grpId="0" nodeType="withEffect">
+                                  <p:stCondLst>
+                                    <p:cond delay="0"/>
+                                  </p:stCondLst>
+                                  <p:childTnLst>
+                                    <p:set>
+                                      <p:cBhvr>
+                                        <p:cTn id="76" dur="1" fill="hold">
+                                          <p:stCondLst>
+                                            <p:cond delay="0"/>
+                                          </p:stCondLst>
+                                        </p:cTn>
+                                        <p:tgtEl>
+                                          <p:spTgt spid="25"/>
+                                        </p:tgtEl>
+                                        <p:attrNameLst>
+                                          <p:attrName>style.visibility</p:attrName>
+                                        </p:attrNameLst>
+                                      </p:cBhvr>
+                                      <p:to>
+                                        <p:strVal val="visible"/>
+                                      </p:to>
+                                    </p:set>
+                                    <p:anim calcmode="lin" valueType="num">
+                                      <p:cBhvr additive="base">
+                                        <p:cTn id="77" dur="500" fill="hold"/>
+                                        <p:tgtEl>
+                                          <p:spTgt spid="25"/>
+                                        </p:tgtEl>
+                                        <p:attrNameLst>
+                                          <p:attrName>ppt_x</p:attrName>
+                                        </p:attrNameLst>
+                                      </p:cBhvr>
+                                      <p:tavLst>
+                                        <p:tav tm="0">
+                                          <p:val>
+                                            <p:strVal val="#ppt_x"/>
+                                          </p:val>
+                                        </p:tav>
+                                        <p:tav tm="100000">
+                                          <p:val>
+                                            <p:strVal val="#ppt_x"/>
+                                          </p:val>
+                                        </p:tav>
+                                      </p:tavLst>
+                                    </p:anim>
+                                    <p:anim calcmode="lin" valueType="num">
+                                      <p:cBhvr additive="base">
+                                        <p:cTn id="78" dur="500" fill="hold"/>
+                                        <p:tgtEl>
+                                          <p:spTgt spid="25"/>
+                                        </p:tgtEl>
+                                        <p:attrNameLst>
+                                          <p:attrName>ppt_y</p:attrName>
+                                        </p:attrNameLst>
+                                      </p:cBhvr>
+                                      <p:tavLst>
+                                        <p:tav tm="0">
+                                          <p:val>
+                                            <p:strVal val="1+#ppt_h/2"/>
+                                          </p:val>
+                                        </p:tav>
+                                        <p:tav tm="100000">
+                                          <p:val>
+                                            <p:strVal val="#ppt_y"/>
+                                          </p:val>
+                                        </p:tav>
+                                      </p:tavLst>
+                                    </p:anim>
+                                  </p:childTnLst>
+                                </p:cTn>
+                              </p:par>
+                              <p:par>
+                                <p:cTn id="79" presetID="2" presetClass="entr" presetSubtype="4" fill="hold" grpId="0" nodeType="withEffect">
+                                  <p:stCondLst>
+                                    <p:cond delay="0"/>
+                                  </p:stCondLst>
+                                  <p:childTnLst>
+                                    <p:set>
+                                      <p:cBhvr>
+                                        <p:cTn id="80" dur="1" fill="hold">
+                                          <p:stCondLst>
+                                            <p:cond delay="0"/>
+                                          </p:stCondLst>
+                                        </p:cTn>
+                                        <p:tgtEl>
+                                          <p:spTgt spid="26"/>
+                                        </p:tgtEl>
+                                        <p:attrNameLst>
+                                          <p:attrName>style.visibility</p:attrName>
+                                        </p:attrNameLst>
+                                      </p:cBhvr>
+                                      <p:to>
+                                        <p:strVal val="visible"/>
+                                      </p:to>
+                                    </p:set>
+                                    <p:anim calcmode="lin" valueType="num">
+                                      <p:cBhvr additive="base">
+                                        <p:cTn id="81" dur="500" fill="hold"/>
+                                        <p:tgtEl>
+                                          <p:spTgt spid="26"/>
+                                        </p:tgtEl>
+                                        <p:attrNameLst>
+                                          <p:attrName>ppt_x</p:attrName>
+                                        </p:attrNameLst>
+                                      </p:cBhvr>
+                                      <p:tavLst>
+                                        <p:tav tm="0">
+                                          <p:val>
+                                            <p:strVal val="#ppt_x"/>
+                                          </p:val>
+                                        </p:tav>
+                                        <p:tav tm="100000">
+                                          <p:val>
+                                            <p:strVal val="#ppt_x"/>
+                                          </p:val>
+                                        </p:tav>
+                                      </p:tavLst>
+                                    </p:anim>
+                                    <p:anim calcmode="lin" valueType="num">
+                                      <p:cBhvr additive="base">
+                                        <p:cTn id="82" dur="500" fill="hold"/>
+                                        <p:tgtEl>
+                                          <p:spTgt spid="26"/>
+                                        </p:tgtEl>
+                                        <p:attrNameLst>
+                                          <p:attrName>ppt_y</p:attrName>
+                                        </p:attrNameLst>
+                                      </p:cBhvr>
+                                      <p:tavLst>
+                                        <p:tav tm="0">
+                                          <p:val>
+                                            <p:strVal val="1+#ppt_h/2"/>
+                                          </p:val>
+                                        </p:tav>
+                                        <p:tav tm="100000">
+                                          <p:val>
+                                            <p:strVal val="#ppt_y"/>
+                                          </p:val>
+                                        </p:tav>
+                                      </p:tavLst>
+                                    </p:anim>
+                                  </p:childTnLst>
+                                </p:cTn>
+                              </p:par>
+                            </p:childTnLst>
+                          </p:cTn>
+                        </p:par>
+                      </p:childTnLst>
+                    </p:cTn>
+                  </p:par>
+                </p:childTnLst>
+              </p:cTn>
+              <p:prevCondLst>
+                <p:cond evt="onPrev" delay="0">
+                  <p:tgtEl>
+                    <p:sldTgt/>
+                  </p:tgtEl>
+                </p:cond>
+              </p:prevCondLst>
+              <p:nextCondLst>
+                <p:cond evt="onNext" delay="0">
+                  <p:tgtEl>
+                    <p:sldTgt/>
+                  </p:tgtEl>
+                </p:cond>
+              </p:nextCondLst>
+            </p:seq>
+          </p:childTnLst>
+        </p:cTn>
+      </p:par>
+    </p:tnLst>
+    <p:bldLst>
+      <p:bldP spid="2" grpId="0" animBg="1"/>
+      <p:bldP spid="3" grpId="0" animBg="1"/>
+      <p:bldP spid="4" grpId="0" animBg="1"/>
+      <p:bldP spid="5" grpId="0" animBg="1"/>
+      <p:bldP spid="10" grpId="0"/>
+      <p:bldP spid="12" grpId="0"/>
+      <p:bldP spid="14" grpId="0"/>
+      <p:bldP spid="15" grpId="0"/>
+      <p:bldP spid="16" grpId="0"/>
+      <p:bldP spid="18" grpId="0"/>
+      <p:bldP spid="19" grpId="0" animBg="1"/>
+      <p:bldP spid="21" grpId="0" animBg="1"/>
+      <p:bldP spid="23" grpId="0" animBg="1"/>
+      <p:bldP spid="24" grpId="0" animBg="1"/>
+      <p:bldP spid="25" grpId="0"/>
+      <p:bldP spid="26" grpId="0"/>
+    </p:bldLst>
+  </p:timing>
+</p:sld>
+</file>
+
 <file path=ppt/theme/theme1.xml><?xml version="1.0" encoding="utf-8"?>
 <a:theme xmlns:a="http://schemas.openxmlformats.org/drawingml/2006/main" name="Office Theme">
   <a:themeElements>

</xml_diff>

<commit_message>
Updating the publishing image
</commit_message>
<xml_diff>
--- a/ImplementationGuideImages.pptx
+++ b/ImplementationGuideImages.pptx
@@ -14277,7 +14277,7 @@
             <a:srgbClr val="FFC000"/>
           </a:solidFill>
           <a:ln>
-            <a:prstDash val="sysDot"/>
+            <a:prstDash val="dash"/>
           </a:ln>
         </p:spPr>
         <p:style>
@@ -15090,7 +15090,7 @@
           </a:prstGeom>
           <a:noFill/>
           <a:ln>
-            <a:prstDash val="sysDot"/>
+            <a:prstDash val="dash"/>
           </a:ln>
         </p:spPr>
         <p:style>
@@ -15216,7 +15216,7 @@
             </a:schemeClr>
           </a:solidFill>
           <a:ln>
-            <a:prstDash val="sysDot"/>
+            <a:prstDash val="dash"/>
           </a:ln>
         </p:spPr>
         <p:style>
@@ -15328,7 +15328,7 @@
             <a:avLst/>
           </a:prstGeom>
           <a:ln>
-            <a:prstDash val="sysDot"/>
+            <a:prstDash val="dash"/>
           </a:ln>
         </p:spPr>
         <p:style>

</xml_diff>

<commit_message>
updated url to tutorial
</commit_message>
<xml_diff>
--- a/ImplementationGuideImages.pptx
+++ b/ImplementationGuideImages.pptx
@@ -11,7 +11,7 @@
     <p:sldId id="261" r:id="rId5"/>
     <p:sldId id="258" r:id="rId6"/>
     <p:sldId id="262" r:id="rId7"/>
-    <p:sldId id="263" r:id="rId8"/>
+    <p:sldId id="266" r:id="rId8"/>
     <p:sldId id="264" r:id="rId9"/>
     <p:sldId id="265" r:id="rId10"/>
   </p:sldIdLst>
@@ -269,7 +269,7 @@
           <a:p>
             <a:fld id="{6B5A8AD0-4133-444B-956D-B3352209FA33}" type="datetimeFigureOut">
               <a:rPr lang="en-SE" smtClean="0"/>
-              <a:t>2025-04-25</a:t>
+              <a:t>2025-11-18</a:t>
             </a:fld>
             <a:endParaRPr lang="en-SE"/>
           </a:p>
@@ -469,7 +469,7 @@
           <a:p>
             <a:fld id="{6B5A8AD0-4133-444B-956D-B3352209FA33}" type="datetimeFigureOut">
               <a:rPr lang="en-SE" smtClean="0"/>
-              <a:t>2025-04-25</a:t>
+              <a:t>2025-11-18</a:t>
             </a:fld>
             <a:endParaRPr lang="en-SE"/>
           </a:p>
@@ -679,7 +679,7 @@
           <a:p>
             <a:fld id="{6B5A8AD0-4133-444B-956D-B3352209FA33}" type="datetimeFigureOut">
               <a:rPr lang="en-SE" smtClean="0"/>
-              <a:t>2025-04-25</a:t>
+              <a:t>2025-11-18</a:t>
             </a:fld>
             <a:endParaRPr lang="en-SE"/>
           </a:p>
@@ -879,7 +879,7 @@
           <a:p>
             <a:fld id="{6B5A8AD0-4133-444B-956D-B3352209FA33}" type="datetimeFigureOut">
               <a:rPr lang="en-SE" smtClean="0"/>
-              <a:t>2025-04-25</a:t>
+              <a:t>2025-11-18</a:t>
             </a:fld>
             <a:endParaRPr lang="en-SE"/>
           </a:p>
@@ -1155,7 +1155,7 @@
           <a:p>
             <a:fld id="{6B5A8AD0-4133-444B-956D-B3352209FA33}" type="datetimeFigureOut">
               <a:rPr lang="en-SE" smtClean="0"/>
-              <a:t>2025-04-25</a:t>
+              <a:t>2025-11-18</a:t>
             </a:fld>
             <a:endParaRPr lang="en-SE"/>
           </a:p>
@@ -1423,7 +1423,7 @@
           <a:p>
             <a:fld id="{6B5A8AD0-4133-444B-956D-B3352209FA33}" type="datetimeFigureOut">
               <a:rPr lang="en-SE" smtClean="0"/>
-              <a:t>2025-04-25</a:t>
+              <a:t>2025-11-18</a:t>
             </a:fld>
             <a:endParaRPr lang="en-SE"/>
           </a:p>
@@ -1838,7 +1838,7 @@
           <a:p>
             <a:fld id="{6B5A8AD0-4133-444B-956D-B3352209FA33}" type="datetimeFigureOut">
               <a:rPr lang="en-SE" smtClean="0"/>
-              <a:t>2025-04-25</a:t>
+              <a:t>2025-11-18</a:t>
             </a:fld>
             <a:endParaRPr lang="en-SE"/>
           </a:p>
@@ -1980,7 +1980,7 @@
           <a:p>
             <a:fld id="{6B5A8AD0-4133-444B-956D-B3352209FA33}" type="datetimeFigureOut">
               <a:rPr lang="en-SE" smtClean="0"/>
-              <a:t>2025-04-25</a:t>
+              <a:t>2025-11-18</a:t>
             </a:fld>
             <a:endParaRPr lang="en-SE"/>
           </a:p>
@@ -2093,7 +2093,7 @@
           <a:p>
             <a:fld id="{6B5A8AD0-4133-444B-956D-B3352209FA33}" type="datetimeFigureOut">
               <a:rPr lang="en-SE" smtClean="0"/>
-              <a:t>2025-04-25</a:t>
+              <a:t>2025-11-18</a:t>
             </a:fld>
             <a:endParaRPr lang="en-SE"/>
           </a:p>
@@ -2406,7 +2406,7 @@
           <a:p>
             <a:fld id="{6B5A8AD0-4133-444B-956D-B3352209FA33}" type="datetimeFigureOut">
               <a:rPr lang="en-SE" smtClean="0"/>
-              <a:t>2025-04-25</a:t>
+              <a:t>2025-11-18</a:t>
             </a:fld>
             <a:endParaRPr lang="en-SE"/>
           </a:p>
@@ -2695,7 +2695,7 @@
           <a:p>
             <a:fld id="{6B5A8AD0-4133-444B-956D-B3352209FA33}" type="datetimeFigureOut">
               <a:rPr lang="en-SE" smtClean="0"/>
-              <a:t>2025-04-25</a:t>
+              <a:t>2025-11-18</a:t>
             </a:fld>
             <a:endParaRPr lang="en-SE"/>
           </a:p>
@@ -2938,7 +2938,7 @@
           <a:p>
             <a:fld id="{6B5A8AD0-4133-444B-956D-B3352209FA33}" type="datetimeFigureOut">
               <a:rPr lang="en-SE" smtClean="0"/>
-              <a:t>2025-04-25</a:t>
+              <a:t>2025-11-18</a:t>
             </a:fld>
             <a:endParaRPr lang="en-SE"/>
           </a:p>
@@ -11934,7 +11934,13 @@
   <p:cSld>
     <p:spTree>
       <p:nvGrpSpPr>
-        <p:cNvPr id="1" name=""/>
+        <p:cNvPr id="1" name="">
+          <a:extLst>
+            <a:ext uri="{FF2B5EF4-FFF2-40B4-BE49-F238E27FC236}">
+              <a16:creationId xmlns:a16="http://schemas.microsoft.com/office/drawing/2014/main" id="{975381CF-79DC-3783-5A09-D3633FCDB543}"/>
+            </a:ext>
+          </a:extLst>
+        </p:cNvPr>
         <p:cNvGrpSpPr/>
         <p:nvPr/>
       </p:nvGrpSpPr>
@@ -11948,10 +11954,10 @@
       </p:grpSpPr>
       <p:pic>
         <p:nvPicPr>
-          <p:cNvPr id="3" name="Picture 2" descr="Diagram of a process&#10;&#10;Description automatically generated">
-            <a:extLst>
-              <a:ext uri="{FF2B5EF4-FFF2-40B4-BE49-F238E27FC236}">
-                <a16:creationId xmlns:a16="http://schemas.microsoft.com/office/drawing/2014/main" id="{771CE6BD-ABCA-D733-F523-014007534B33}"/>
+          <p:cNvPr id="9" name="Picture 8" descr="A diagram of a process&#10;&#10;AI-generated content may be incorrect.">
+            <a:extLst>
+              <a:ext uri="{FF2B5EF4-FFF2-40B4-BE49-F238E27FC236}">
+                <a16:creationId xmlns:a16="http://schemas.microsoft.com/office/drawing/2014/main" id="{B71800F1-6D0C-E397-483E-83EF1402563D}"/>
               </a:ext>
             </a:extLst>
           </p:cNvPr>
@@ -11974,273 +11980,18 @@
         </p:blipFill>
         <p:spPr>
           <a:xfrm>
-            <a:off x="1550531" y="828675"/>
-            <a:ext cx="8515350" cy="5200650"/>
+            <a:off x="1287624" y="527283"/>
+            <a:ext cx="8774269" cy="5295019"/>
           </a:xfrm>
           <a:prstGeom prst="rect">
             <a:avLst/>
           </a:prstGeom>
         </p:spPr>
       </p:pic>
-      <p:sp>
-        <p:nvSpPr>
-          <p:cNvPr id="4" name="Oval 3">
-            <a:extLst>
-              <a:ext uri="{FF2B5EF4-FFF2-40B4-BE49-F238E27FC236}">
-                <a16:creationId xmlns:a16="http://schemas.microsoft.com/office/drawing/2014/main" id="{2E139473-21AC-A234-7AF9-AA54796BEA53}"/>
-              </a:ext>
-            </a:extLst>
-          </p:cNvPr>
-          <p:cNvSpPr/>
-          <p:nvPr/>
-        </p:nvSpPr>
-        <p:spPr>
-          <a:xfrm>
-            <a:off x="1429506" y="2262590"/>
-            <a:ext cx="597159" cy="547943"/>
-          </a:xfrm>
-          <a:prstGeom prst="ellipse">
-            <a:avLst/>
-          </a:prstGeom>
-          <a:solidFill>
-            <a:srgbClr val="F9B655"/>
-          </a:solidFill>
-        </p:spPr>
-        <p:style>
-          <a:lnRef idx="2">
-            <a:schemeClr val="dk1"/>
-          </a:lnRef>
-          <a:fillRef idx="1">
-            <a:schemeClr val="lt1"/>
-          </a:fillRef>
-          <a:effectRef idx="0">
-            <a:schemeClr val="dk1"/>
-          </a:effectRef>
-          <a:fontRef idx="minor">
-            <a:schemeClr val="dk1"/>
-          </a:fontRef>
-        </p:style>
-        <p:txBody>
-          <a:bodyPr rtlCol="0" anchor="ctr"/>
-          <a:lstStyle/>
-          <a:p>
-            <a:pPr algn="ctr"/>
-            <a:r>
-              <a:rPr lang="en-US" dirty="0"/>
-              <a:t>1</a:t>
-            </a:r>
-            <a:endParaRPr lang="en-SE" dirty="0"/>
-          </a:p>
-        </p:txBody>
-      </p:sp>
-      <p:sp>
-        <p:nvSpPr>
-          <p:cNvPr id="5" name="Oval 4">
-            <a:extLst>
-              <a:ext uri="{FF2B5EF4-FFF2-40B4-BE49-F238E27FC236}">
-                <a16:creationId xmlns:a16="http://schemas.microsoft.com/office/drawing/2014/main" id="{BDC6C52C-84FF-18B8-521F-982A3ED13CED}"/>
-              </a:ext>
-            </a:extLst>
-          </p:cNvPr>
-          <p:cNvSpPr/>
-          <p:nvPr/>
-        </p:nvSpPr>
-        <p:spPr>
-          <a:xfrm>
-            <a:off x="4306252" y="3843151"/>
-            <a:ext cx="597159" cy="547943"/>
-          </a:xfrm>
-          <a:prstGeom prst="ellipse">
-            <a:avLst/>
-          </a:prstGeom>
-          <a:solidFill>
-            <a:srgbClr val="F9B655"/>
-          </a:solidFill>
-        </p:spPr>
-        <p:style>
-          <a:lnRef idx="2">
-            <a:schemeClr val="dk1"/>
-          </a:lnRef>
-          <a:fillRef idx="1">
-            <a:schemeClr val="lt1"/>
-          </a:fillRef>
-          <a:effectRef idx="0">
-            <a:schemeClr val="dk1"/>
-          </a:effectRef>
-          <a:fontRef idx="minor">
-            <a:schemeClr val="dk1"/>
-          </a:fontRef>
-        </p:style>
-        <p:txBody>
-          <a:bodyPr rtlCol="0" anchor="ctr"/>
-          <a:lstStyle/>
-          <a:p>
-            <a:pPr algn="ctr"/>
-            <a:r>
-              <a:rPr lang="en-US" dirty="0"/>
-              <a:t>2</a:t>
-            </a:r>
-            <a:endParaRPr lang="en-SE" dirty="0"/>
-          </a:p>
-        </p:txBody>
-      </p:sp>
-      <p:sp>
-        <p:nvSpPr>
-          <p:cNvPr id="6" name="Oval 5">
-            <a:extLst>
-              <a:ext uri="{FF2B5EF4-FFF2-40B4-BE49-F238E27FC236}">
-                <a16:creationId xmlns:a16="http://schemas.microsoft.com/office/drawing/2014/main" id="{3B3F1045-88ED-369E-21FA-17254D8F023E}"/>
-              </a:ext>
-            </a:extLst>
-          </p:cNvPr>
-          <p:cNvSpPr/>
-          <p:nvPr/>
-        </p:nvSpPr>
-        <p:spPr>
-          <a:xfrm>
-            <a:off x="5674709" y="3569179"/>
-            <a:ext cx="597159" cy="547943"/>
-          </a:xfrm>
-          <a:prstGeom prst="ellipse">
-            <a:avLst/>
-          </a:prstGeom>
-          <a:solidFill>
-            <a:srgbClr val="F9B655"/>
-          </a:solidFill>
-        </p:spPr>
-        <p:style>
-          <a:lnRef idx="2">
-            <a:schemeClr val="dk1"/>
-          </a:lnRef>
-          <a:fillRef idx="1">
-            <a:schemeClr val="lt1"/>
-          </a:fillRef>
-          <a:effectRef idx="0">
-            <a:schemeClr val="dk1"/>
-          </a:effectRef>
-          <a:fontRef idx="minor">
-            <a:schemeClr val="dk1"/>
-          </a:fontRef>
-        </p:style>
-        <p:txBody>
-          <a:bodyPr rtlCol="0" anchor="ctr"/>
-          <a:lstStyle/>
-          <a:p>
-            <a:pPr algn="ctr"/>
-            <a:r>
-              <a:rPr lang="en-US" dirty="0"/>
-              <a:t>3</a:t>
-            </a:r>
-            <a:endParaRPr lang="en-SE" dirty="0"/>
-          </a:p>
-        </p:txBody>
-      </p:sp>
-      <p:sp>
-        <p:nvSpPr>
-          <p:cNvPr id="7" name="Oval 6">
-            <a:extLst>
-              <a:ext uri="{FF2B5EF4-FFF2-40B4-BE49-F238E27FC236}">
-                <a16:creationId xmlns:a16="http://schemas.microsoft.com/office/drawing/2014/main" id="{BB4E3560-0CA1-8291-282D-56930BB0FF6D}"/>
-              </a:ext>
-            </a:extLst>
-          </p:cNvPr>
-          <p:cNvSpPr/>
-          <p:nvPr/>
-        </p:nvSpPr>
-        <p:spPr>
-          <a:xfrm>
-            <a:off x="8752561" y="1988618"/>
-            <a:ext cx="597159" cy="547943"/>
-          </a:xfrm>
-          <a:prstGeom prst="ellipse">
-            <a:avLst/>
-          </a:prstGeom>
-          <a:solidFill>
-            <a:srgbClr val="F9B655"/>
-          </a:solidFill>
-        </p:spPr>
-        <p:style>
-          <a:lnRef idx="2">
-            <a:schemeClr val="dk1"/>
-          </a:lnRef>
-          <a:fillRef idx="1">
-            <a:schemeClr val="lt1"/>
-          </a:fillRef>
-          <a:effectRef idx="0">
-            <a:schemeClr val="dk1"/>
-          </a:effectRef>
-          <a:fontRef idx="minor">
-            <a:schemeClr val="dk1"/>
-          </a:fontRef>
-        </p:style>
-        <p:txBody>
-          <a:bodyPr rtlCol="0" anchor="ctr"/>
-          <a:lstStyle/>
-          <a:p>
-            <a:pPr algn="ctr"/>
-            <a:r>
-              <a:rPr lang="en-US" dirty="0"/>
-              <a:t>4</a:t>
-            </a:r>
-            <a:endParaRPr lang="en-SE" dirty="0"/>
-          </a:p>
-        </p:txBody>
-      </p:sp>
-      <p:sp>
-        <p:nvSpPr>
-          <p:cNvPr id="8" name="Oval 7">
-            <a:extLst>
-              <a:ext uri="{FF2B5EF4-FFF2-40B4-BE49-F238E27FC236}">
-                <a16:creationId xmlns:a16="http://schemas.microsoft.com/office/drawing/2014/main" id="{B270E350-C90A-E73B-B728-5F893D31E830}"/>
-              </a:ext>
-            </a:extLst>
-          </p:cNvPr>
-          <p:cNvSpPr/>
-          <p:nvPr/>
-        </p:nvSpPr>
-        <p:spPr>
-          <a:xfrm>
-            <a:off x="7099728" y="5331992"/>
-            <a:ext cx="597159" cy="547943"/>
-          </a:xfrm>
-          <a:prstGeom prst="ellipse">
-            <a:avLst/>
-          </a:prstGeom>
-          <a:solidFill>
-            <a:srgbClr val="F9B655"/>
-          </a:solidFill>
-        </p:spPr>
-        <p:style>
-          <a:lnRef idx="2">
-            <a:schemeClr val="dk1"/>
-          </a:lnRef>
-          <a:fillRef idx="1">
-            <a:schemeClr val="lt1"/>
-          </a:fillRef>
-          <a:effectRef idx="0">
-            <a:schemeClr val="dk1"/>
-          </a:effectRef>
-          <a:fontRef idx="minor">
-            <a:schemeClr val="dk1"/>
-          </a:fontRef>
-        </p:style>
-        <p:txBody>
-          <a:bodyPr rtlCol="0" anchor="ctr"/>
-          <a:lstStyle/>
-          <a:p>
-            <a:pPr algn="ctr"/>
-            <a:r>
-              <a:rPr lang="en-US" dirty="0"/>
-              <a:t>5</a:t>
-            </a:r>
-            <a:endParaRPr lang="en-SE" dirty="0"/>
-          </a:p>
-        </p:txBody>
-      </p:sp>
     </p:spTree>
     <p:extLst>
       <p:ext uri="{BB962C8B-B14F-4D97-AF65-F5344CB8AC3E}">
-        <p14:creationId xmlns:p14="http://schemas.microsoft.com/office/powerpoint/2010/main" val="2240367366"/>
+        <p14:creationId xmlns:p14="http://schemas.microsoft.com/office/powerpoint/2010/main" val="1221293433"/>
       </p:ext>
     </p:extLst>
   </p:cSld>

</xml_diff>